<commit_message>
Added information about this git repository to the presentation.
</commit_message>
<xml_diff>
--- a/superbasicperl.pptx
+++ b/superbasicperl.pptx
@@ -5,36 +5,37 @@
     <p:sldMasterId id="2147483672" r:id="rId1"/>
   </p:sldMasterIdLst>
   <p:notesMasterIdLst>
-    <p:notesMasterId r:id="rId26"/>
+    <p:notesMasterId r:id="rId27"/>
   </p:notesMasterIdLst>
   <p:handoutMasterIdLst>
-    <p:handoutMasterId r:id="rId27"/>
+    <p:handoutMasterId r:id="rId28"/>
   </p:handoutMasterIdLst>
   <p:sldIdLst>
     <p:sldId id="256" r:id="rId2"/>
     <p:sldId id="257" r:id="rId3"/>
-    <p:sldId id="258" r:id="rId4"/>
-    <p:sldId id="259" r:id="rId5"/>
-    <p:sldId id="260" r:id="rId6"/>
-    <p:sldId id="261" r:id="rId7"/>
-    <p:sldId id="263" r:id="rId8"/>
-    <p:sldId id="264" r:id="rId9"/>
-    <p:sldId id="265" r:id="rId10"/>
-    <p:sldId id="266" r:id="rId11"/>
-    <p:sldId id="267" r:id="rId12"/>
-    <p:sldId id="269" r:id="rId13"/>
-    <p:sldId id="270" r:id="rId14"/>
-    <p:sldId id="271" r:id="rId15"/>
-    <p:sldId id="280" r:id="rId16"/>
-    <p:sldId id="272" r:id="rId17"/>
-    <p:sldId id="273" r:id="rId18"/>
-    <p:sldId id="274" r:id="rId19"/>
-    <p:sldId id="275" r:id="rId20"/>
-    <p:sldId id="276" r:id="rId21"/>
-    <p:sldId id="277" r:id="rId22"/>
-    <p:sldId id="278" r:id="rId23"/>
-    <p:sldId id="279" r:id="rId24"/>
-    <p:sldId id="262" r:id="rId25"/>
+    <p:sldId id="281" r:id="rId4"/>
+    <p:sldId id="258" r:id="rId5"/>
+    <p:sldId id="259" r:id="rId6"/>
+    <p:sldId id="260" r:id="rId7"/>
+    <p:sldId id="261" r:id="rId8"/>
+    <p:sldId id="263" r:id="rId9"/>
+    <p:sldId id="264" r:id="rId10"/>
+    <p:sldId id="265" r:id="rId11"/>
+    <p:sldId id="266" r:id="rId12"/>
+    <p:sldId id="267" r:id="rId13"/>
+    <p:sldId id="269" r:id="rId14"/>
+    <p:sldId id="270" r:id="rId15"/>
+    <p:sldId id="271" r:id="rId16"/>
+    <p:sldId id="280" r:id="rId17"/>
+    <p:sldId id="272" r:id="rId18"/>
+    <p:sldId id="273" r:id="rId19"/>
+    <p:sldId id="274" r:id="rId20"/>
+    <p:sldId id="275" r:id="rId21"/>
+    <p:sldId id="276" r:id="rId22"/>
+    <p:sldId id="277" r:id="rId23"/>
+    <p:sldId id="278" r:id="rId24"/>
+    <p:sldId id="279" r:id="rId25"/>
+    <p:sldId id="262" r:id="rId26"/>
   </p:sldIdLst>
   <p:sldSz cx="12192000" cy="6858000"/>
   <p:notesSz cx="6858000" cy="9144000"/>
@@ -987,7 +988,7 @@
     </p:spTree>
     <p:extLst>
       <p:ext uri="{BB962C8B-B14F-4D97-AF65-F5344CB8AC3E}">
-        <p14:creationId xmlns:p14="http://schemas.microsoft.com/office/powerpoint/2010/main" val="975381280"/>
+        <p14:creationId xmlns:p14="http://schemas.microsoft.com/office/powerpoint/2010/main" val="4032562643"/>
       </p:ext>
     </p:extLst>
   </p:cSld>
@@ -1137,7 +1138,7 @@
     </p:spTree>
     <p:extLst>
       <p:ext uri="{BB962C8B-B14F-4D97-AF65-F5344CB8AC3E}">
-        <p14:creationId xmlns:p14="http://schemas.microsoft.com/office/powerpoint/2010/main" val="663933835"/>
+        <p14:creationId xmlns:p14="http://schemas.microsoft.com/office/powerpoint/2010/main" val="975381280"/>
       </p:ext>
     </p:extLst>
   </p:cSld>
@@ -1287,7 +1288,7 @@
     </p:spTree>
     <p:extLst>
       <p:ext uri="{BB962C8B-B14F-4D97-AF65-F5344CB8AC3E}">
-        <p14:creationId xmlns:p14="http://schemas.microsoft.com/office/powerpoint/2010/main" val="999000779"/>
+        <p14:creationId xmlns:p14="http://schemas.microsoft.com/office/powerpoint/2010/main" val="663933835"/>
       </p:ext>
     </p:extLst>
   </p:cSld>
@@ -1341,10 +1342,7 @@
           <a:bodyPr/>
           <a:lstStyle/>
           <a:p>
-            <a:r>
-              <a:rPr lang="en-US" dirty="0"/>
-              <a:t>Documentation for regex in Perl can be found at http://perldoc.perl.org/perlre.html </a:t>
-            </a:r>
+            <a:endParaRPr lang="en-US"/>
           </a:p>
         </p:txBody>
       </p:sp>
@@ -1429,7 +1427,7 @@
           <a:bodyPr/>
           <a:lstStyle/>
           <a:p>
-            <a:fld id="{61913804-9CC0-4B7A-8FDD-7B2337CA6D3C}" type="slidenum">
+            <a:fld id="{26E7ADD0-A0BA-4A04-AF04-81A6B3147999}" type="slidenum">
               <a:rPr lang="en-US" smtClean="0"/>
               <a:t>13</a:t>
             </a:fld>
@@ -1440,7 +1438,7 @@
     </p:spTree>
     <p:extLst>
       <p:ext uri="{BB962C8B-B14F-4D97-AF65-F5344CB8AC3E}">
-        <p14:creationId xmlns:p14="http://schemas.microsoft.com/office/powerpoint/2010/main" val="4270665753"/>
+        <p14:creationId xmlns:p14="http://schemas.microsoft.com/office/powerpoint/2010/main" val="999000779"/>
       </p:ext>
     </p:extLst>
   </p:cSld>
@@ -1593,7 +1591,7 @@
     </p:spTree>
     <p:extLst>
       <p:ext uri="{BB962C8B-B14F-4D97-AF65-F5344CB8AC3E}">
-        <p14:creationId xmlns:p14="http://schemas.microsoft.com/office/powerpoint/2010/main" val="1707799828"/>
+        <p14:creationId xmlns:p14="http://schemas.microsoft.com/office/powerpoint/2010/main" val="4270665753"/>
       </p:ext>
     </p:extLst>
   </p:cSld>
@@ -1746,7 +1744,7 @@
     </p:spTree>
     <p:extLst>
       <p:ext uri="{BB962C8B-B14F-4D97-AF65-F5344CB8AC3E}">
-        <p14:creationId xmlns:p14="http://schemas.microsoft.com/office/powerpoint/2010/main" val="3443879051"/>
+        <p14:creationId xmlns:p14="http://schemas.microsoft.com/office/powerpoint/2010/main" val="1707799828"/>
       </p:ext>
     </p:extLst>
   </p:cSld>
@@ -1800,7 +1798,10 @@
           <a:bodyPr/>
           <a:lstStyle/>
           <a:p>
-            <a:endParaRPr lang="en-US" dirty="0"/>
+            <a:r>
+              <a:rPr lang="en-US" dirty="0"/>
+              <a:t>Documentation for regex in Perl can be found at http://perldoc.perl.org/perlre.html </a:t>
+            </a:r>
           </a:p>
         </p:txBody>
       </p:sp>
@@ -1896,7 +1897,7 @@
     </p:spTree>
     <p:extLst>
       <p:ext uri="{BB962C8B-B14F-4D97-AF65-F5344CB8AC3E}">
-        <p14:creationId xmlns:p14="http://schemas.microsoft.com/office/powerpoint/2010/main" val="2034081221"/>
+        <p14:creationId xmlns:p14="http://schemas.microsoft.com/office/powerpoint/2010/main" val="3443879051"/>
       </p:ext>
     </p:extLst>
   </p:cSld>
@@ -2046,7 +2047,7 @@
     </p:spTree>
     <p:extLst>
       <p:ext uri="{BB962C8B-B14F-4D97-AF65-F5344CB8AC3E}">
-        <p14:creationId xmlns:p14="http://schemas.microsoft.com/office/powerpoint/2010/main" val="3471844753"/>
+        <p14:creationId xmlns:p14="http://schemas.microsoft.com/office/powerpoint/2010/main" val="2034081221"/>
       </p:ext>
     </p:extLst>
   </p:cSld>
@@ -2196,7 +2197,7 @@
     </p:spTree>
     <p:extLst>
       <p:ext uri="{BB962C8B-B14F-4D97-AF65-F5344CB8AC3E}">
-        <p14:creationId xmlns:p14="http://schemas.microsoft.com/office/powerpoint/2010/main" val="121767707"/>
+        <p14:creationId xmlns:p14="http://schemas.microsoft.com/office/powerpoint/2010/main" val="3471844753"/>
       </p:ext>
     </p:extLst>
   </p:cSld>
@@ -2252,9 +2253,6 @@
           <a:p>
             <a:endParaRPr lang="en-US" dirty="0"/>
           </a:p>
-          <a:p>
-            <a:endParaRPr lang="en-US" dirty="0"/>
-          </a:p>
         </p:txBody>
       </p:sp>
       <p:sp>
@@ -2349,7 +2347,7 @@
     </p:spTree>
     <p:extLst>
       <p:ext uri="{BB962C8B-B14F-4D97-AF65-F5344CB8AC3E}">
-        <p14:creationId xmlns:p14="http://schemas.microsoft.com/office/powerpoint/2010/main" val="3736848920"/>
+        <p14:creationId xmlns:p14="http://schemas.microsoft.com/office/powerpoint/2010/main" val="121767707"/>
       </p:ext>
     </p:extLst>
   </p:cSld>
@@ -2652,7 +2650,7 @@
     </p:spTree>
     <p:extLst>
       <p:ext uri="{BB962C8B-B14F-4D97-AF65-F5344CB8AC3E}">
-        <p14:creationId xmlns:p14="http://schemas.microsoft.com/office/powerpoint/2010/main" val="3292289130"/>
+        <p14:creationId xmlns:p14="http://schemas.microsoft.com/office/powerpoint/2010/main" val="3736848920"/>
       </p:ext>
     </p:extLst>
   </p:cSld>
@@ -2805,7 +2803,7 @@
     </p:spTree>
     <p:extLst>
       <p:ext uri="{BB962C8B-B14F-4D97-AF65-F5344CB8AC3E}">
-        <p14:creationId xmlns:p14="http://schemas.microsoft.com/office/powerpoint/2010/main" val="1847563400"/>
+        <p14:creationId xmlns:p14="http://schemas.microsoft.com/office/powerpoint/2010/main" val="3292289130"/>
       </p:ext>
     </p:extLst>
   </p:cSld>
@@ -2861,6 +2859,9 @@
           <a:p>
             <a:endParaRPr lang="en-US" dirty="0"/>
           </a:p>
+          <a:p>
+            <a:endParaRPr lang="en-US" dirty="0"/>
+          </a:p>
         </p:txBody>
       </p:sp>
       <p:sp>
@@ -2955,7 +2956,7 @@
     </p:spTree>
     <p:extLst>
       <p:ext uri="{BB962C8B-B14F-4D97-AF65-F5344CB8AC3E}">
-        <p14:creationId xmlns:p14="http://schemas.microsoft.com/office/powerpoint/2010/main" val="1885773854"/>
+        <p14:creationId xmlns:p14="http://schemas.microsoft.com/office/powerpoint/2010/main" val="1847563400"/>
       </p:ext>
     </p:extLst>
   </p:cSld>
@@ -3011,9 +3012,6 @@
           <a:p>
             <a:endParaRPr lang="en-US" dirty="0"/>
           </a:p>
-          <a:p>
-            <a:endParaRPr lang="en-US" dirty="0"/>
-          </a:p>
         </p:txBody>
       </p:sp>
       <p:sp>
@@ -3108,7 +3106,7 @@
     </p:spTree>
     <p:extLst>
       <p:ext uri="{BB962C8B-B14F-4D97-AF65-F5344CB8AC3E}">
-        <p14:creationId xmlns:p14="http://schemas.microsoft.com/office/powerpoint/2010/main" val="955688559"/>
+        <p14:creationId xmlns:p14="http://schemas.microsoft.com/office/powerpoint/2010/main" val="1885773854"/>
       </p:ext>
     </p:extLst>
   </p:cSld>
@@ -3162,6 +3160,159 @@
           <a:bodyPr/>
           <a:lstStyle/>
           <a:p>
+            <a:endParaRPr lang="en-US" dirty="0"/>
+          </a:p>
+          <a:p>
+            <a:endParaRPr lang="en-US" dirty="0"/>
+          </a:p>
+        </p:txBody>
+      </p:sp>
+      <p:sp>
+        <p:nvSpPr>
+          <p:cNvPr id="4" name="Header Placeholder 3"/>
+          <p:cNvSpPr>
+            <a:spLocks noGrp="1"/>
+          </p:cNvSpPr>
+          <p:nvPr>
+            <p:ph type="hdr" sz="quarter" idx="10"/>
+          </p:nvPr>
+        </p:nvSpPr>
+        <p:spPr/>
+        <p:txBody>
+          <a:bodyPr/>
+          <a:lstStyle/>
+          <a:p>
+            <a:r>
+              <a:rPr lang="en-US"/>
+              <a:t> </a:t>
+            </a:r>
+          </a:p>
+        </p:txBody>
+      </p:sp>
+      <p:sp>
+        <p:nvSpPr>
+          <p:cNvPr id="5" name="Date Placeholder 4"/>
+          <p:cNvSpPr>
+            <a:spLocks noGrp="1"/>
+          </p:cNvSpPr>
+          <p:nvPr>
+            <p:ph type="dt" idx="11"/>
+          </p:nvPr>
+        </p:nvSpPr>
+        <p:spPr/>
+        <p:txBody>
+          <a:bodyPr/>
+          <a:lstStyle/>
+          <a:p>
+            <a:r>
+              <a:rPr lang="en-US"/>
+              <a:t>2016-05-27 </a:t>
+            </a:r>
+          </a:p>
+        </p:txBody>
+      </p:sp>
+      <p:sp>
+        <p:nvSpPr>
+          <p:cNvPr id="6" name="Footer Placeholder 5"/>
+          <p:cNvSpPr>
+            <a:spLocks noGrp="1"/>
+          </p:cNvSpPr>
+          <p:nvPr>
+            <p:ph type="ftr" sz="quarter" idx="12"/>
+          </p:nvPr>
+        </p:nvSpPr>
+        <p:spPr/>
+        <p:txBody>
+          <a:bodyPr/>
+          <a:lstStyle/>
+          <a:p>
+            <a:r>
+              <a:rPr lang="en-US"/>
+              <a:t> </a:t>
+            </a:r>
+          </a:p>
+        </p:txBody>
+      </p:sp>
+      <p:sp>
+        <p:nvSpPr>
+          <p:cNvPr id="7" name="Slide Number Placeholder 6"/>
+          <p:cNvSpPr>
+            <a:spLocks noGrp="1"/>
+          </p:cNvSpPr>
+          <p:nvPr>
+            <p:ph type="sldNum" sz="quarter" idx="13"/>
+          </p:nvPr>
+        </p:nvSpPr>
+        <p:spPr/>
+        <p:txBody>
+          <a:bodyPr/>
+          <a:lstStyle/>
+          <a:p>
+            <a:fld id="{61913804-9CC0-4B7A-8FDD-7B2337CA6D3C}" type="slidenum">
+              <a:rPr lang="en-US" smtClean="0"/>
+              <a:t>24</a:t>
+            </a:fld>
+            <a:endParaRPr lang="en-US"/>
+          </a:p>
+        </p:txBody>
+      </p:sp>
+    </p:spTree>
+    <p:extLst>
+      <p:ext uri="{BB962C8B-B14F-4D97-AF65-F5344CB8AC3E}">
+        <p14:creationId xmlns:p14="http://schemas.microsoft.com/office/powerpoint/2010/main" val="955688559"/>
+      </p:ext>
+    </p:extLst>
+  </p:cSld>
+  <p:clrMapOvr>
+    <a:masterClrMapping/>
+  </p:clrMapOvr>
+</p:notes>
+</file>
+
+<file path=ppt/notesSlides/notesSlide25.xml><?xml version="1.0" encoding="utf-8"?>
+<p:notes xmlns:a="http://schemas.openxmlformats.org/drawingml/2006/main" xmlns:r="http://schemas.openxmlformats.org/officeDocument/2006/relationships" xmlns:p="http://schemas.openxmlformats.org/presentationml/2006/main">
+  <p:cSld>
+    <p:spTree>
+      <p:nvGrpSpPr>
+        <p:cNvPr id="1" name=""/>
+        <p:cNvGrpSpPr/>
+        <p:nvPr/>
+      </p:nvGrpSpPr>
+      <p:grpSpPr>
+        <a:xfrm>
+          <a:off x="0" y="0"/>
+          <a:ext cx="0" cy="0"/>
+          <a:chOff x="0" y="0"/>
+          <a:chExt cx="0" cy="0"/>
+        </a:xfrm>
+      </p:grpSpPr>
+      <p:sp>
+        <p:nvSpPr>
+          <p:cNvPr id="2" name="Slide Image Placeholder 1"/>
+          <p:cNvSpPr>
+            <a:spLocks noGrp="1" noRot="1" noChangeAspect="1"/>
+          </p:cNvSpPr>
+          <p:nvPr>
+            <p:ph type="sldImg"/>
+          </p:nvPr>
+        </p:nvSpPr>
+        <p:spPr/>
+      </p:sp>
+      <p:sp>
+        <p:nvSpPr>
+          <p:cNvPr id="3" name="Notes Placeholder 2"/>
+          <p:cNvSpPr>
+            <a:spLocks noGrp="1"/>
+          </p:cNvSpPr>
+          <p:nvPr>
+            <p:ph type="body" idx="1"/>
+          </p:nvPr>
+        </p:nvSpPr>
+        <p:spPr/>
+        <p:txBody>
+          <a:bodyPr/>
+          <a:lstStyle/>
+          <a:p>
             <a:endParaRPr lang="en-US"/>
           </a:p>
         </p:txBody>
@@ -3249,7 +3400,7 @@
           <a:p>
             <a:fld id="{48E05FB9-EBA8-4E73-AB17-D7B3BC9BD9F0}" type="slidenum">
               <a:rPr lang="en-US" smtClean="0"/>
-              <a:t>24</a:t>
+              <a:t>25</a:t>
             </a:fld>
             <a:endParaRPr lang="en-US"/>
           </a:p>
@@ -3312,15 +3463,7 @@
           <a:bodyPr/>
           <a:lstStyle/>
           <a:p>
-            <a:r>
-              <a:rPr lang="en-US" dirty="0"/>
-              <a:t>This is almost true. In reality, arrays also exist.</a:t>
-            </a:r>
-            <a:r>
-              <a:rPr lang="en-US" baseline="0" dirty="0"/>
-              <a:t> They are similar to lists in many ways (and are often initialized with lists), but they are also different from lists in some respects. That will be outside of the scope in this presentation.</a:t>
-            </a:r>
-            <a:endParaRPr lang="en-US" dirty="0"/>
+            <a:endParaRPr lang="en-US"/>
           </a:p>
         </p:txBody>
       </p:sp>
@@ -3405,7 +3548,7 @@
           <a:bodyPr/>
           <a:lstStyle/>
           <a:p>
-            <a:fld id="{3A8FF56E-929E-4AA0-919B-032F7BCF3308}" type="slidenum">
+            <a:fld id="{7ABB4D47-FBB3-497A-A3DB-58CE9FC6882D}" type="slidenum">
               <a:rPr lang="en-US" smtClean="0"/>
               <a:t>3</a:t>
             </a:fld>
@@ -3416,7 +3559,7 @@
     </p:spTree>
     <p:extLst>
       <p:ext uri="{BB962C8B-B14F-4D97-AF65-F5344CB8AC3E}">
-        <p14:creationId xmlns:p14="http://schemas.microsoft.com/office/powerpoint/2010/main" val="3385781891"/>
+        <p14:creationId xmlns:p14="http://schemas.microsoft.com/office/powerpoint/2010/main" val="2931227019"/>
       </p:ext>
     </p:extLst>
   </p:cSld>
@@ -3470,7 +3613,15 @@
           <a:bodyPr/>
           <a:lstStyle/>
           <a:p>
-            <a:endParaRPr lang="en-US"/>
+            <a:r>
+              <a:rPr lang="en-US" dirty="0"/>
+              <a:t>This is almost true. In reality, arrays also exist.</a:t>
+            </a:r>
+            <a:r>
+              <a:rPr lang="en-US" baseline="0" dirty="0"/>
+              <a:t> They are similar to lists in many ways (and are often initialized with lists), but they are also different from lists in some respects. That will be outside of the scope in this presentation.</a:t>
+            </a:r>
+            <a:endParaRPr lang="en-US" dirty="0"/>
           </a:p>
         </p:txBody>
       </p:sp>
@@ -3555,7 +3706,7 @@
           <a:bodyPr/>
           <a:lstStyle/>
           <a:p>
-            <a:fld id="{8EC02691-6C57-4ABD-A2CD-D688C943D02C}" type="slidenum">
+            <a:fld id="{3A8FF56E-929E-4AA0-919B-032F7BCF3308}" type="slidenum">
               <a:rPr lang="en-US" smtClean="0"/>
               <a:t>4</a:t>
             </a:fld>
@@ -3566,7 +3717,7 @@
     </p:spTree>
     <p:extLst>
       <p:ext uri="{BB962C8B-B14F-4D97-AF65-F5344CB8AC3E}">
-        <p14:creationId xmlns:p14="http://schemas.microsoft.com/office/powerpoint/2010/main" val="931003275"/>
+        <p14:creationId xmlns:p14="http://schemas.microsoft.com/office/powerpoint/2010/main" val="3385781891"/>
       </p:ext>
     </p:extLst>
   </p:cSld>
@@ -3705,7 +3856,7 @@
           <a:bodyPr/>
           <a:lstStyle/>
           <a:p>
-            <a:fld id="{064EF27A-C515-4DD0-9A01-6E12F8B88481}" type="slidenum">
+            <a:fld id="{8EC02691-6C57-4ABD-A2CD-D688C943D02C}" type="slidenum">
               <a:rPr lang="en-US" smtClean="0"/>
               <a:t>5</a:t>
             </a:fld>
@@ -3716,7 +3867,7 @@
     </p:spTree>
     <p:extLst>
       <p:ext uri="{BB962C8B-B14F-4D97-AF65-F5344CB8AC3E}">
-        <p14:creationId xmlns:p14="http://schemas.microsoft.com/office/powerpoint/2010/main" val="781026981"/>
+        <p14:creationId xmlns:p14="http://schemas.microsoft.com/office/powerpoint/2010/main" val="931003275"/>
       </p:ext>
     </p:extLst>
   </p:cSld>
@@ -3855,7 +4006,7 @@
           <a:bodyPr/>
           <a:lstStyle/>
           <a:p>
-            <a:fld id="{26E7ADD0-A0BA-4A04-AF04-81A6B3147999}" type="slidenum">
+            <a:fld id="{064EF27A-C515-4DD0-9A01-6E12F8B88481}" type="slidenum">
               <a:rPr lang="en-US" smtClean="0"/>
               <a:t>6</a:t>
             </a:fld>
@@ -3866,7 +4017,7 @@
     </p:spTree>
     <p:extLst>
       <p:ext uri="{BB962C8B-B14F-4D97-AF65-F5344CB8AC3E}">
-        <p14:creationId xmlns:p14="http://schemas.microsoft.com/office/powerpoint/2010/main" val="1265711207"/>
+        <p14:creationId xmlns:p14="http://schemas.microsoft.com/office/powerpoint/2010/main" val="781026981"/>
       </p:ext>
     </p:extLst>
   </p:cSld>
@@ -4016,7 +4167,7 @@
     </p:spTree>
     <p:extLst>
       <p:ext uri="{BB962C8B-B14F-4D97-AF65-F5344CB8AC3E}">
-        <p14:creationId xmlns:p14="http://schemas.microsoft.com/office/powerpoint/2010/main" val="2365305772"/>
+        <p14:creationId xmlns:p14="http://schemas.microsoft.com/office/powerpoint/2010/main" val="1265711207"/>
       </p:ext>
     </p:extLst>
   </p:cSld>
@@ -4166,7 +4317,7 @@
     </p:spTree>
     <p:extLst>
       <p:ext uri="{BB962C8B-B14F-4D97-AF65-F5344CB8AC3E}">
-        <p14:creationId xmlns:p14="http://schemas.microsoft.com/office/powerpoint/2010/main" val="2034204513"/>
+        <p14:creationId xmlns:p14="http://schemas.microsoft.com/office/powerpoint/2010/main" val="2365305772"/>
       </p:ext>
     </p:extLst>
   </p:cSld>
@@ -4316,7 +4467,7 @@
     </p:spTree>
     <p:extLst>
       <p:ext uri="{BB962C8B-B14F-4D97-AF65-F5344CB8AC3E}">
-        <p14:creationId xmlns:p14="http://schemas.microsoft.com/office/powerpoint/2010/main" val="4032562643"/>
+        <p14:creationId xmlns:p14="http://schemas.microsoft.com/office/powerpoint/2010/main" val="2034204513"/>
       </p:ext>
     </p:extLst>
   </p:cSld>
@@ -9004,6 +9155,383 @@
         </p:nvSpPr>
         <p:spPr bwMode="auto">
           <a:xfrm>
+            <a:off x="524935" y="3418449"/>
+            <a:ext cx="11140018" cy="2532185"/>
+          </a:xfrm>
+          <a:prstGeom prst="roundRect">
+            <a:avLst/>
+          </a:prstGeom>
+          <a:solidFill>
+            <a:srgbClr val="272822"/>
+          </a:solidFill>
+          <a:ln w="12700" cap="flat" cmpd="sng" algn="ctr">
+            <a:noFill/>
+            <a:prstDash val="solid"/>
+            <a:round/>
+            <a:headEnd type="none" w="med" len="med"/>
+            <a:tailEnd type="none" w="med" len="med"/>
+          </a:ln>
+          <a:effectLst/>
+        </p:spPr>
+        <p:txBody>
+          <a:bodyPr vert="horz" wrap="none" lIns="72000" tIns="45720" rIns="72000" bIns="45720" numCol="1" rtlCol="0" anchor="t" anchorCtr="0" compatLnSpc="1">
+            <a:prstTxWarp prst="textNoShape">
+              <a:avLst/>
+            </a:prstTxWarp>
+          </a:bodyPr>
+          <a:lstStyle/>
+          <a:p>
+            <a:pPr marL="0" marR="0" indent="0" algn="l" defTabSz="914400" rtl="0" eaLnBrk="1" fontAlgn="base" latinLnBrk="0" hangingPunct="1">
+              <a:lnSpc>
+                <a:spcPct val="100000"/>
+              </a:lnSpc>
+              <a:spcBef>
+                <a:spcPct val="50000"/>
+              </a:spcBef>
+              <a:spcAft>
+                <a:spcPct val="0"/>
+              </a:spcAft>
+              <a:buClrTx/>
+              <a:buSzTx/>
+              <a:buFontTx/>
+              <a:buNone/>
+              <a:tabLst/>
+            </a:pPr>
+            <a:endParaRPr kumimoji="0" lang="en-US" sz="2000" b="0" i="0" u="none" strike="noStrike" cap="none" normalizeH="0" baseline="0" dirty="0">
+              <a:ln>
+                <a:noFill/>
+              </a:ln>
+              <a:solidFill>
+                <a:schemeClr val="tx1"/>
+              </a:solidFill>
+              <a:effectLst/>
+              <a:latin typeface="Arial" charset="0"/>
+            </a:endParaRPr>
+          </a:p>
+        </p:txBody>
+      </p:sp>
+      <p:sp>
+        <p:nvSpPr>
+          <p:cNvPr id="6" name="Content Placeholder 2"/>
+          <p:cNvSpPr>
+            <a:spLocks noGrp="1"/>
+          </p:cNvSpPr>
+          <p:nvPr>
+            <p:ph idx="1"/>
+          </p:nvPr>
+        </p:nvSpPr>
+        <p:spPr>
+          <a:xfrm>
+            <a:off x="529168" y="1110685"/>
+            <a:ext cx="11135785" cy="3852000"/>
+          </a:xfrm>
+          <a:ln>
+            <a:noFill/>
+          </a:ln>
+        </p:spPr>
+        <p:txBody>
+          <a:bodyPr/>
+          <a:lstStyle/>
+          <a:p>
+            <a:r>
+              <a:rPr lang="sv-SE" dirty="0"/>
+              <a:t>All </a:t>
+            </a:r>
+            <a:r>
+              <a:rPr lang="sv-SE" dirty="0" err="1"/>
+              <a:t>statements</a:t>
+            </a:r>
+            <a:r>
+              <a:rPr lang="sv-SE" dirty="0"/>
+              <a:t> </a:t>
+            </a:r>
+            <a:r>
+              <a:rPr lang="sv-SE" dirty="0" err="1"/>
+              <a:t>are</a:t>
+            </a:r>
+            <a:r>
+              <a:rPr lang="sv-SE" dirty="0"/>
+              <a:t> </a:t>
+            </a:r>
+            <a:r>
+              <a:rPr lang="sv-SE" dirty="0" err="1"/>
+              <a:t>terminated</a:t>
+            </a:r>
+            <a:r>
+              <a:rPr lang="sv-SE" dirty="0"/>
+              <a:t> </a:t>
+            </a:r>
+            <a:r>
+              <a:rPr lang="sv-SE" dirty="0" err="1"/>
+              <a:t>with</a:t>
+            </a:r>
+            <a:r>
+              <a:rPr lang="sv-SE" dirty="0"/>
+              <a:t> </a:t>
+            </a:r>
+            <a:r>
+              <a:rPr lang="sv-SE" dirty="0" err="1"/>
+              <a:t>semicolons</a:t>
+            </a:r>
+            <a:r>
+              <a:rPr lang="sv-SE" dirty="0"/>
+              <a:t>, </a:t>
+            </a:r>
+            <a:r>
+              <a:rPr lang="sv-SE" dirty="0">
+                <a:latin typeface="Consolas" panose="020B0609020204030204" pitchFamily="49" charset="0"/>
+                <a:cs typeface="Consolas" panose="020B0609020204030204" pitchFamily="49" charset="0"/>
+              </a:rPr>
+              <a:t>;</a:t>
+            </a:r>
+          </a:p>
+          <a:p>
+            <a:r>
+              <a:rPr lang="sv-SE" dirty="0"/>
+              <a:t>Strings </a:t>
+            </a:r>
+            <a:r>
+              <a:rPr lang="sv-SE" dirty="0" err="1"/>
+              <a:t>surrounded</a:t>
+            </a:r>
+            <a:r>
+              <a:rPr lang="sv-SE" dirty="0"/>
+              <a:t> </a:t>
+            </a:r>
+            <a:r>
+              <a:rPr lang="sv-SE" dirty="0" err="1"/>
+              <a:t>with</a:t>
+            </a:r>
+            <a:r>
+              <a:rPr lang="sv-SE" dirty="0"/>
+              <a:t> </a:t>
+            </a:r>
+            <a:r>
+              <a:rPr lang="sv-SE" dirty="0" err="1"/>
+              <a:t>single</a:t>
+            </a:r>
+            <a:r>
+              <a:rPr lang="sv-SE" dirty="0"/>
+              <a:t> </a:t>
+            </a:r>
+            <a:r>
+              <a:rPr lang="sv-SE" dirty="0" err="1"/>
+              <a:t>quotes</a:t>
+            </a:r>
+            <a:r>
+              <a:rPr lang="sv-SE" dirty="0"/>
+              <a:t> </a:t>
+            </a:r>
+            <a:r>
+              <a:rPr lang="sv-SE" dirty="0" err="1"/>
+              <a:t>are</a:t>
+            </a:r>
+            <a:r>
+              <a:rPr lang="sv-SE" dirty="0"/>
+              <a:t> taken </a:t>
+            </a:r>
+            <a:r>
+              <a:rPr lang="sv-SE" dirty="0" err="1"/>
+              <a:t>literally</a:t>
+            </a:r>
+            <a:r>
+              <a:rPr lang="sv-SE" dirty="0"/>
+              <a:t>. Double </a:t>
+            </a:r>
+            <a:r>
+              <a:rPr lang="sv-SE" dirty="0" err="1"/>
+              <a:t>quotes</a:t>
+            </a:r>
+            <a:r>
+              <a:rPr lang="sv-SE" dirty="0"/>
+              <a:t> </a:t>
+            </a:r>
+            <a:r>
+              <a:rPr lang="sv-SE" dirty="0" err="1"/>
+              <a:t>will</a:t>
+            </a:r>
+            <a:r>
+              <a:rPr lang="sv-SE" dirty="0"/>
+              <a:t> </a:t>
+            </a:r>
+            <a:r>
+              <a:rPr lang="sv-SE" dirty="0" err="1"/>
+              <a:t>expand</a:t>
+            </a:r>
+            <a:r>
+              <a:rPr lang="sv-SE" dirty="0"/>
+              <a:t> </a:t>
+            </a:r>
+            <a:r>
+              <a:rPr lang="sv-SE" dirty="0" err="1"/>
+              <a:t>variables</a:t>
+            </a:r>
+            <a:r>
+              <a:rPr lang="sv-SE" dirty="0"/>
+              <a:t>.</a:t>
+            </a:r>
+          </a:p>
+          <a:p>
+            <a:r>
+              <a:rPr lang="sv-SE" dirty="0"/>
+              <a:t>A </a:t>
+            </a:r>
+            <a:r>
+              <a:rPr lang="sv-SE" dirty="0" err="1"/>
+              <a:t>value</a:t>
+            </a:r>
+            <a:r>
+              <a:rPr lang="sv-SE" dirty="0"/>
+              <a:t> in a list is a </a:t>
+            </a:r>
+            <a:r>
+              <a:rPr lang="sv-SE" dirty="0" err="1"/>
+              <a:t>scalar</a:t>
+            </a:r>
+            <a:r>
+              <a:rPr lang="sv-SE" dirty="0"/>
+              <a:t>, </a:t>
+            </a:r>
+            <a:r>
+              <a:rPr lang="sv-SE" dirty="0" err="1"/>
+              <a:t>therefore</a:t>
+            </a:r>
+            <a:r>
+              <a:rPr lang="sv-SE" dirty="0"/>
+              <a:t> </a:t>
+            </a:r>
+            <a:r>
+              <a:rPr lang="sv-SE" dirty="0" err="1"/>
+              <a:t>when</a:t>
+            </a:r>
+            <a:r>
+              <a:rPr lang="sv-SE" dirty="0"/>
+              <a:t> </a:t>
+            </a:r>
+            <a:r>
+              <a:rPr lang="sv-SE" dirty="0" err="1"/>
+              <a:t>they</a:t>
+            </a:r>
+            <a:r>
+              <a:rPr lang="sv-SE" dirty="0"/>
+              <a:t> </a:t>
+            </a:r>
+            <a:r>
+              <a:rPr lang="sv-SE" dirty="0" err="1"/>
+              <a:t>are</a:t>
+            </a:r>
+            <a:r>
+              <a:rPr lang="sv-SE" dirty="0"/>
+              <a:t> </a:t>
+            </a:r>
+            <a:r>
+              <a:rPr lang="sv-SE" dirty="0" err="1"/>
+              <a:t>referred</a:t>
+            </a:r>
+            <a:r>
+              <a:rPr lang="sv-SE" dirty="0"/>
+              <a:t> to, the </a:t>
+            </a:r>
+            <a:r>
+              <a:rPr lang="sv-SE" dirty="0" err="1"/>
+              <a:t>scalar</a:t>
+            </a:r>
+            <a:r>
+              <a:rPr lang="sv-SE" dirty="0"/>
+              <a:t> </a:t>
+            </a:r>
+            <a:r>
+              <a:rPr lang="sv-SE" dirty="0" err="1"/>
+              <a:t>character</a:t>
+            </a:r>
+            <a:r>
+              <a:rPr lang="sv-SE" dirty="0"/>
+              <a:t> </a:t>
+            </a:r>
+            <a:r>
+              <a:rPr lang="sv-SE" dirty="0">
+                <a:latin typeface="Consolas" panose="020B0609020204030204" pitchFamily="49" charset="0"/>
+                <a:cs typeface="Consolas" panose="020B0609020204030204" pitchFamily="49" charset="0"/>
+              </a:rPr>
+              <a:t>$</a:t>
+            </a:r>
+            <a:r>
+              <a:rPr lang="sv-SE" dirty="0"/>
+              <a:t> is </a:t>
+            </a:r>
+            <a:r>
+              <a:rPr lang="sv-SE" dirty="0" err="1"/>
+              <a:t>used</a:t>
+            </a:r>
+            <a:r>
+              <a:rPr lang="sv-SE" dirty="0"/>
+              <a:t>. </a:t>
+            </a:r>
+          </a:p>
+        </p:txBody>
+      </p:sp>
+      <p:pic>
+        <p:nvPicPr>
+          <p:cNvPr id="7" name="Picture 6"/>
+          <p:cNvPicPr>
+            <a:picLocks noChangeAspect="1"/>
+          </p:cNvPicPr>
+          <p:nvPr/>
+        </p:nvPicPr>
+        <p:blipFill>
+          <a:blip r:embed="rId3"/>
+          <a:stretch>
+            <a:fillRect/>
+          </a:stretch>
+        </p:blipFill>
+        <p:spPr>
+          <a:xfrm>
+            <a:off x="669641" y="3715362"/>
+            <a:ext cx="10010775" cy="1962150"/>
+          </a:xfrm>
+          <a:prstGeom prst="rect">
+            <a:avLst/>
+          </a:prstGeom>
+        </p:spPr>
+      </p:pic>
+    </p:spTree>
+    <p:extLst>
+      <p:ext uri="{BB962C8B-B14F-4D97-AF65-F5344CB8AC3E}">
+        <p14:creationId xmlns:p14="http://schemas.microsoft.com/office/powerpoint/2010/main" val="2215112199"/>
+      </p:ext>
+    </p:extLst>
+  </p:cSld>
+  <p:clrMapOvr>
+    <a:masterClrMapping/>
+  </p:clrMapOvr>
+</p:sld>
+</file>
+
+<file path=ppt/slides/slide11.xml><?xml version="1.0" encoding="utf-8"?>
+<p:sld xmlns:a="http://schemas.openxmlformats.org/drawingml/2006/main" xmlns:r="http://schemas.openxmlformats.org/officeDocument/2006/relationships" xmlns:p="http://schemas.openxmlformats.org/presentationml/2006/main">
+  <p:cSld>
+    <p:spTree>
+      <p:nvGrpSpPr>
+        <p:cNvPr id="1" name=""/>
+        <p:cNvGrpSpPr/>
+        <p:nvPr/>
+      </p:nvGrpSpPr>
+      <p:grpSpPr>
+        <a:xfrm>
+          <a:off x="0" y="0"/>
+          <a:ext cx="0" cy="0"/>
+          <a:chOff x="0" y="0"/>
+          <a:chExt cx="0" cy="0"/>
+        </a:xfrm>
+      </p:grpSpPr>
+      <p:sp>
+        <p:nvSpPr>
+          <p:cNvPr id="8" name="Rounded Rectangle 7"/>
+          <p:cNvSpPr/>
+          <p:nvPr/>
+        </p:nvSpPr>
+        <p:spPr bwMode="auto">
+          <a:xfrm>
             <a:off x="529167" y="3052689"/>
             <a:ext cx="11135785" cy="3353739"/>
           </a:xfrm>
@@ -9290,7 +9818,7 @@
 </p:sld>
 </file>
 
-<file path=ppt/slides/slide11.xml><?xml version="1.0" encoding="utf-8"?>
+<file path=ppt/slides/slide12.xml><?xml version="1.0" encoding="utf-8"?>
 <p:sld xmlns:a="http://schemas.openxmlformats.org/drawingml/2006/main" xmlns:r="http://schemas.openxmlformats.org/officeDocument/2006/relationships" xmlns:p="http://schemas.openxmlformats.org/presentationml/2006/main">
   <p:cSld>
     <p:spTree>
@@ -9489,328 +10017,6 @@
 </p:sld>
 </file>
 
-<file path=ppt/slides/slide12.xml><?xml version="1.0" encoding="utf-8"?>
-<p:sld xmlns:a="http://schemas.openxmlformats.org/drawingml/2006/main" xmlns:r="http://schemas.openxmlformats.org/officeDocument/2006/relationships" xmlns:p="http://schemas.openxmlformats.org/presentationml/2006/main">
-  <p:cSld>
-    <p:spTree>
-      <p:nvGrpSpPr>
-        <p:cNvPr id="1" name=""/>
-        <p:cNvGrpSpPr/>
-        <p:nvPr/>
-      </p:nvGrpSpPr>
-      <p:grpSpPr>
-        <a:xfrm>
-          <a:off x="0" y="0"/>
-          <a:ext cx="0" cy="0"/>
-          <a:chOff x="0" y="0"/>
-          <a:chExt cx="0" cy="0"/>
-        </a:xfrm>
-      </p:grpSpPr>
-      <p:sp>
-        <p:nvSpPr>
-          <p:cNvPr id="6" name="Content Placeholder 2"/>
-          <p:cNvSpPr>
-            <a:spLocks noGrp="1"/>
-          </p:cNvSpPr>
-          <p:nvPr>
-            <p:ph idx="1"/>
-          </p:nvPr>
-        </p:nvSpPr>
-        <p:spPr>
-          <a:xfrm>
-            <a:off x="529166" y="972701"/>
-            <a:ext cx="11135785" cy="5118610"/>
-          </a:xfrm>
-          <a:ln>
-            <a:noFill/>
-          </a:ln>
-        </p:spPr>
-        <p:txBody>
-          <a:bodyPr/>
-          <a:lstStyle/>
-          <a:p>
-            <a:r>
-              <a:rPr lang="sv-SE" dirty="0" err="1"/>
-              <a:t>Subroutines</a:t>
-            </a:r>
-            <a:r>
-              <a:rPr lang="sv-SE" dirty="0"/>
-              <a:t> </a:t>
-            </a:r>
-            <a:r>
-              <a:rPr lang="sv-SE" dirty="0" err="1"/>
-              <a:t>terminate</a:t>
-            </a:r>
-            <a:r>
-              <a:rPr lang="sv-SE" dirty="0"/>
-              <a:t> </a:t>
-            </a:r>
-            <a:r>
-              <a:rPr lang="sv-SE" dirty="0" err="1"/>
-              <a:t>when</a:t>
-            </a:r>
-            <a:r>
-              <a:rPr lang="sv-SE" dirty="0"/>
-              <a:t> </a:t>
-            </a:r>
-            <a:r>
-              <a:rPr lang="sv-SE" dirty="0" err="1"/>
-              <a:t>they</a:t>
-            </a:r>
-            <a:r>
-              <a:rPr lang="sv-SE" dirty="0"/>
-              <a:t> </a:t>
-            </a:r>
-            <a:r>
-              <a:rPr lang="sv-SE" dirty="0" err="1"/>
-              <a:t>encounter</a:t>
-            </a:r>
-            <a:r>
-              <a:rPr lang="sv-SE" dirty="0"/>
-              <a:t> a "</a:t>
-            </a:r>
-            <a:r>
-              <a:rPr lang="sv-SE" dirty="0" err="1"/>
-              <a:t>return</a:t>
-            </a:r>
-            <a:r>
-              <a:rPr lang="sv-SE" dirty="0"/>
-              <a:t>" </a:t>
-            </a:r>
-            <a:r>
-              <a:rPr lang="sv-SE" dirty="0" err="1"/>
-              <a:t>statement</a:t>
-            </a:r>
-            <a:r>
-              <a:rPr lang="sv-SE" dirty="0"/>
-              <a:t>. </a:t>
-            </a:r>
-            <a:r>
-              <a:rPr lang="sv-SE" dirty="0" err="1"/>
-              <a:t>Whatever</a:t>
-            </a:r>
-            <a:r>
-              <a:rPr lang="sv-SE" dirty="0"/>
-              <a:t> expression is </a:t>
-            </a:r>
-            <a:r>
-              <a:rPr lang="sv-SE" dirty="0" err="1"/>
-              <a:t>after</a:t>
-            </a:r>
-            <a:r>
-              <a:rPr lang="sv-SE" dirty="0"/>
-              <a:t> </a:t>
-            </a:r>
-            <a:r>
-              <a:rPr lang="sv-SE" dirty="0" err="1"/>
-              <a:t>return</a:t>
-            </a:r>
-            <a:r>
-              <a:rPr lang="sv-SE" dirty="0"/>
-              <a:t>, </a:t>
-            </a:r>
-            <a:r>
-              <a:rPr lang="sv-SE" dirty="0" err="1"/>
-              <a:t>will</a:t>
-            </a:r>
-            <a:r>
-              <a:rPr lang="sv-SE" dirty="0"/>
-              <a:t> be </a:t>
-            </a:r>
-            <a:r>
-              <a:rPr lang="sv-SE" dirty="0" err="1"/>
-              <a:t>returned</a:t>
-            </a:r>
-            <a:r>
-              <a:rPr lang="sv-SE" dirty="0"/>
-              <a:t> to the </a:t>
-            </a:r>
-            <a:r>
-              <a:rPr lang="sv-SE" dirty="0" err="1"/>
-              <a:t>calling</a:t>
-            </a:r>
-            <a:r>
-              <a:rPr lang="sv-SE" dirty="0"/>
-              <a:t> </a:t>
-            </a:r>
-            <a:r>
-              <a:rPr lang="sv-SE" dirty="0" err="1"/>
-              <a:t>routine</a:t>
-            </a:r>
-            <a:r>
-              <a:rPr lang="sv-SE" dirty="0"/>
-              <a:t>.</a:t>
-            </a:r>
-          </a:p>
-          <a:p>
-            <a:endParaRPr lang="sv-SE" dirty="0"/>
-          </a:p>
-          <a:p>
-            <a:r>
-              <a:rPr lang="sv-SE" dirty="0"/>
-              <a:t>If a </a:t>
-            </a:r>
-            <a:r>
-              <a:rPr lang="sv-SE" dirty="0" err="1"/>
-              <a:t>return</a:t>
-            </a:r>
-            <a:r>
-              <a:rPr lang="sv-SE" dirty="0"/>
-              <a:t> </a:t>
-            </a:r>
-            <a:r>
-              <a:rPr lang="sv-SE" dirty="0" err="1"/>
-              <a:t>statement</a:t>
-            </a:r>
-            <a:r>
-              <a:rPr lang="sv-SE" dirty="0"/>
-              <a:t> is </a:t>
-            </a:r>
-            <a:r>
-              <a:rPr lang="sv-SE" dirty="0" err="1"/>
-              <a:t>missing</a:t>
-            </a:r>
-            <a:r>
-              <a:rPr lang="sv-SE" dirty="0"/>
-              <a:t>, the last </a:t>
-            </a:r>
-            <a:r>
-              <a:rPr lang="sv-SE" dirty="0" err="1"/>
-              <a:t>evaluated</a:t>
-            </a:r>
-            <a:r>
-              <a:rPr lang="sv-SE" dirty="0"/>
-              <a:t> </a:t>
-            </a:r>
-            <a:r>
-              <a:rPr lang="sv-SE" dirty="0" err="1"/>
-              <a:t>value</a:t>
-            </a:r>
-            <a:r>
-              <a:rPr lang="sv-SE" dirty="0"/>
-              <a:t> is </a:t>
-            </a:r>
-            <a:r>
-              <a:rPr lang="sv-SE" dirty="0" err="1"/>
-              <a:t>returned</a:t>
-            </a:r>
-            <a:r>
-              <a:rPr lang="sv-SE" dirty="0"/>
-              <a:t>.</a:t>
-            </a:r>
-          </a:p>
-          <a:p>
-            <a:endParaRPr lang="sv-SE" dirty="0"/>
-          </a:p>
-          <a:p>
-            <a:r>
-              <a:rPr lang="sv-SE" dirty="0" err="1"/>
-              <a:t>That</a:t>
-            </a:r>
-            <a:r>
-              <a:rPr lang="sv-SE" dirty="0"/>
-              <a:t> </a:t>
-            </a:r>
-            <a:r>
-              <a:rPr lang="sv-SE" dirty="0" err="1"/>
-              <a:t>was</a:t>
-            </a:r>
-            <a:r>
-              <a:rPr lang="sv-SE" dirty="0"/>
-              <a:t> the </a:t>
-            </a:r>
-            <a:r>
-              <a:rPr lang="sv-SE" dirty="0" err="1"/>
-              <a:t>quick</a:t>
-            </a:r>
-            <a:r>
-              <a:rPr lang="sv-SE" dirty="0"/>
-              <a:t> version </a:t>
-            </a:r>
-            <a:r>
-              <a:rPr lang="sv-SE" dirty="0" err="1"/>
-              <a:t>of</a:t>
-            </a:r>
-            <a:r>
-              <a:rPr lang="sv-SE" dirty="0"/>
-              <a:t> Perl syntax. </a:t>
-            </a:r>
-            <a:r>
-              <a:rPr lang="sv-SE" dirty="0" err="1"/>
-              <a:t>Much</a:t>
-            </a:r>
-            <a:r>
-              <a:rPr lang="sv-SE" dirty="0"/>
-              <a:t> </a:t>
-            </a:r>
-            <a:r>
-              <a:rPr lang="sv-SE" dirty="0" err="1"/>
-              <a:t>more</a:t>
-            </a:r>
-            <a:r>
-              <a:rPr lang="sv-SE" dirty="0"/>
-              <a:t> is </a:t>
-            </a:r>
-            <a:r>
-              <a:rPr lang="sv-SE" dirty="0" err="1"/>
-              <a:t>available</a:t>
-            </a:r>
-            <a:r>
-              <a:rPr lang="sv-SE" dirty="0"/>
-              <a:t> in the Perl </a:t>
-            </a:r>
-            <a:r>
-              <a:rPr lang="sv-SE" dirty="0" err="1"/>
-              <a:t>documentation</a:t>
-            </a:r>
-            <a:r>
-              <a:rPr lang="sv-SE" dirty="0"/>
-              <a:t>, </a:t>
-            </a:r>
-            <a:r>
-              <a:rPr lang="sv-SE" dirty="0">
-                <a:hlinkClick r:id="rId3"/>
-              </a:rPr>
-              <a:t>http://perldoc.perl.org/</a:t>
-            </a:r>
-            <a:r>
-              <a:rPr lang="sv-SE" dirty="0"/>
-              <a:t> </a:t>
-            </a:r>
-          </a:p>
-          <a:p>
-            <a:endParaRPr lang="sv-SE" dirty="0"/>
-          </a:p>
-          <a:p>
-            <a:endParaRPr lang="sv-SE" dirty="0"/>
-          </a:p>
-          <a:p>
-            <a:endParaRPr lang="sv-SE" dirty="0"/>
-          </a:p>
-          <a:p>
-            <a:endParaRPr lang="sv-SE" dirty="0"/>
-          </a:p>
-          <a:p>
-            <a:endParaRPr lang="sv-SE" dirty="0"/>
-          </a:p>
-          <a:p>
-            <a:endParaRPr lang="sv-SE" dirty="0"/>
-          </a:p>
-        </p:txBody>
-      </p:sp>
-    </p:spTree>
-    <p:extLst>
-      <p:ext uri="{BB962C8B-B14F-4D97-AF65-F5344CB8AC3E}">
-        <p14:creationId xmlns:p14="http://schemas.microsoft.com/office/powerpoint/2010/main" val="481837147"/>
-      </p:ext>
-    </p:extLst>
-  </p:cSld>
-  <p:clrMapOvr>
-    <a:masterClrMapping/>
-  </p:clrMapOvr>
-</p:sld>
-</file>
-
 <file path=ppt/slides/slide13.xml><?xml version="1.0" encoding="utf-8"?>
 <p:sld xmlns:a="http://schemas.openxmlformats.org/drawingml/2006/main" xmlns:r="http://schemas.openxmlformats.org/officeDocument/2006/relationships" xmlns:p="http://schemas.openxmlformats.org/presentationml/2006/main">
   <p:cSld>
@@ -9830,6 +10036,328 @@
       </p:grpSpPr>
       <p:sp>
         <p:nvSpPr>
+          <p:cNvPr id="6" name="Content Placeholder 2"/>
+          <p:cNvSpPr>
+            <a:spLocks noGrp="1"/>
+          </p:cNvSpPr>
+          <p:nvPr>
+            <p:ph idx="1"/>
+          </p:nvPr>
+        </p:nvSpPr>
+        <p:spPr>
+          <a:xfrm>
+            <a:off x="529166" y="972701"/>
+            <a:ext cx="11135785" cy="5118610"/>
+          </a:xfrm>
+          <a:ln>
+            <a:noFill/>
+          </a:ln>
+        </p:spPr>
+        <p:txBody>
+          <a:bodyPr/>
+          <a:lstStyle/>
+          <a:p>
+            <a:r>
+              <a:rPr lang="sv-SE" dirty="0" err="1"/>
+              <a:t>Subroutines</a:t>
+            </a:r>
+            <a:r>
+              <a:rPr lang="sv-SE" dirty="0"/>
+              <a:t> </a:t>
+            </a:r>
+            <a:r>
+              <a:rPr lang="sv-SE" dirty="0" err="1"/>
+              <a:t>terminate</a:t>
+            </a:r>
+            <a:r>
+              <a:rPr lang="sv-SE" dirty="0"/>
+              <a:t> </a:t>
+            </a:r>
+            <a:r>
+              <a:rPr lang="sv-SE" dirty="0" err="1"/>
+              <a:t>when</a:t>
+            </a:r>
+            <a:r>
+              <a:rPr lang="sv-SE" dirty="0"/>
+              <a:t> </a:t>
+            </a:r>
+            <a:r>
+              <a:rPr lang="sv-SE" dirty="0" err="1"/>
+              <a:t>they</a:t>
+            </a:r>
+            <a:r>
+              <a:rPr lang="sv-SE" dirty="0"/>
+              <a:t> </a:t>
+            </a:r>
+            <a:r>
+              <a:rPr lang="sv-SE" dirty="0" err="1"/>
+              <a:t>encounter</a:t>
+            </a:r>
+            <a:r>
+              <a:rPr lang="sv-SE" dirty="0"/>
+              <a:t> a "</a:t>
+            </a:r>
+            <a:r>
+              <a:rPr lang="sv-SE" dirty="0" err="1"/>
+              <a:t>return</a:t>
+            </a:r>
+            <a:r>
+              <a:rPr lang="sv-SE" dirty="0"/>
+              <a:t>" </a:t>
+            </a:r>
+            <a:r>
+              <a:rPr lang="sv-SE" dirty="0" err="1"/>
+              <a:t>statement</a:t>
+            </a:r>
+            <a:r>
+              <a:rPr lang="sv-SE" dirty="0"/>
+              <a:t>. </a:t>
+            </a:r>
+            <a:r>
+              <a:rPr lang="sv-SE" dirty="0" err="1"/>
+              <a:t>Whatever</a:t>
+            </a:r>
+            <a:r>
+              <a:rPr lang="sv-SE" dirty="0"/>
+              <a:t> expression is </a:t>
+            </a:r>
+            <a:r>
+              <a:rPr lang="sv-SE" dirty="0" err="1"/>
+              <a:t>after</a:t>
+            </a:r>
+            <a:r>
+              <a:rPr lang="sv-SE" dirty="0"/>
+              <a:t> </a:t>
+            </a:r>
+            <a:r>
+              <a:rPr lang="sv-SE" dirty="0" err="1"/>
+              <a:t>return</a:t>
+            </a:r>
+            <a:r>
+              <a:rPr lang="sv-SE" dirty="0"/>
+              <a:t>, </a:t>
+            </a:r>
+            <a:r>
+              <a:rPr lang="sv-SE" dirty="0" err="1"/>
+              <a:t>will</a:t>
+            </a:r>
+            <a:r>
+              <a:rPr lang="sv-SE" dirty="0"/>
+              <a:t> be </a:t>
+            </a:r>
+            <a:r>
+              <a:rPr lang="sv-SE" dirty="0" err="1"/>
+              <a:t>returned</a:t>
+            </a:r>
+            <a:r>
+              <a:rPr lang="sv-SE" dirty="0"/>
+              <a:t> to the </a:t>
+            </a:r>
+            <a:r>
+              <a:rPr lang="sv-SE" dirty="0" err="1"/>
+              <a:t>calling</a:t>
+            </a:r>
+            <a:r>
+              <a:rPr lang="sv-SE" dirty="0"/>
+              <a:t> </a:t>
+            </a:r>
+            <a:r>
+              <a:rPr lang="sv-SE" dirty="0" err="1"/>
+              <a:t>routine</a:t>
+            </a:r>
+            <a:r>
+              <a:rPr lang="sv-SE" dirty="0"/>
+              <a:t>.</a:t>
+            </a:r>
+          </a:p>
+          <a:p>
+            <a:endParaRPr lang="sv-SE" dirty="0"/>
+          </a:p>
+          <a:p>
+            <a:r>
+              <a:rPr lang="sv-SE" dirty="0"/>
+              <a:t>If a </a:t>
+            </a:r>
+            <a:r>
+              <a:rPr lang="sv-SE" dirty="0" err="1"/>
+              <a:t>return</a:t>
+            </a:r>
+            <a:r>
+              <a:rPr lang="sv-SE" dirty="0"/>
+              <a:t> </a:t>
+            </a:r>
+            <a:r>
+              <a:rPr lang="sv-SE" dirty="0" err="1"/>
+              <a:t>statement</a:t>
+            </a:r>
+            <a:r>
+              <a:rPr lang="sv-SE" dirty="0"/>
+              <a:t> is </a:t>
+            </a:r>
+            <a:r>
+              <a:rPr lang="sv-SE" dirty="0" err="1"/>
+              <a:t>missing</a:t>
+            </a:r>
+            <a:r>
+              <a:rPr lang="sv-SE" dirty="0"/>
+              <a:t>, the last </a:t>
+            </a:r>
+            <a:r>
+              <a:rPr lang="sv-SE" dirty="0" err="1"/>
+              <a:t>evaluated</a:t>
+            </a:r>
+            <a:r>
+              <a:rPr lang="sv-SE" dirty="0"/>
+              <a:t> </a:t>
+            </a:r>
+            <a:r>
+              <a:rPr lang="sv-SE" dirty="0" err="1"/>
+              <a:t>value</a:t>
+            </a:r>
+            <a:r>
+              <a:rPr lang="sv-SE" dirty="0"/>
+              <a:t> is </a:t>
+            </a:r>
+            <a:r>
+              <a:rPr lang="sv-SE" dirty="0" err="1"/>
+              <a:t>returned</a:t>
+            </a:r>
+            <a:r>
+              <a:rPr lang="sv-SE" dirty="0"/>
+              <a:t>.</a:t>
+            </a:r>
+          </a:p>
+          <a:p>
+            <a:endParaRPr lang="sv-SE" dirty="0"/>
+          </a:p>
+          <a:p>
+            <a:r>
+              <a:rPr lang="sv-SE" dirty="0" err="1"/>
+              <a:t>That</a:t>
+            </a:r>
+            <a:r>
+              <a:rPr lang="sv-SE" dirty="0"/>
+              <a:t> </a:t>
+            </a:r>
+            <a:r>
+              <a:rPr lang="sv-SE" dirty="0" err="1"/>
+              <a:t>was</a:t>
+            </a:r>
+            <a:r>
+              <a:rPr lang="sv-SE" dirty="0"/>
+              <a:t> the </a:t>
+            </a:r>
+            <a:r>
+              <a:rPr lang="sv-SE" dirty="0" err="1"/>
+              <a:t>quick</a:t>
+            </a:r>
+            <a:r>
+              <a:rPr lang="sv-SE" dirty="0"/>
+              <a:t> version </a:t>
+            </a:r>
+            <a:r>
+              <a:rPr lang="sv-SE" dirty="0" err="1"/>
+              <a:t>of</a:t>
+            </a:r>
+            <a:r>
+              <a:rPr lang="sv-SE" dirty="0"/>
+              <a:t> Perl syntax. </a:t>
+            </a:r>
+            <a:r>
+              <a:rPr lang="sv-SE" dirty="0" err="1"/>
+              <a:t>Much</a:t>
+            </a:r>
+            <a:r>
+              <a:rPr lang="sv-SE" dirty="0"/>
+              <a:t> </a:t>
+            </a:r>
+            <a:r>
+              <a:rPr lang="sv-SE" dirty="0" err="1"/>
+              <a:t>more</a:t>
+            </a:r>
+            <a:r>
+              <a:rPr lang="sv-SE" dirty="0"/>
+              <a:t> is </a:t>
+            </a:r>
+            <a:r>
+              <a:rPr lang="sv-SE" dirty="0" err="1"/>
+              <a:t>available</a:t>
+            </a:r>
+            <a:r>
+              <a:rPr lang="sv-SE" dirty="0"/>
+              <a:t> in the Perl </a:t>
+            </a:r>
+            <a:r>
+              <a:rPr lang="sv-SE" dirty="0" err="1"/>
+              <a:t>documentation</a:t>
+            </a:r>
+            <a:r>
+              <a:rPr lang="sv-SE" dirty="0"/>
+              <a:t>, </a:t>
+            </a:r>
+            <a:r>
+              <a:rPr lang="sv-SE" dirty="0">
+                <a:hlinkClick r:id="rId3"/>
+              </a:rPr>
+              <a:t>http://perldoc.perl.org/</a:t>
+            </a:r>
+            <a:r>
+              <a:rPr lang="sv-SE" dirty="0"/>
+              <a:t> </a:t>
+            </a:r>
+          </a:p>
+          <a:p>
+            <a:endParaRPr lang="sv-SE" dirty="0"/>
+          </a:p>
+          <a:p>
+            <a:endParaRPr lang="sv-SE" dirty="0"/>
+          </a:p>
+          <a:p>
+            <a:endParaRPr lang="sv-SE" dirty="0"/>
+          </a:p>
+          <a:p>
+            <a:endParaRPr lang="sv-SE" dirty="0"/>
+          </a:p>
+          <a:p>
+            <a:endParaRPr lang="sv-SE" dirty="0"/>
+          </a:p>
+          <a:p>
+            <a:endParaRPr lang="sv-SE" dirty="0"/>
+          </a:p>
+        </p:txBody>
+      </p:sp>
+    </p:spTree>
+    <p:extLst>
+      <p:ext uri="{BB962C8B-B14F-4D97-AF65-F5344CB8AC3E}">
+        <p14:creationId xmlns:p14="http://schemas.microsoft.com/office/powerpoint/2010/main" val="481837147"/>
+      </p:ext>
+    </p:extLst>
+  </p:cSld>
+  <p:clrMapOvr>
+    <a:masterClrMapping/>
+  </p:clrMapOvr>
+</p:sld>
+</file>
+
+<file path=ppt/slides/slide14.xml><?xml version="1.0" encoding="utf-8"?>
+<p:sld xmlns:a="http://schemas.openxmlformats.org/drawingml/2006/main" xmlns:r="http://schemas.openxmlformats.org/officeDocument/2006/relationships" xmlns:p="http://schemas.openxmlformats.org/presentationml/2006/main">
+  <p:cSld>
+    <p:spTree>
+      <p:nvGrpSpPr>
+        <p:cNvPr id="1" name=""/>
+        <p:cNvGrpSpPr/>
+        <p:nvPr/>
+      </p:nvGrpSpPr>
+      <p:grpSpPr>
+        <a:xfrm>
+          <a:off x="0" y="0"/>
+          <a:ext cx="0" cy="0"/>
+          <a:chOff x="0" y="0"/>
+          <a:chExt cx="0" cy="0"/>
+        </a:xfrm>
+      </p:grpSpPr>
+      <p:sp>
+        <p:nvSpPr>
           <p:cNvPr id="2" name="Content Placeholder 1"/>
           <p:cNvSpPr>
             <a:spLocks noGrp="1"/>
@@ -9915,7 +10443,7 @@
 </p:sld>
 </file>
 
-<file path=ppt/slides/slide14.xml><?xml version="1.0" encoding="utf-8"?>
+<file path=ppt/slides/slide15.xml><?xml version="1.0" encoding="utf-8"?>
 <p:sld xmlns:a="http://schemas.openxmlformats.org/drawingml/2006/main" xmlns:r="http://schemas.openxmlformats.org/officeDocument/2006/relationships" xmlns:p="http://schemas.openxmlformats.org/presentationml/2006/main">
   <p:cSld>
     <p:spTree>
@@ -10141,7 +10669,7 @@
 </p:sld>
 </file>
 
-<file path=ppt/slides/slide15.xml><?xml version="1.0" encoding="utf-8"?>
+<file path=ppt/slides/slide16.xml><?xml version="1.0" encoding="utf-8"?>
 <p:sld xmlns:a="http://schemas.openxmlformats.org/drawingml/2006/main" xmlns:r="http://schemas.openxmlformats.org/officeDocument/2006/relationships" xmlns:p="http://schemas.openxmlformats.org/presentationml/2006/main">
   <p:cSld>
     <p:spTree>
@@ -10313,7 +10841,7 @@
 </p:sld>
 </file>
 
-<file path=ppt/slides/slide16.xml><?xml version="1.0" encoding="utf-8"?>
+<file path=ppt/slides/slide17.xml><?xml version="1.0" encoding="utf-8"?>
 <p:sld xmlns:a="http://schemas.openxmlformats.org/drawingml/2006/main" xmlns:r="http://schemas.openxmlformats.org/officeDocument/2006/relationships" xmlns:p="http://schemas.openxmlformats.org/presentationml/2006/main">
   <p:cSld>
     <p:spTree>
@@ -10666,7 +11194,7 @@
 </p:sld>
 </file>
 
-<file path=ppt/slides/slide17.xml><?xml version="1.0" encoding="utf-8"?>
+<file path=ppt/slides/slide18.xml><?xml version="1.0" encoding="utf-8"?>
 <p:sld xmlns:a="http://schemas.openxmlformats.org/drawingml/2006/main" xmlns:r="http://schemas.openxmlformats.org/officeDocument/2006/relationships" xmlns:p="http://schemas.openxmlformats.org/presentationml/2006/main">
   <p:cSld>
     <p:spTree>
@@ -10875,7 +11403,7 @@
 </p:sld>
 </file>
 
-<file path=ppt/slides/slide18.xml><?xml version="1.0" encoding="utf-8"?>
+<file path=ppt/slides/slide19.xml><?xml version="1.0" encoding="utf-8"?>
 <p:sld xmlns:a="http://schemas.openxmlformats.org/drawingml/2006/main" xmlns:r="http://schemas.openxmlformats.org/officeDocument/2006/relationships" xmlns:p="http://schemas.openxmlformats.org/presentationml/2006/main">
   <p:cSld>
     <p:spTree>
@@ -11165,287 +11693,6 @@
 </p:sld>
 </file>
 
-<file path=ppt/slides/slide19.xml><?xml version="1.0" encoding="utf-8"?>
-<p:sld xmlns:a="http://schemas.openxmlformats.org/drawingml/2006/main" xmlns:r="http://schemas.openxmlformats.org/officeDocument/2006/relationships" xmlns:p="http://schemas.openxmlformats.org/presentationml/2006/main">
-  <p:cSld>
-    <p:spTree>
-      <p:nvGrpSpPr>
-        <p:cNvPr id="1" name=""/>
-        <p:cNvGrpSpPr/>
-        <p:nvPr/>
-      </p:nvGrpSpPr>
-      <p:grpSpPr>
-        <a:xfrm>
-          <a:off x="0" y="0"/>
-          <a:ext cx="0" cy="0"/>
-          <a:chOff x="0" y="0"/>
-          <a:chExt cx="0" cy="0"/>
-        </a:xfrm>
-      </p:grpSpPr>
-      <p:sp>
-        <p:nvSpPr>
-          <p:cNvPr id="11" name="Rectangle 10"/>
-          <p:cNvSpPr/>
-          <p:nvPr/>
-        </p:nvSpPr>
-        <p:spPr bwMode="auto">
-          <a:xfrm>
-            <a:off x="524935" y="5298704"/>
-            <a:ext cx="11135785" cy="914400"/>
-          </a:xfrm>
-          <a:prstGeom prst="rect">
-            <a:avLst/>
-          </a:prstGeom>
-          <a:solidFill>
-            <a:srgbClr val="000000"/>
-          </a:solidFill>
-          <a:ln w="12700" cap="flat" cmpd="sng" algn="ctr">
-            <a:noFill/>
-            <a:prstDash val="solid"/>
-            <a:round/>
-            <a:headEnd type="none" w="med" len="med"/>
-            <a:tailEnd type="none" w="med" len="med"/>
-          </a:ln>
-          <a:effectLst/>
-        </p:spPr>
-        <p:txBody>
-          <a:bodyPr vert="horz" wrap="none" lIns="72000" tIns="45720" rIns="72000" bIns="45720" numCol="1" rtlCol="0" anchor="t" anchorCtr="0" compatLnSpc="1">
-            <a:prstTxWarp prst="textNoShape">
-              <a:avLst/>
-            </a:prstTxWarp>
-          </a:bodyPr>
-          <a:lstStyle/>
-          <a:p>
-            <a:pPr marL="0" marR="0" indent="0" algn="l" defTabSz="914400" rtl="0" eaLnBrk="1" fontAlgn="base" latinLnBrk="0" hangingPunct="1">
-              <a:lnSpc>
-                <a:spcPct val="100000"/>
-              </a:lnSpc>
-              <a:spcBef>
-                <a:spcPct val="50000"/>
-              </a:spcBef>
-              <a:spcAft>
-                <a:spcPct val="0"/>
-              </a:spcAft>
-              <a:buClrTx/>
-              <a:buSzTx/>
-              <a:buFontTx/>
-              <a:buNone/>
-              <a:tabLst/>
-            </a:pPr>
-            <a:endParaRPr kumimoji="0" lang="en-US" sz="2000" b="0" i="0" u="none" strike="noStrike" cap="none" normalizeH="0" baseline="0">
-              <a:ln>
-                <a:noFill/>
-              </a:ln>
-              <a:solidFill>
-                <a:schemeClr val="tx1"/>
-              </a:solidFill>
-              <a:effectLst/>
-              <a:latin typeface="Arial" charset="0"/>
-            </a:endParaRPr>
-          </a:p>
-        </p:txBody>
-      </p:sp>
-      <p:sp>
-        <p:nvSpPr>
-          <p:cNvPr id="5" name="Rounded Rectangle 4"/>
-          <p:cNvSpPr/>
-          <p:nvPr/>
-        </p:nvSpPr>
-        <p:spPr bwMode="auto">
-          <a:xfrm>
-            <a:off x="524935" y="2768368"/>
-            <a:ext cx="11135785" cy="2155328"/>
-          </a:xfrm>
-          <a:prstGeom prst="roundRect">
-            <a:avLst/>
-          </a:prstGeom>
-          <a:solidFill>
-            <a:srgbClr val="272822"/>
-          </a:solidFill>
-          <a:ln w="12700" cap="flat" cmpd="sng" algn="ctr">
-            <a:noFill/>
-            <a:prstDash val="solid"/>
-            <a:round/>
-            <a:headEnd type="none" w="med" len="med"/>
-            <a:tailEnd type="none" w="med" len="med"/>
-          </a:ln>
-          <a:effectLst/>
-        </p:spPr>
-        <p:txBody>
-          <a:bodyPr vert="horz" wrap="none" lIns="72000" tIns="45720" rIns="72000" bIns="45720" numCol="1" rtlCol="0" anchor="t" anchorCtr="0" compatLnSpc="1">
-            <a:prstTxWarp prst="textNoShape">
-              <a:avLst/>
-            </a:prstTxWarp>
-          </a:bodyPr>
-          <a:lstStyle/>
-          <a:p>
-            <a:pPr marL="0" marR="0" indent="0" algn="l" defTabSz="914400" rtl="0" eaLnBrk="1" fontAlgn="base" latinLnBrk="0" hangingPunct="1">
-              <a:lnSpc>
-                <a:spcPct val="100000"/>
-              </a:lnSpc>
-              <a:spcBef>
-                <a:spcPct val="50000"/>
-              </a:spcBef>
-              <a:spcAft>
-                <a:spcPct val="0"/>
-              </a:spcAft>
-              <a:buClrTx/>
-              <a:buSzTx/>
-              <a:buFontTx/>
-              <a:buNone/>
-              <a:tabLst/>
-            </a:pPr>
-            <a:endParaRPr kumimoji="0" lang="en-US" sz="2000" b="0" i="0" u="none" strike="noStrike" cap="none" normalizeH="0" baseline="0" dirty="0">
-              <a:ln>
-                <a:noFill/>
-              </a:ln>
-              <a:solidFill>
-                <a:schemeClr val="tx1"/>
-              </a:solidFill>
-              <a:effectLst/>
-              <a:latin typeface="Arial" charset="0"/>
-            </a:endParaRPr>
-          </a:p>
-        </p:txBody>
-      </p:sp>
-      <p:sp>
-        <p:nvSpPr>
-          <p:cNvPr id="3" name="Title 2"/>
-          <p:cNvSpPr>
-            <a:spLocks noGrp="1"/>
-          </p:cNvSpPr>
-          <p:nvPr>
-            <p:ph type="title"/>
-          </p:nvPr>
-        </p:nvSpPr>
-        <p:spPr/>
-        <p:txBody>
-          <a:bodyPr/>
-          <a:lstStyle/>
-          <a:p>
-            <a:r>
-              <a:rPr lang="en-US" dirty="0"/>
-              <a:t>Together with other shell tools</a:t>
-            </a:r>
-          </a:p>
-        </p:txBody>
-      </p:sp>
-      <p:sp>
-        <p:nvSpPr>
-          <p:cNvPr id="7" name="Content Placeholder 1"/>
-          <p:cNvSpPr>
-            <a:spLocks noGrp="1"/>
-          </p:cNvSpPr>
-          <p:nvPr>
-            <p:ph idx="1"/>
-          </p:nvPr>
-        </p:nvSpPr>
-        <p:spPr>
-          <a:xfrm>
-            <a:off x="524935" y="1599717"/>
-            <a:ext cx="11135785" cy="3852000"/>
-          </a:xfrm>
-        </p:spPr>
-        <p:txBody>
-          <a:bodyPr/>
-          <a:lstStyle/>
-          <a:p>
-            <a:r>
-              <a:rPr lang="en-US" dirty="0"/>
-              <a:t>Perl is great at handling streams of text, so if we combine it with other shell tools we can do cool stuff easily and quickly with </a:t>
-            </a:r>
-            <a:r>
-              <a:rPr lang="en-US" dirty="0" err="1"/>
-              <a:t>perl</a:t>
-            </a:r>
-            <a:r>
-              <a:rPr lang="en-US" dirty="0"/>
-              <a:t>.</a:t>
-            </a:r>
-          </a:p>
-        </p:txBody>
-      </p:sp>
-      <p:pic>
-        <p:nvPicPr>
-          <p:cNvPr id="9" name="Picture 8"/>
-          <p:cNvPicPr>
-            <a:picLocks noChangeAspect="1"/>
-          </p:cNvPicPr>
-          <p:nvPr/>
-        </p:nvPicPr>
-        <p:blipFill>
-          <a:blip r:embed="rId3"/>
-          <a:stretch>
-            <a:fillRect/>
-          </a:stretch>
-        </p:blipFill>
-        <p:spPr>
-          <a:xfrm>
-            <a:off x="773566" y="2855651"/>
-            <a:ext cx="10296525" cy="1952625"/>
-          </a:xfrm>
-          <a:prstGeom prst="rect">
-            <a:avLst/>
-          </a:prstGeom>
-        </p:spPr>
-      </p:pic>
-      <p:sp>
-        <p:nvSpPr>
-          <p:cNvPr id="10" name="Rectangle 9"/>
-          <p:cNvSpPr/>
-          <p:nvPr/>
-        </p:nvSpPr>
-        <p:spPr>
-          <a:xfrm>
-            <a:off x="773566" y="5451717"/>
-            <a:ext cx="10129696" cy="584775"/>
-          </a:xfrm>
-          <a:prstGeom prst="rect">
-            <a:avLst/>
-          </a:prstGeom>
-        </p:spPr>
-        <p:txBody>
-          <a:bodyPr wrap="none">
-            <a:spAutoFit/>
-          </a:bodyPr>
-          <a:lstStyle/>
-          <a:p>
-            <a:r>
-              <a:rPr lang="en-US" sz="3200" dirty="0" err="1">
-                <a:solidFill>
-                  <a:schemeClr val="bg1"/>
-                </a:solidFill>
-                <a:latin typeface="Consolas" panose="020B0609020204030204" pitchFamily="49" charset="0"/>
-                <a:cs typeface="Consolas" panose="020B0609020204030204" pitchFamily="49" charset="0"/>
-              </a:rPr>
-              <a:t>perl</a:t>
-            </a:r>
-            <a:r>
-              <a:rPr lang="en-US" sz="3200" dirty="0">
-                <a:solidFill>
-                  <a:schemeClr val="bg1"/>
-                </a:solidFill>
-                <a:latin typeface="Consolas" panose="020B0609020204030204" pitchFamily="49" charset="0"/>
-                <a:cs typeface="Consolas" panose="020B0609020204030204" pitchFamily="49" charset="0"/>
-              </a:rPr>
-              <a:t> filter_a_words.pl $(cat dictionary.txt)</a:t>
-            </a:r>
-          </a:p>
-        </p:txBody>
-      </p:sp>
-    </p:spTree>
-    <p:extLst>
-      <p:ext uri="{BB962C8B-B14F-4D97-AF65-F5344CB8AC3E}">
-        <p14:creationId xmlns:p14="http://schemas.microsoft.com/office/powerpoint/2010/main" val="4206080701"/>
-      </p:ext>
-    </p:extLst>
-  </p:cSld>
-  <p:clrMapOvr>
-    <a:masterClrMapping/>
-  </p:clrMapOvr>
-</p:sld>
-</file>
-
 <file path=ppt/slides/slide2.xml><?xml version="1.0" encoding="utf-8"?>
 <p:sld xmlns:a="http://schemas.openxmlformats.org/drawingml/2006/main" xmlns:r="http://schemas.openxmlformats.org/officeDocument/2006/relationships" xmlns:p="http://schemas.openxmlformats.org/presentationml/2006/main">
   <p:cSld>
@@ -11821,6 +12068,132 @@
       </p:grpSpPr>
       <p:sp>
         <p:nvSpPr>
+          <p:cNvPr id="11" name="Rectangle 10"/>
+          <p:cNvSpPr/>
+          <p:nvPr/>
+        </p:nvSpPr>
+        <p:spPr bwMode="auto">
+          <a:xfrm>
+            <a:off x="524935" y="5298704"/>
+            <a:ext cx="11135785" cy="914400"/>
+          </a:xfrm>
+          <a:prstGeom prst="rect">
+            <a:avLst/>
+          </a:prstGeom>
+          <a:solidFill>
+            <a:srgbClr val="000000"/>
+          </a:solidFill>
+          <a:ln w="12700" cap="flat" cmpd="sng" algn="ctr">
+            <a:noFill/>
+            <a:prstDash val="solid"/>
+            <a:round/>
+            <a:headEnd type="none" w="med" len="med"/>
+            <a:tailEnd type="none" w="med" len="med"/>
+          </a:ln>
+          <a:effectLst/>
+        </p:spPr>
+        <p:txBody>
+          <a:bodyPr vert="horz" wrap="none" lIns="72000" tIns="45720" rIns="72000" bIns="45720" numCol="1" rtlCol="0" anchor="t" anchorCtr="0" compatLnSpc="1">
+            <a:prstTxWarp prst="textNoShape">
+              <a:avLst/>
+            </a:prstTxWarp>
+          </a:bodyPr>
+          <a:lstStyle/>
+          <a:p>
+            <a:pPr marL="0" marR="0" indent="0" algn="l" defTabSz="914400" rtl="0" eaLnBrk="1" fontAlgn="base" latinLnBrk="0" hangingPunct="1">
+              <a:lnSpc>
+                <a:spcPct val="100000"/>
+              </a:lnSpc>
+              <a:spcBef>
+                <a:spcPct val="50000"/>
+              </a:spcBef>
+              <a:spcAft>
+                <a:spcPct val="0"/>
+              </a:spcAft>
+              <a:buClrTx/>
+              <a:buSzTx/>
+              <a:buFontTx/>
+              <a:buNone/>
+              <a:tabLst/>
+            </a:pPr>
+            <a:endParaRPr kumimoji="0" lang="en-US" sz="2000" b="0" i="0" u="none" strike="noStrike" cap="none" normalizeH="0" baseline="0">
+              <a:ln>
+                <a:noFill/>
+              </a:ln>
+              <a:solidFill>
+                <a:schemeClr val="tx1"/>
+              </a:solidFill>
+              <a:effectLst/>
+              <a:latin typeface="Arial" charset="0"/>
+            </a:endParaRPr>
+          </a:p>
+        </p:txBody>
+      </p:sp>
+      <p:sp>
+        <p:nvSpPr>
+          <p:cNvPr id="5" name="Rounded Rectangle 4"/>
+          <p:cNvSpPr/>
+          <p:nvPr/>
+        </p:nvSpPr>
+        <p:spPr bwMode="auto">
+          <a:xfrm>
+            <a:off x="524935" y="2768368"/>
+            <a:ext cx="11135785" cy="2155328"/>
+          </a:xfrm>
+          <a:prstGeom prst="roundRect">
+            <a:avLst/>
+          </a:prstGeom>
+          <a:solidFill>
+            <a:srgbClr val="272822"/>
+          </a:solidFill>
+          <a:ln w="12700" cap="flat" cmpd="sng" algn="ctr">
+            <a:noFill/>
+            <a:prstDash val="solid"/>
+            <a:round/>
+            <a:headEnd type="none" w="med" len="med"/>
+            <a:tailEnd type="none" w="med" len="med"/>
+          </a:ln>
+          <a:effectLst/>
+        </p:spPr>
+        <p:txBody>
+          <a:bodyPr vert="horz" wrap="none" lIns="72000" tIns="45720" rIns="72000" bIns="45720" numCol="1" rtlCol="0" anchor="t" anchorCtr="0" compatLnSpc="1">
+            <a:prstTxWarp prst="textNoShape">
+              <a:avLst/>
+            </a:prstTxWarp>
+          </a:bodyPr>
+          <a:lstStyle/>
+          <a:p>
+            <a:pPr marL="0" marR="0" indent="0" algn="l" defTabSz="914400" rtl="0" eaLnBrk="1" fontAlgn="base" latinLnBrk="0" hangingPunct="1">
+              <a:lnSpc>
+                <a:spcPct val="100000"/>
+              </a:lnSpc>
+              <a:spcBef>
+                <a:spcPct val="50000"/>
+              </a:spcBef>
+              <a:spcAft>
+                <a:spcPct val="0"/>
+              </a:spcAft>
+              <a:buClrTx/>
+              <a:buSzTx/>
+              <a:buFontTx/>
+              <a:buNone/>
+              <a:tabLst/>
+            </a:pPr>
+            <a:endParaRPr kumimoji="0" lang="en-US" sz="2000" b="0" i="0" u="none" strike="noStrike" cap="none" normalizeH="0" baseline="0" dirty="0">
+              <a:ln>
+                <a:noFill/>
+              </a:ln>
+              <a:solidFill>
+                <a:schemeClr val="tx1"/>
+              </a:solidFill>
+              <a:effectLst/>
+              <a:latin typeface="Arial" charset="0"/>
+            </a:endParaRPr>
+          </a:p>
+        </p:txBody>
+      </p:sp>
+      <p:sp>
+        <p:nvSpPr>
           <p:cNvPr id="3" name="Title 2"/>
           <p:cNvSpPr>
             <a:spLocks noGrp="1"/>
@@ -11836,7 +12209,7 @@
           <a:p>
             <a:r>
               <a:rPr lang="en-US" dirty="0"/>
-              <a:t>Those are some of the basics of Perl</a:t>
+              <a:t>Together with other shell tools</a:t>
             </a:r>
           </a:p>
         </p:txBody>
@@ -11853,7 +12226,7 @@
         </p:nvSpPr>
         <p:spPr>
           <a:xfrm>
-            <a:off x="529168" y="1800000"/>
+            <a:off x="524935" y="1599717"/>
             <a:ext cx="11135785" cy="3852000"/>
           </a:xfrm>
         </p:spPr>
@@ -11863,13 +12236,83 @@
           <a:p>
             <a:r>
               <a:rPr lang="en-US" dirty="0"/>
-              <a:t>Perl has a massive library for all kinds of stuff, and I have only scratched the surface of the language.</a:t>
-            </a:r>
-          </a:p>
-          <a:p>
+              <a:t>Perl is great at handling streams of text, so if we combine it with other shell tools we can do cool stuff easily and quickly with </a:t>
+            </a:r>
+            <a:r>
+              <a:rPr lang="en-US" dirty="0" err="1"/>
+              <a:t>perl</a:t>
+            </a:r>
             <a:r>
               <a:rPr lang="en-US" dirty="0"/>
-              <a:t>Some exercises will follow for those interested in trying the language out.</a:t>
+              <a:t>.</a:t>
+            </a:r>
+          </a:p>
+        </p:txBody>
+      </p:sp>
+      <p:pic>
+        <p:nvPicPr>
+          <p:cNvPr id="9" name="Picture 8"/>
+          <p:cNvPicPr>
+            <a:picLocks noChangeAspect="1"/>
+          </p:cNvPicPr>
+          <p:nvPr/>
+        </p:nvPicPr>
+        <p:blipFill>
+          <a:blip r:embed="rId3"/>
+          <a:stretch>
+            <a:fillRect/>
+          </a:stretch>
+        </p:blipFill>
+        <p:spPr>
+          <a:xfrm>
+            <a:off x="773566" y="2855651"/>
+            <a:ext cx="10296525" cy="1952625"/>
+          </a:xfrm>
+          <a:prstGeom prst="rect">
+            <a:avLst/>
+          </a:prstGeom>
+        </p:spPr>
+      </p:pic>
+      <p:sp>
+        <p:nvSpPr>
+          <p:cNvPr id="10" name="Rectangle 9"/>
+          <p:cNvSpPr/>
+          <p:nvPr/>
+        </p:nvSpPr>
+        <p:spPr>
+          <a:xfrm>
+            <a:off x="773566" y="5451717"/>
+            <a:ext cx="10129696" cy="584775"/>
+          </a:xfrm>
+          <a:prstGeom prst="rect">
+            <a:avLst/>
+          </a:prstGeom>
+        </p:spPr>
+        <p:txBody>
+          <a:bodyPr wrap="none">
+            <a:spAutoFit/>
+          </a:bodyPr>
+          <a:lstStyle/>
+          <a:p>
+            <a:r>
+              <a:rPr lang="en-US" sz="3200" dirty="0" err="1">
+                <a:solidFill>
+                  <a:schemeClr val="bg1"/>
+                </a:solidFill>
+                <a:latin typeface="Consolas" panose="020B0609020204030204" pitchFamily="49" charset="0"/>
+                <a:cs typeface="Consolas" panose="020B0609020204030204" pitchFamily="49" charset="0"/>
+              </a:rPr>
+              <a:t>perl</a:t>
+            </a:r>
+            <a:r>
+              <a:rPr lang="en-US" sz="3200" dirty="0">
+                <a:solidFill>
+                  <a:schemeClr val="bg1"/>
+                </a:solidFill>
+                <a:latin typeface="Consolas" panose="020B0609020204030204" pitchFamily="49" charset="0"/>
+                <a:cs typeface="Consolas" panose="020B0609020204030204" pitchFamily="49" charset="0"/>
+              </a:rPr>
+              <a:t> filter_a_words.pl $(cat dictionary.txt)</a:t>
             </a:r>
           </a:p>
         </p:txBody>
@@ -11877,7 +12320,7 @@
     </p:spTree>
     <p:extLst>
       <p:ext uri="{BB962C8B-B14F-4D97-AF65-F5344CB8AC3E}">
-        <p14:creationId xmlns:p14="http://schemas.microsoft.com/office/powerpoint/2010/main" val="1031532950"/>
+        <p14:creationId xmlns:p14="http://schemas.microsoft.com/office/powerpoint/2010/main" val="4206080701"/>
       </p:ext>
     </p:extLst>
   </p:cSld>
@@ -11906,6 +12349,91 @@
       </p:grpSpPr>
       <p:sp>
         <p:nvSpPr>
+          <p:cNvPr id="3" name="Title 2"/>
+          <p:cNvSpPr>
+            <a:spLocks noGrp="1"/>
+          </p:cNvSpPr>
+          <p:nvPr>
+            <p:ph type="title"/>
+          </p:nvPr>
+        </p:nvSpPr>
+        <p:spPr/>
+        <p:txBody>
+          <a:bodyPr/>
+          <a:lstStyle/>
+          <a:p>
+            <a:r>
+              <a:rPr lang="en-US" dirty="0"/>
+              <a:t>Those are some of the basics of Perl</a:t>
+            </a:r>
+          </a:p>
+        </p:txBody>
+      </p:sp>
+      <p:sp>
+        <p:nvSpPr>
+          <p:cNvPr id="7" name="Content Placeholder 1"/>
+          <p:cNvSpPr>
+            <a:spLocks noGrp="1"/>
+          </p:cNvSpPr>
+          <p:nvPr>
+            <p:ph idx="1"/>
+          </p:nvPr>
+        </p:nvSpPr>
+        <p:spPr>
+          <a:xfrm>
+            <a:off x="529168" y="1800000"/>
+            <a:ext cx="11135785" cy="3852000"/>
+          </a:xfrm>
+        </p:spPr>
+        <p:txBody>
+          <a:bodyPr/>
+          <a:lstStyle/>
+          <a:p>
+            <a:r>
+              <a:rPr lang="en-US" dirty="0"/>
+              <a:t>Perl has a massive library for all kinds of stuff, and I have only scratched the surface of the language.</a:t>
+            </a:r>
+          </a:p>
+          <a:p>
+            <a:r>
+              <a:rPr lang="en-US" dirty="0"/>
+              <a:t>Some exercises will follow for those interested in trying the language out.</a:t>
+            </a:r>
+          </a:p>
+        </p:txBody>
+      </p:sp>
+    </p:spTree>
+    <p:extLst>
+      <p:ext uri="{BB962C8B-B14F-4D97-AF65-F5344CB8AC3E}">
+        <p14:creationId xmlns:p14="http://schemas.microsoft.com/office/powerpoint/2010/main" val="1031532950"/>
+      </p:ext>
+    </p:extLst>
+  </p:cSld>
+  <p:clrMapOvr>
+    <a:masterClrMapping/>
+  </p:clrMapOvr>
+</p:sld>
+</file>
+
+<file path=ppt/slides/slide22.xml><?xml version="1.0" encoding="utf-8"?>
+<p:sld xmlns:a="http://schemas.openxmlformats.org/drawingml/2006/main" xmlns:r="http://schemas.openxmlformats.org/officeDocument/2006/relationships" xmlns:p="http://schemas.openxmlformats.org/presentationml/2006/main">
+  <p:cSld>
+    <p:spTree>
+      <p:nvGrpSpPr>
+        <p:cNvPr id="1" name=""/>
+        <p:cNvGrpSpPr/>
+        <p:nvPr/>
+      </p:nvGrpSpPr>
+      <p:grpSpPr>
+        <a:xfrm>
+          <a:off x="0" y="0"/>
+          <a:ext cx="0" cy="0"/>
+          <a:chOff x="0" y="0"/>
+          <a:chExt cx="0" cy="0"/>
+        </a:xfrm>
+      </p:grpSpPr>
+      <p:sp>
+        <p:nvSpPr>
           <p:cNvPr id="4" name="Rectangle 3"/>
           <p:cNvSpPr/>
           <p:nvPr/>
@@ -12147,7 +12675,7 @@
 </p:sld>
 </file>
 
-<file path=ppt/slides/slide22.xml><?xml version="1.0" encoding="utf-8"?>
+<file path=ppt/slides/slide23.xml><?xml version="1.0" encoding="utf-8"?>
 <p:sld xmlns:a="http://schemas.openxmlformats.org/drawingml/2006/main" xmlns:r="http://schemas.openxmlformats.org/officeDocument/2006/relationships" xmlns:p="http://schemas.openxmlformats.org/presentationml/2006/main">
   <p:cSld>
     <p:spTree>
@@ -12390,7 +12918,7 @@
 </p:sld>
 </file>
 
-<file path=ppt/slides/slide23.xml><?xml version="1.0" encoding="utf-8"?>
+<file path=ppt/slides/slide24.xml><?xml version="1.0" encoding="utf-8"?>
 <p:sld xmlns:a="http://schemas.openxmlformats.org/drawingml/2006/main" xmlns:r="http://schemas.openxmlformats.org/officeDocument/2006/relationships" xmlns:p="http://schemas.openxmlformats.org/presentationml/2006/main">
   <p:cSld>
     <p:spTree>
@@ -12518,7 +13046,7 @@
 </p:sld>
 </file>
 
-<file path=ppt/slides/slide24.xml><?xml version="1.0" encoding="utf-8"?>
+<file path=ppt/slides/slide25.xml><?xml version="1.0" encoding="utf-8"?>
 <p:sld xmlns:a="http://schemas.openxmlformats.org/drawingml/2006/main" xmlns:r="http://schemas.openxmlformats.org/officeDocument/2006/relationships" xmlns:p="http://schemas.openxmlformats.org/presentationml/2006/main" showMasterSp="0">
   <p:cSld>
     <p:spTree>
@@ -12595,6 +13123,377 @@
           <a:chExt cx="0" cy="0"/>
         </a:xfrm>
       </p:grpSpPr>
+      <p:pic>
+        <p:nvPicPr>
+          <p:cNvPr id="1026" name="Picture 2" descr="the Original"/>
+          <p:cNvPicPr>
+            <a:picLocks noChangeAspect="1" noChangeArrowheads="1"/>
+          </p:cNvPicPr>
+          <p:nvPr/>
+        </p:nvPicPr>
+        <p:blipFill>
+          <a:blip r:embed="rId3">
+            <a:extLst>
+              <a:ext uri="{28A0092B-C50C-407E-A947-70E740481C1C}">
+                <a14:useLocalDpi xmlns:a14="http://schemas.microsoft.com/office/drawing/2010/main" val="0"/>
+              </a:ext>
+            </a:extLst>
+          </a:blip>
+          <a:srcRect/>
+          <a:stretch>
+            <a:fillRect/>
+          </a:stretch>
+        </p:blipFill>
+        <p:spPr bwMode="auto">
+          <a:xfrm>
+            <a:off x="7147221" y="1690846"/>
+            <a:ext cx="4762726" cy="4762727"/>
+          </a:xfrm>
+          <a:prstGeom prst="rect">
+            <a:avLst/>
+          </a:prstGeom>
+          <a:noFill/>
+          <a:extLst>
+            <a:ext uri="{909E8E84-426E-40DD-AFC4-6F175D3DCCD1}">
+              <a14:hiddenFill xmlns:a14="http://schemas.microsoft.com/office/drawing/2010/main">
+                <a:solidFill>
+                  <a:srgbClr val="FFFFFF"/>
+                </a:solidFill>
+              </a14:hiddenFill>
+            </a:ext>
+          </a:extLst>
+        </p:spPr>
+      </p:pic>
+      <p:sp>
+        <p:nvSpPr>
+          <p:cNvPr id="5" name="Rectangle 4"/>
+          <p:cNvSpPr/>
+          <p:nvPr/>
+        </p:nvSpPr>
+        <p:spPr bwMode="auto">
+          <a:xfrm>
+            <a:off x="0" y="-6022"/>
+            <a:ext cx="12192000" cy="6858000"/>
+          </a:xfrm>
+          <a:prstGeom prst="rect">
+            <a:avLst/>
+          </a:prstGeom>
+          <a:solidFill>
+            <a:schemeClr val="bg1">
+              <a:alpha val="87000"/>
+            </a:schemeClr>
+          </a:solidFill>
+          <a:ln w="12700" cap="flat" cmpd="sng" algn="ctr">
+            <a:noFill/>
+            <a:prstDash val="solid"/>
+            <a:round/>
+            <a:headEnd type="none" w="med" len="med"/>
+            <a:tailEnd type="none" w="med" len="med"/>
+          </a:ln>
+          <a:effectLst/>
+        </p:spPr>
+        <p:txBody>
+          <a:bodyPr vert="horz" wrap="none" lIns="72000" tIns="45720" rIns="72000" bIns="45720" numCol="1" rtlCol="0" anchor="t" anchorCtr="0" compatLnSpc="1">
+            <a:prstTxWarp prst="textNoShape">
+              <a:avLst/>
+            </a:prstTxWarp>
+          </a:bodyPr>
+          <a:lstStyle/>
+          <a:p>
+            <a:pPr marL="0" marR="0" indent="0" algn="l" defTabSz="914400" rtl="0" eaLnBrk="1" fontAlgn="base" latinLnBrk="0" hangingPunct="1">
+              <a:lnSpc>
+                <a:spcPct val="100000"/>
+              </a:lnSpc>
+              <a:spcBef>
+                <a:spcPct val="50000"/>
+              </a:spcBef>
+              <a:spcAft>
+                <a:spcPct val="0"/>
+              </a:spcAft>
+              <a:buClrTx/>
+              <a:buSzTx/>
+              <a:buFontTx/>
+              <a:buNone/>
+              <a:tabLst/>
+            </a:pPr>
+            <a:endParaRPr kumimoji="0" lang="en-US" sz="2000" b="0" i="0" u="none" strike="noStrike" cap="none" normalizeH="0" baseline="0">
+              <a:ln>
+                <a:noFill/>
+              </a:ln>
+              <a:solidFill>
+                <a:schemeClr val="tx1"/>
+              </a:solidFill>
+              <a:effectLst/>
+              <a:latin typeface="Arial" charset="0"/>
+            </a:endParaRPr>
+          </a:p>
+        </p:txBody>
+      </p:sp>
+      <p:sp>
+        <p:nvSpPr>
+          <p:cNvPr id="3" name="Content Placeholder 2"/>
+          <p:cNvSpPr>
+            <a:spLocks noGrp="1"/>
+          </p:cNvSpPr>
+          <p:nvPr>
+            <p:ph idx="1"/>
+          </p:nvPr>
+        </p:nvSpPr>
+        <p:spPr>
+          <a:xfrm>
+            <a:off x="529168" y="1800000"/>
+            <a:ext cx="11380779" cy="4783680"/>
+          </a:xfrm>
+          <a:ln>
+            <a:noFill/>
+          </a:ln>
+        </p:spPr>
+        <p:txBody>
+          <a:bodyPr>
+            <a:normAutofit/>
+          </a:bodyPr>
+          <a:lstStyle/>
+          <a:p>
+            <a:pPr marL="0" indent="0">
+              <a:buNone/>
+            </a:pPr>
+            <a:endParaRPr lang="sv-SE" altLang="ja-JP" dirty="0"/>
+          </a:p>
+          <a:p>
+            <a:pPr marL="0" indent="0">
+              <a:buNone/>
+            </a:pPr>
+            <a:endParaRPr lang="sv-SE" altLang="ja-JP" dirty="0"/>
+          </a:p>
+          <a:p>
+            <a:pPr marL="0" indent="0">
+              <a:buNone/>
+            </a:pPr>
+            <a:endParaRPr lang="sv-SE" altLang="ja-JP" dirty="0"/>
+          </a:p>
+          <a:p>
+            <a:pPr marL="0" indent="0">
+              <a:buNone/>
+            </a:pPr>
+            <a:endParaRPr lang="sv-SE" altLang="ja-JP" dirty="0"/>
+          </a:p>
+          <a:p>
+            <a:pPr marL="0" indent="0">
+              <a:buNone/>
+            </a:pPr>
+            <a:endParaRPr lang="sv-SE" altLang="ja-JP" dirty="0"/>
+          </a:p>
+          <a:p>
+            <a:pPr marL="0" indent="0">
+              <a:buNone/>
+            </a:pPr>
+            <a:endParaRPr lang="sv-SE" altLang="ja-JP" sz="3200" dirty="0">
+              <a:latin typeface="Consolas" panose="020B0609020204030204" pitchFamily="49" charset="0"/>
+              <a:cs typeface="Consolas" panose="020B0609020204030204" pitchFamily="49" charset="0"/>
+            </a:endParaRPr>
+          </a:p>
+          <a:p>
+            <a:pPr marL="0" indent="0">
+              <a:buNone/>
+            </a:pPr>
+            <a:endParaRPr lang="sv-SE" altLang="ja-JP" sz="3200" dirty="0">
+              <a:latin typeface="Consolas" panose="020B0609020204030204" pitchFamily="49" charset="0"/>
+              <a:cs typeface="Consolas" panose="020B0609020204030204" pitchFamily="49" charset="0"/>
+            </a:endParaRPr>
+          </a:p>
+          <a:p>
+            <a:pPr marL="0" indent="0">
+              <a:buNone/>
+            </a:pPr>
+            <a:r>
+              <a:rPr lang="sv-SE" altLang="ja-JP" sz="2800" dirty="0" err="1">
+                <a:cs typeface="Consolas" panose="020B0609020204030204" pitchFamily="49" charset="0"/>
+              </a:rPr>
+              <a:t>Please</a:t>
+            </a:r>
+            <a:r>
+              <a:rPr lang="sv-SE" altLang="ja-JP" sz="2800" dirty="0">
+                <a:cs typeface="Consolas" panose="020B0609020204030204" pitchFamily="49" charset="0"/>
+              </a:rPr>
+              <a:t>, go </a:t>
+            </a:r>
+            <a:r>
+              <a:rPr lang="sv-SE" altLang="ja-JP" sz="2800" dirty="0" err="1">
+                <a:cs typeface="Consolas" panose="020B0609020204030204" pitchFamily="49" charset="0"/>
+              </a:rPr>
+              <a:t>ahead</a:t>
+            </a:r>
+            <a:r>
+              <a:rPr lang="sv-SE" altLang="ja-JP" sz="2800" dirty="0">
+                <a:cs typeface="Consolas" panose="020B0609020204030204" pitchFamily="49" charset="0"/>
+              </a:rPr>
+              <a:t> and </a:t>
+            </a:r>
+            <a:r>
+              <a:rPr lang="sv-SE" altLang="ja-JP" sz="2800" dirty="0" err="1">
+                <a:cs typeface="Consolas" panose="020B0609020204030204" pitchFamily="49" charset="0"/>
+              </a:rPr>
+              <a:t>clone</a:t>
+            </a:r>
+            <a:r>
+              <a:rPr lang="sv-SE" altLang="ja-JP" sz="2800" dirty="0">
+                <a:cs typeface="Consolas" panose="020B0609020204030204" pitchFamily="49" charset="0"/>
+              </a:rPr>
+              <a:t> </a:t>
+            </a:r>
+            <a:r>
+              <a:rPr lang="sv-SE" altLang="ja-JP" sz="2800" dirty="0" err="1">
+                <a:cs typeface="Consolas" panose="020B0609020204030204" pitchFamily="49" charset="0"/>
+              </a:rPr>
+              <a:t>everything</a:t>
+            </a:r>
+            <a:r>
+              <a:rPr lang="sv-SE" altLang="ja-JP" sz="2800" dirty="0">
+                <a:cs typeface="Consolas" panose="020B0609020204030204" pitchFamily="49" charset="0"/>
+              </a:rPr>
+              <a:t> in </a:t>
+            </a:r>
+            <a:r>
+              <a:rPr lang="sv-SE" altLang="ja-JP" sz="2800" dirty="0" err="1">
+                <a:cs typeface="Consolas" panose="020B0609020204030204" pitchFamily="49" charset="0"/>
+              </a:rPr>
+              <a:t>this</a:t>
+            </a:r>
+            <a:r>
+              <a:rPr lang="sv-SE" altLang="ja-JP" sz="2800" dirty="0">
+                <a:cs typeface="Consolas" panose="020B0609020204030204" pitchFamily="49" charset="0"/>
+              </a:rPr>
+              <a:t> presentation from</a:t>
+            </a:r>
+          </a:p>
+          <a:p>
+            <a:pPr marL="0" indent="0">
+              <a:buNone/>
+            </a:pPr>
+            <a:r>
+              <a:rPr lang="sv-SE" altLang="ja-JP" sz="3200" dirty="0">
+                <a:latin typeface="Consolas" panose="020B0609020204030204" pitchFamily="49" charset="0"/>
+                <a:cs typeface="Consolas" panose="020B0609020204030204" pitchFamily="49" charset="0"/>
+              </a:rPr>
+              <a:t>https://github.com/gwaerondor/basic_perl.git </a:t>
+            </a:r>
+          </a:p>
+        </p:txBody>
+      </p:sp>
+      <p:sp>
+        <p:nvSpPr>
+          <p:cNvPr id="2" name="Title 1"/>
+          <p:cNvSpPr>
+            <a:spLocks noGrp="1"/>
+          </p:cNvSpPr>
+          <p:nvPr>
+            <p:ph type="title"/>
+          </p:nvPr>
+        </p:nvSpPr>
+        <p:spPr>
+          <a:xfrm>
+            <a:off x="524935" y="239714"/>
+            <a:ext cx="9992784" cy="1085371"/>
+          </a:xfrm>
+        </p:spPr>
+        <p:txBody>
+          <a:bodyPr anchor="ctr">
+            <a:normAutofit/>
+          </a:bodyPr>
+          <a:lstStyle/>
+          <a:p>
+            <a:r>
+              <a:rPr lang="sv-SE" dirty="0" err="1"/>
+              <a:t>Slides</a:t>
+            </a:r>
+            <a:r>
+              <a:rPr lang="sv-SE" dirty="0"/>
+              <a:t>, </a:t>
+            </a:r>
+            <a:r>
+              <a:rPr lang="sv-SE" dirty="0" err="1"/>
+              <a:t>example</a:t>
+            </a:r>
+            <a:r>
+              <a:rPr lang="sv-SE" dirty="0"/>
+              <a:t> </a:t>
+            </a:r>
+            <a:r>
+              <a:rPr lang="sv-SE" dirty="0" err="1"/>
+              <a:t>code</a:t>
+            </a:r>
+            <a:r>
+              <a:rPr lang="sv-SE" dirty="0"/>
+              <a:t> and </a:t>
+            </a:r>
+            <a:r>
+              <a:rPr lang="sv-SE" dirty="0" err="1"/>
+              <a:t>more</a:t>
+            </a:r>
+            <a:endParaRPr lang="sv-SE" dirty="0"/>
+          </a:p>
+        </p:txBody>
+      </p:sp>
+      <p:pic>
+        <p:nvPicPr>
+          <p:cNvPr id="4" name="Econ2011"/>
+          <p:cNvPicPr>
+            <a:picLocks noChangeAspect="1"/>
+          </p:cNvPicPr>
+          <p:nvPr/>
+        </p:nvPicPr>
+        <p:blipFill>
+          <a:blip r:embed="rId4">
+            <a:extLst>
+              <a:ext uri="{28A0092B-C50C-407E-A947-70E740481C1C}">
+                <a14:useLocalDpi xmlns:a14="http://schemas.microsoft.com/office/drawing/2010/main" val="0"/>
+              </a:ext>
+            </a:extLst>
+          </a:blip>
+          <a:stretch>
+            <a:fillRect/>
+          </a:stretch>
+        </p:blipFill>
+        <p:spPr>
+          <a:xfrm>
+            <a:off x="11209564" y="360000"/>
+            <a:ext cx="444500" cy="587195"/>
+          </a:xfrm>
+          <a:prstGeom prst="rect">
+            <a:avLst/>
+          </a:prstGeom>
+        </p:spPr>
+      </p:pic>
+    </p:spTree>
+    <p:extLst>
+      <p:ext uri="{BB962C8B-B14F-4D97-AF65-F5344CB8AC3E}">
+        <p14:creationId xmlns:p14="http://schemas.microsoft.com/office/powerpoint/2010/main" val="203364425"/>
+      </p:ext>
+    </p:extLst>
+  </p:cSld>
+  <p:clrMapOvr>
+    <a:masterClrMapping/>
+  </p:clrMapOvr>
+</p:sld>
+</file>
+
+<file path=ppt/slides/slide4.xml><?xml version="1.0" encoding="utf-8"?>
+<p:sld xmlns:a="http://schemas.openxmlformats.org/drawingml/2006/main" xmlns:r="http://schemas.openxmlformats.org/officeDocument/2006/relationships" xmlns:p="http://schemas.openxmlformats.org/presentationml/2006/main">
+  <p:cSld>
+    <p:spTree>
+      <p:nvGrpSpPr>
+        <p:cNvPr id="1" name=""/>
+        <p:cNvGrpSpPr/>
+        <p:nvPr/>
+      </p:nvGrpSpPr>
+      <p:grpSpPr>
+        <a:xfrm>
+          <a:off x="0" y="0"/>
+          <a:ext cx="0" cy="0"/>
+          <a:chOff x="0" y="0"/>
+          <a:chExt cx="0" cy="0"/>
+        </a:xfrm>
+      </p:grpSpPr>
       <p:sp>
         <p:nvSpPr>
           <p:cNvPr id="3" name="Content Placeholder 2"/>
@@ -12876,7 +13775,7 @@
 </p:sld>
 </file>
 
-<file path=ppt/slides/slide4.xml><?xml version="1.0" encoding="utf-8"?>
+<file path=ppt/slides/slide5.xml><?xml version="1.0" encoding="utf-8"?>
 <p:sld xmlns:a="http://schemas.openxmlformats.org/drawingml/2006/main" xmlns:r="http://schemas.openxmlformats.org/officeDocument/2006/relationships" xmlns:p="http://schemas.openxmlformats.org/presentationml/2006/main">
   <p:cSld>
     <p:spTree>
@@ -13231,7 +14130,7 @@
 </p:sld>
 </file>
 
-<file path=ppt/slides/slide5.xml><?xml version="1.0" encoding="utf-8"?>
+<file path=ppt/slides/slide6.xml><?xml version="1.0" encoding="utf-8"?>
 <p:sld xmlns:a="http://schemas.openxmlformats.org/drawingml/2006/main" xmlns:r="http://schemas.openxmlformats.org/officeDocument/2006/relationships" xmlns:p="http://schemas.openxmlformats.org/presentationml/2006/main">
   <p:cSld>
     <p:spTree>
@@ -13567,7 +14466,7 @@
 </p:sld>
 </file>
 
-<file path=ppt/slides/slide6.xml><?xml version="1.0" encoding="utf-8"?>
+<file path=ppt/slides/slide7.xml><?xml version="1.0" encoding="utf-8"?>
 <p:sld xmlns:a="http://schemas.openxmlformats.org/drawingml/2006/main" xmlns:r="http://schemas.openxmlformats.org/officeDocument/2006/relationships" xmlns:p="http://schemas.openxmlformats.org/presentationml/2006/main">
   <p:cSld>
     <p:spTree>
@@ -13987,7 +14886,7 @@
 </p:sld>
 </file>
 
-<file path=ppt/slides/slide7.xml><?xml version="1.0" encoding="utf-8"?>
+<file path=ppt/slides/slide8.xml><?xml version="1.0" encoding="utf-8"?>
 <p:sld xmlns:a="http://schemas.openxmlformats.org/drawingml/2006/main" xmlns:r="http://schemas.openxmlformats.org/officeDocument/2006/relationships" xmlns:p="http://schemas.openxmlformats.org/presentationml/2006/main">
   <p:cSld>
     <p:spTree>
@@ -14509,125 +15408,6 @@
 </p:sld>
 </file>
 
-<file path=ppt/slides/slide8.xml><?xml version="1.0" encoding="utf-8"?>
-<p:sld xmlns:a="http://schemas.openxmlformats.org/drawingml/2006/main" xmlns:r="http://schemas.openxmlformats.org/officeDocument/2006/relationships" xmlns:p="http://schemas.openxmlformats.org/presentationml/2006/main">
-  <p:cSld>
-    <p:spTree>
-      <p:nvGrpSpPr>
-        <p:cNvPr id="1" name=""/>
-        <p:cNvGrpSpPr/>
-        <p:nvPr/>
-      </p:nvGrpSpPr>
-      <p:grpSpPr>
-        <a:xfrm>
-          <a:off x="0" y="0"/>
-          <a:ext cx="0" cy="0"/>
-          <a:chOff x="0" y="0"/>
-          <a:chExt cx="0" cy="0"/>
-        </a:xfrm>
-      </p:grpSpPr>
-      <p:sp>
-        <p:nvSpPr>
-          <p:cNvPr id="3" name="Content Placeholder 2"/>
-          <p:cNvSpPr>
-            <a:spLocks noGrp="1"/>
-          </p:cNvSpPr>
-          <p:nvPr>
-            <p:ph idx="1"/>
-          </p:nvPr>
-        </p:nvSpPr>
-        <p:spPr>
-          <a:xfrm>
-            <a:off x="379828" y="1800000"/>
-            <a:ext cx="11408898" cy="3852000"/>
-          </a:xfrm>
-          <a:ln>
-            <a:noFill/>
-          </a:ln>
-        </p:spPr>
-        <p:txBody>
-          <a:bodyPr/>
-          <a:lstStyle/>
-          <a:p>
-            <a:pPr marL="0" indent="0">
-              <a:buNone/>
-            </a:pPr>
-            <a:r>
-              <a:rPr lang="sv-SE" sz="8800" dirty="0"/>
-              <a:t>Just a </a:t>
-            </a:r>
-            <a:r>
-              <a:rPr lang="sv-SE" sz="8800" dirty="0" err="1"/>
-              <a:t>few</a:t>
-            </a:r>
-            <a:r>
-              <a:rPr lang="sv-SE" sz="8800" dirty="0"/>
-              <a:t> </a:t>
-            </a:r>
-            <a:r>
-              <a:rPr lang="sv-SE" sz="8800" dirty="0" err="1"/>
-              <a:t>more</a:t>
-            </a:r>
-            <a:r>
-              <a:rPr lang="sv-SE" sz="8800" dirty="0"/>
-              <a:t> </a:t>
-            </a:r>
-            <a:r>
-              <a:rPr lang="sv-SE" sz="8800" dirty="0" err="1"/>
-              <a:t>things</a:t>
-            </a:r>
-            <a:r>
-              <a:rPr lang="sv-SE" sz="8800" dirty="0"/>
-              <a:t> </a:t>
-            </a:r>
-            <a:r>
-              <a:rPr lang="sv-SE" sz="8800" dirty="0" err="1"/>
-              <a:t>before</a:t>
-            </a:r>
-            <a:r>
-              <a:rPr lang="sv-SE" sz="8800" dirty="0"/>
-              <a:t> </a:t>
-            </a:r>
-            <a:r>
-              <a:rPr lang="sv-SE" sz="8800" dirty="0" err="1"/>
-              <a:t>we</a:t>
-            </a:r>
-            <a:r>
-              <a:rPr lang="sv-SE" sz="8800" dirty="0"/>
-              <a:t> start </a:t>
-            </a:r>
-            <a:r>
-              <a:rPr lang="sv-SE" sz="8800" dirty="0" err="1"/>
-              <a:t>with</a:t>
-            </a:r>
-            <a:r>
-              <a:rPr lang="sv-SE" sz="8800" dirty="0"/>
-              <a:t> the </a:t>
-            </a:r>
-            <a:r>
-              <a:rPr lang="sv-SE" sz="8800" dirty="0" err="1"/>
-              <a:t>fun</a:t>
-            </a:r>
-            <a:r>
-              <a:rPr lang="sv-SE" sz="8800" dirty="0"/>
-              <a:t> stuff…</a:t>
-            </a:r>
-          </a:p>
-        </p:txBody>
-      </p:sp>
-    </p:spTree>
-    <p:extLst>
-      <p:ext uri="{BB962C8B-B14F-4D97-AF65-F5344CB8AC3E}">
-        <p14:creationId xmlns:p14="http://schemas.microsoft.com/office/powerpoint/2010/main" val="897890252"/>
-      </p:ext>
-    </p:extLst>
-  </p:cSld>
-  <p:clrMapOvr>
-    <a:masterClrMapping/>
-  </p:clrMapOvr>
-</p:sld>
-</file>
-
 <file path=ppt/slides/slide9.xml><?xml version="1.0" encoding="utf-8"?>
 <p:sld xmlns:a="http://schemas.openxmlformats.org/drawingml/2006/main" xmlns:r="http://schemas.openxmlformats.org/officeDocument/2006/relationships" xmlns:p="http://schemas.openxmlformats.org/presentationml/2006/main">
   <p:cSld>
@@ -14647,70 +15427,7 @@
       </p:grpSpPr>
       <p:sp>
         <p:nvSpPr>
-          <p:cNvPr id="8" name="Rounded Rectangle 7"/>
-          <p:cNvSpPr/>
-          <p:nvPr/>
-        </p:nvSpPr>
-        <p:spPr bwMode="auto">
-          <a:xfrm>
-            <a:off x="524935" y="3418449"/>
-            <a:ext cx="11140018" cy="2532185"/>
-          </a:xfrm>
-          <a:prstGeom prst="roundRect">
-            <a:avLst/>
-          </a:prstGeom>
-          <a:solidFill>
-            <a:srgbClr val="272822"/>
-          </a:solidFill>
-          <a:ln w="12700" cap="flat" cmpd="sng" algn="ctr">
-            <a:noFill/>
-            <a:prstDash val="solid"/>
-            <a:round/>
-            <a:headEnd type="none" w="med" len="med"/>
-            <a:tailEnd type="none" w="med" len="med"/>
-          </a:ln>
-          <a:effectLst/>
-        </p:spPr>
-        <p:txBody>
-          <a:bodyPr vert="horz" wrap="none" lIns="72000" tIns="45720" rIns="72000" bIns="45720" numCol="1" rtlCol="0" anchor="t" anchorCtr="0" compatLnSpc="1">
-            <a:prstTxWarp prst="textNoShape">
-              <a:avLst/>
-            </a:prstTxWarp>
-          </a:bodyPr>
-          <a:lstStyle/>
-          <a:p>
-            <a:pPr marL="0" marR="0" indent="0" algn="l" defTabSz="914400" rtl="0" eaLnBrk="1" fontAlgn="base" latinLnBrk="0" hangingPunct="1">
-              <a:lnSpc>
-                <a:spcPct val="100000"/>
-              </a:lnSpc>
-              <a:spcBef>
-                <a:spcPct val="50000"/>
-              </a:spcBef>
-              <a:spcAft>
-                <a:spcPct val="0"/>
-              </a:spcAft>
-              <a:buClrTx/>
-              <a:buSzTx/>
-              <a:buFontTx/>
-              <a:buNone/>
-              <a:tabLst/>
-            </a:pPr>
-            <a:endParaRPr kumimoji="0" lang="en-US" sz="2000" b="0" i="0" u="none" strike="noStrike" cap="none" normalizeH="0" baseline="0" dirty="0">
-              <a:ln>
-                <a:noFill/>
-              </a:ln>
-              <a:solidFill>
-                <a:schemeClr val="tx1"/>
-              </a:solidFill>
-              <a:effectLst/>
-              <a:latin typeface="Arial" charset="0"/>
-            </a:endParaRPr>
-          </a:p>
-        </p:txBody>
-      </p:sp>
-      <p:sp>
-        <p:nvSpPr>
-          <p:cNvPr id="6" name="Content Placeholder 2"/>
+          <p:cNvPr id="3" name="Content Placeholder 2"/>
           <p:cNvSpPr>
             <a:spLocks noGrp="1"/>
           </p:cNvSpPr>
@@ -14720,8 +15437,8 @@
         </p:nvSpPr>
         <p:spPr>
           <a:xfrm>
-            <a:off x="529168" y="1110685"/>
-            <a:ext cx="11135785" cy="3852000"/>
+            <a:off x="379828" y="1800000"/>
+            <a:ext cx="11408898" cy="3852000"/>
           </a:xfrm>
           <a:ln>
             <a:noFill/>
@@ -14731,271 +15448,76 @@
           <a:bodyPr/>
           <a:lstStyle/>
           <a:p>
-            <a:r>
-              <a:rPr lang="sv-SE" dirty="0"/>
-              <a:t>All </a:t>
-            </a:r>
-            <a:r>
-              <a:rPr lang="sv-SE" dirty="0" err="1"/>
-              <a:t>statements</a:t>
-            </a:r>
-            <a:r>
-              <a:rPr lang="sv-SE" dirty="0"/>
+            <a:pPr marL="0" indent="0">
+              <a:buNone/>
+            </a:pPr>
+            <a:r>
+              <a:rPr lang="sv-SE" sz="8800" dirty="0"/>
+              <a:t>Just a </a:t>
+            </a:r>
+            <a:r>
+              <a:rPr lang="sv-SE" sz="8800" dirty="0" err="1"/>
+              <a:t>few</a:t>
+            </a:r>
+            <a:r>
+              <a:rPr lang="sv-SE" sz="8800" dirty="0"/>
               <a:t> </a:t>
             </a:r>
             <a:r>
-              <a:rPr lang="sv-SE" dirty="0" err="1"/>
-              <a:t>are</a:t>
-            </a:r>
-            <a:r>
-              <a:rPr lang="sv-SE" dirty="0"/>
+              <a:rPr lang="sv-SE" sz="8800" dirty="0" err="1"/>
+              <a:t>more</a:t>
+            </a:r>
+            <a:r>
+              <a:rPr lang="sv-SE" sz="8800" dirty="0"/>
               <a:t> </a:t>
             </a:r>
             <a:r>
-              <a:rPr lang="sv-SE" dirty="0" err="1"/>
-              <a:t>terminated</a:t>
-            </a:r>
-            <a:r>
-              <a:rPr lang="sv-SE" dirty="0"/>
+              <a:rPr lang="sv-SE" sz="8800" dirty="0" err="1"/>
+              <a:t>things</a:t>
+            </a:r>
+            <a:r>
+              <a:rPr lang="sv-SE" sz="8800" dirty="0"/>
               <a:t> </a:t>
             </a:r>
             <a:r>
-              <a:rPr lang="sv-SE" dirty="0" err="1"/>
+              <a:rPr lang="sv-SE" sz="8800" dirty="0" err="1"/>
+              <a:t>before</a:t>
+            </a:r>
+            <a:r>
+              <a:rPr lang="sv-SE" sz="8800" dirty="0"/>
+              <a:t> </a:t>
+            </a:r>
+            <a:r>
+              <a:rPr lang="sv-SE" sz="8800" dirty="0" err="1"/>
+              <a:t>we</a:t>
+            </a:r>
+            <a:r>
+              <a:rPr lang="sv-SE" sz="8800" dirty="0"/>
+              <a:t> start </a:t>
+            </a:r>
+            <a:r>
+              <a:rPr lang="sv-SE" sz="8800" dirty="0" err="1"/>
               <a:t>with</a:t>
             </a:r>
             <a:r>
-              <a:rPr lang="sv-SE" dirty="0"/>
-              <a:t> </a:t>
-            </a:r>
-            <a:r>
-              <a:rPr lang="sv-SE" dirty="0" err="1"/>
-              <a:t>semicolons</a:t>
-            </a:r>
-            <a:r>
-              <a:rPr lang="sv-SE" dirty="0"/>
-              <a:t>, </a:t>
-            </a:r>
-            <a:r>
-              <a:rPr lang="sv-SE" dirty="0">
-                <a:latin typeface="Consolas" panose="020B0609020204030204" pitchFamily="49" charset="0"/>
-                <a:cs typeface="Consolas" panose="020B0609020204030204" pitchFamily="49" charset="0"/>
-              </a:rPr>
-              <a:t>;</a:t>
-            </a:r>
-          </a:p>
-          <a:p>
-            <a:r>
-              <a:rPr lang="sv-SE" dirty="0"/>
-              <a:t>Strings </a:t>
-            </a:r>
-            <a:r>
-              <a:rPr lang="sv-SE" dirty="0" err="1"/>
-              <a:t>surrounded</a:t>
-            </a:r>
-            <a:r>
-              <a:rPr lang="sv-SE" dirty="0"/>
-              <a:t> </a:t>
-            </a:r>
-            <a:r>
-              <a:rPr lang="sv-SE" dirty="0" err="1"/>
-              <a:t>with</a:t>
-            </a:r>
-            <a:r>
-              <a:rPr lang="sv-SE" dirty="0"/>
-              <a:t> </a:t>
-            </a:r>
-            <a:r>
-              <a:rPr lang="sv-SE" dirty="0" err="1"/>
-              <a:t>single</a:t>
-            </a:r>
-            <a:r>
-              <a:rPr lang="sv-SE" dirty="0"/>
-              <a:t> </a:t>
-            </a:r>
-            <a:r>
-              <a:rPr lang="sv-SE" dirty="0" err="1"/>
-              <a:t>quotes</a:t>
-            </a:r>
-            <a:r>
-              <a:rPr lang="sv-SE" dirty="0"/>
-              <a:t> </a:t>
-            </a:r>
-            <a:r>
-              <a:rPr lang="sv-SE" dirty="0" err="1"/>
-              <a:t>are</a:t>
-            </a:r>
-            <a:r>
-              <a:rPr lang="sv-SE" dirty="0"/>
-              <a:t> taken </a:t>
-            </a:r>
-            <a:r>
-              <a:rPr lang="sv-SE" dirty="0" err="1"/>
-              <a:t>literally</a:t>
-            </a:r>
-            <a:r>
-              <a:rPr lang="sv-SE" dirty="0"/>
-              <a:t>. Double </a:t>
-            </a:r>
-            <a:r>
-              <a:rPr lang="sv-SE" dirty="0" err="1"/>
-              <a:t>quotes</a:t>
-            </a:r>
-            <a:r>
-              <a:rPr lang="sv-SE" dirty="0"/>
-              <a:t> </a:t>
-            </a:r>
-            <a:r>
-              <a:rPr lang="sv-SE" dirty="0" err="1"/>
-              <a:t>will</a:t>
-            </a:r>
-            <a:r>
-              <a:rPr lang="sv-SE" dirty="0"/>
-              <a:t> </a:t>
-            </a:r>
-            <a:r>
-              <a:rPr lang="sv-SE" dirty="0" err="1"/>
-              <a:t>expand</a:t>
-            </a:r>
-            <a:r>
-              <a:rPr lang="sv-SE" dirty="0"/>
-              <a:t> </a:t>
-            </a:r>
-            <a:r>
-              <a:rPr lang="sv-SE" dirty="0" err="1"/>
-              <a:t>variables</a:t>
-            </a:r>
-            <a:r>
-              <a:rPr lang="sv-SE" dirty="0"/>
-              <a:t>.</a:t>
-            </a:r>
-          </a:p>
-          <a:p>
-            <a:r>
-              <a:rPr lang="sv-SE" dirty="0"/>
-              <a:t>A </a:t>
-            </a:r>
-            <a:r>
-              <a:rPr lang="sv-SE" dirty="0" err="1"/>
-              <a:t>value</a:t>
-            </a:r>
-            <a:r>
-              <a:rPr lang="sv-SE" dirty="0"/>
-              <a:t> in a list is a </a:t>
-            </a:r>
-            <a:r>
-              <a:rPr lang="sv-SE" dirty="0" err="1"/>
-              <a:t>scalar</a:t>
-            </a:r>
-            <a:r>
-              <a:rPr lang="sv-SE" dirty="0"/>
-              <a:t>, </a:t>
-            </a:r>
-            <a:r>
-              <a:rPr lang="sv-SE" dirty="0" err="1"/>
-              <a:t>therefore</a:t>
-            </a:r>
-            <a:r>
-              <a:rPr lang="sv-SE" dirty="0"/>
-              <a:t> </a:t>
-            </a:r>
-            <a:r>
-              <a:rPr lang="sv-SE" dirty="0" err="1"/>
-              <a:t>when</a:t>
-            </a:r>
-            <a:r>
-              <a:rPr lang="sv-SE" dirty="0"/>
-              <a:t> </a:t>
-            </a:r>
-            <a:r>
-              <a:rPr lang="sv-SE" dirty="0" err="1"/>
-              <a:t>they</a:t>
-            </a:r>
-            <a:r>
-              <a:rPr lang="sv-SE" dirty="0"/>
-              <a:t> </a:t>
-            </a:r>
-            <a:r>
-              <a:rPr lang="sv-SE" dirty="0" err="1"/>
-              <a:t>are</a:t>
-            </a:r>
-            <a:r>
-              <a:rPr lang="sv-SE" dirty="0"/>
-              <a:t> </a:t>
-            </a:r>
-            <a:r>
-              <a:rPr lang="sv-SE" dirty="0" err="1"/>
-              <a:t>referred</a:t>
-            </a:r>
-            <a:r>
-              <a:rPr lang="sv-SE" dirty="0"/>
-              <a:t> to, the </a:t>
-            </a:r>
-            <a:r>
-              <a:rPr lang="sv-SE" dirty="0" err="1"/>
-              <a:t>scalar</a:t>
-            </a:r>
-            <a:r>
-              <a:rPr lang="sv-SE" dirty="0"/>
-              <a:t> </a:t>
-            </a:r>
-            <a:r>
-              <a:rPr lang="sv-SE" dirty="0" err="1"/>
-              <a:t>character</a:t>
-            </a:r>
-            <a:r>
-              <a:rPr lang="sv-SE" dirty="0"/>
-              <a:t> </a:t>
-            </a:r>
-            <a:r>
-              <a:rPr lang="sv-SE" dirty="0">
-                <a:latin typeface="Consolas" panose="020B0609020204030204" pitchFamily="49" charset="0"/>
-                <a:cs typeface="Consolas" panose="020B0609020204030204" pitchFamily="49" charset="0"/>
-              </a:rPr>
-              <a:t>$</a:t>
-            </a:r>
-            <a:r>
-              <a:rPr lang="sv-SE" dirty="0"/>
-              <a:t> is </a:t>
-            </a:r>
-            <a:r>
-              <a:rPr lang="sv-SE" dirty="0" err="1"/>
-              <a:t>used</a:t>
-            </a:r>
-            <a:r>
-              <a:rPr lang="sv-SE" dirty="0"/>
-              <a:t>. </a:t>
-            </a:r>
-          </a:p>
-        </p:txBody>
-      </p:sp>
-      <p:pic>
-        <p:nvPicPr>
-          <p:cNvPr id="7" name="Picture 6"/>
-          <p:cNvPicPr>
-            <a:picLocks noChangeAspect="1"/>
-          </p:cNvPicPr>
-          <p:nvPr/>
-        </p:nvPicPr>
-        <p:blipFill>
-          <a:blip r:embed="rId3"/>
-          <a:stretch>
-            <a:fillRect/>
-          </a:stretch>
-        </p:blipFill>
-        <p:spPr>
-          <a:xfrm>
-            <a:off x="669641" y="3715362"/>
-            <a:ext cx="10010775" cy="1962150"/>
-          </a:xfrm>
-          <a:prstGeom prst="rect">
-            <a:avLst/>
-          </a:prstGeom>
-        </p:spPr>
-      </p:pic>
+              <a:rPr lang="sv-SE" sz="8800" dirty="0"/>
+              <a:t> the </a:t>
+            </a:r>
+            <a:r>
+              <a:rPr lang="sv-SE" sz="8800" dirty="0" err="1"/>
+              <a:t>fun</a:t>
+            </a:r>
+            <a:r>
+              <a:rPr lang="sv-SE" sz="8800" dirty="0"/>
+              <a:t> stuff…</a:t>
+            </a:r>
+          </a:p>
+        </p:txBody>
+      </p:sp>
     </p:spTree>
     <p:extLst>
       <p:ext uri="{BB962C8B-B14F-4D97-AF65-F5344CB8AC3E}">
-        <p14:creationId xmlns:p14="http://schemas.microsoft.com/office/powerpoint/2010/main" val="2215112199"/>
+        <p14:creationId xmlns:p14="http://schemas.microsoft.com/office/powerpoint/2010/main" val="897890252"/>
       </p:ext>
     </p:extLst>
   </p:cSld>

</xml_diff>

<commit_message>
Modifies some of the exampels that were incorrect. Adds some clarifications to the presentation. Adds a chapter for flow control. Adds a new example script.
</commit_message>
<xml_diff>
--- a/superbasicperl.pptx
+++ b/superbasicperl.pptx
@@ -5,10 +5,10 @@
     <p:sldMasterId id="2147483672" r:id="rId1"/>
   </p:sldMasterIdLst>
   <p:notesMasterIdLst>
-    <p:notesMasterId r:id="rId27"/>
+    <p:notesMasterId r:id="rId28"/>
   </p:notesMasterIdLst>
   <p:handoutMasterIdLst>
-    <p:handoutMasterId r:id="rId28"/>
+    <p:handoutMasterId r:id="rId29"/>
   </p:handoutMasterIdLst>
   <p:sldIdLst>
     <p:sldId id="256" r:id="rId2"/>
@@ -23,19 +23,20 @@
     <p:sldId id="265" r:id="rId11"/>
     <p:sldId id="266" r:id="rId12"/>
     <p:sldId id="267" r:id="rId13"/>
-    <p:sldId id="269" r:id="rId14"/>
-    <p:sldId id="270" r:id="rId15"/>
-    <p:sldId id="271" r:id="rId16"/>
-    <p:sldId id="280" r:id="rId17"/>
-    <p:sldId id="272" r:id="rId18"/>
-    <p:sldId id="273" r:id="rId19"/>
-    <p:sldId id="274" r:id="rId20"/>
-    <p:sldId id="275" r:id="rId21"/>
-    <p:sldId id="276" r:id="rId22"/>
-    <p:sldId id="277" r:id="rId23"/>
-    <p:sldId id="278" r:id="rId24"/>
-    <p:sldId id="279" r:id="rId25"/>
-    <p:sldId id="262" r:id="rId26"/>
+    <p:sldId id="282" r:id="rId14"/>
+    <p:sldId id="269" r:id="rId15"/>
+    <p:sldId id="270" r:id="rId16"/>
+    <p:sldId id="271" r:id="rId17"/>
+    <p:sldId id="280" r:id="rId18"/>
+    <p:sldId id="272" r:id="rId19"/>
+    <p:sldId id="273" r:id="rId20"/>
+    <p:sldId id="274" r:id="rId21"/>
+    <p:sldId id="275" r:id="rId22"/>
+    <p:sldId id="276" r:id="rId23"/>
+    <p:sldId id="277" r:id="rId24"/>
+    <p:sldId id="278" r:id="rId25"/>
+    <p:sldId id="279" r:id="rId26"/>
+    <p:sldId id="262" r:id="rId27"/>
   </p:sldIdLst>
   <p:sldSz cx="12192000" cy="6858000"/>
   <p:notesSz cx="6858000" cy="9144000"/>
@@ -1342,7 +1343,10 @@
           <a:bodyPr/>
           <a:lstStyle/>
           <a:p>
-            <a:endParaRPr lang="en-US"/>
+            <a:r>
+              <a:rPr lang="en-US" dirty="0"/>
+              <a:t>Documentation for regex in Perl can be found at http://perldoc.perl.org/perlre.html </a:t>
+            </a:r>
           </a:p>
         </p:txBody>
       </p:sp>
@@ -1427,7 +1431,7 @@
           <a:bodyPr/>
           <a:lstStyle/>
           <a:p>
-            <a:fld id="{26E7ADD0-A0BA-4A04-AF04-81A6B3147999}" type="slidenum">
+            <a:fld id="{61913804-9CC0-4B7A-8FDD-7B2337CA6D3C}" type="slidenum">
               <a:rPr lang="en-US" smtClean="0"/>
               <a:t>13</a:t>
             </a:fld>
@@ -1438,7 +1442,7 @@
     </p:spTree>
     <p:extLst>
       <p:ext uri="{BB962C8B-B14F-4D97-AF65-F5344CB8AC3E}">
-        <p14:creationId xmlns:p14="http://schemas.microsoft.com/office/powerpoint/2010/main" val="999000779"/>
+        <p14:creationId xmlns:p14="http://schemas.microsoft.com/office/powerpoint/2010/main" val="454620951"/>
       </p:ext>
     </p:extLst>
   </p:cSld>
@@ -1492,10 +1496,7 @@
           <a:bodyPr/>
           <a:lstStyle/>
           <a:p>
-            <a:r>
-              <a:rPr lang="en-US" dirty="0"/>
-              <a:t>Documentation for regex in Perl can be found at http://perldoc.perl.org/perlre.html </a:t>
-            </a:r>
+            <a:endParaRPr lang="en-US"/>
           </a:p>
         </p:txBody>
       </p:sp>
@@ -1580,7 +1581,7 @@
           <a:bodyPr/>
           <a:lstStyle/>
           <a:p>
-            <a:fld id="{61913804-9CC0-4B7A-8FDD-7B2337CA6D3C}" type="slidenum">
+            <a:fld id="{26E7ADD0-A0BA-4A04-AF04-81A6B3147999}" type="slidenum">
               <a:rPr lang="en-US" smtClean="0"/>
               <a:t>14</a:t>
             </a:fld>
@@ -1591,7 +1592,7 @@
     </p:spTree>
     <p:extLst>
       <p:ext uri="{BB962C8B-B14F-4D97-AF65-F5344CB8AC3E}">
-        <p14:creationId xmlns:p14="http://schemas.microsoft.com/office/powerpoint/2010/main" val="4270665753"/>
+        <p14:creationId xmlns:p14="http://schemas.microsoft.com/office/powerpoint/2010/main" val="999000779"/>
       </p:ext>
     </p:extLst>
   </p:cSld>
@@ -1744,7 +1745,7 @@
     </p:spTree>
     <p:extLst>
       <p:ext uri="{BB962C8B-B14F-4D97-AF65-F5344CB8AC3E}">
-        <p14:creationId xmlns:p14="http://schemas.microsoft.com/office/powerpoint/2010/main" val="1707799828"/>
+        <p14:creationId xmlns:p14="http://schemas.microsoft.com/office/powerpoint/2010/main" val="4270665753"/>
       </p:ext>
     </p:extLst>
   </p:cSld>
@@ -1897,7 +1898,7 @@
     </p:spTree>
     <p:extLst>
       <p:ext uri="{BB962C8B-B14F-4D97-AF65-F5344CB8AC3E}">
-        <p14:creationId xmlns:p14="http://schemas.microsoft.com/office/powerpoint/2010/main" val="3443879051"/>
+        <p14:creationId xmlns:p14="http://schemas.microsoft.com/office/powerpoint/2010/main" val="1707799828"/>
       </p:ext>
     </p:extLst>
   </p:cSld>
@@ -1951,7 +1952,10 @@
           <a:bodyPr/>
           <a:lstStyle/>
           <a:p>
-            <a:endParaRPr lang="en-US" dirty="0"/>
+            <a:r>
+              <a:rPr lang="en-US" dirty="0"/>
+              <a:t>Documentation for regex in Perl can be found at http://perldoc.perl.org/perlre.html </a:t>
+            </a:r>
           </a:p>
         </p:txBody>
       </p:sp>
@@ -2047,7 +2051,7 @@
     </p:spTree>
     <p:extLst>
       <p:ext uri="{BB962C8B-B14F-4D97-AF65-F5344CB8AC3E}">
-        <p14:creationId xmlns:p14="http://schemas.microsoft.com/office/powerpoint/2010/main" val="2034081221"/>
+        <p14:creationId xmlns:p14="http://schemas.microsoft.com/office/powerpoint/2010/main" val="3443879051"/>
       </p:ext>
     </p:extLst>
   </p:cSld>
@@ -2197,7 +2201,7 @@
     </p:spTree>
     <p:extLst>
       <p:ext uri="{BB962C8B-B14F-4D97-AF65-F5344CB8AC3E}">
-        <p14:creationId xmlns:p14="http://schemas.microsoft.com/office/powerpoint/2010/main" val="3471844753"/>
+        <p14:creationId xmlns:p14="http://schemas.microsoft.com/office/powerpoint/2010/main" val="2034081221"/>
       </p:ext>
     </p:extLst>
   </p:cSld>
@@ -2347,7 +2351,7 @@
     </p:spTree>
     <p:extLst>
       <p:ext uri="{BB962C8B-B14F-4D97-AF65-F5344CB8AC3E}">
-        <p14:creationId xmlns:p14="http://schemas.microsoft.com/office/powerpoint/2010/main" val="121767707"/>
+        <p14:creationId xmlns:p14="http://schemas.microsoft.com/office/powerpoint/2010/main" val="3471844753"/>
       </p:ext>
     </p:extLst>
   </p:cSld>
@@ -2553,9 +2557,6 @@
           <a:p>
             <a:endParaRPr lang="en-US" dirty="0"/>
           </a:p>
-          <a:p>
-            <a:endParaRPr lang="en-US" dirty="0"/>
-          </a:p>
         </p:txBody>
       </p:sp>
       <p:sp>
@@ -2650,7 +2651,7 @@
     </p:spTree>
     <p:extLst>
       <p:ext uri="{BB962C8B-B14F-4D97-AF65-F5344CB8AC3E}">
-        <p14:creationId xmlns:p14="http://schemas.microsoft.com/office/powerpoint/2010/main" val="3736848920"/>
+        <p14:creationId xmlns:p14="http://schemas.microsoft.com/office/powerpoint/2010/main" val="121767707"/>
       </p:ext>
     </p:extLst>
   </p:cSld>
@@ -2803,7 +2804,7 @@
     </p:spTree>
     <p:extLst>
       <p:ext uri="{BB962C8B-B14F-4D97-AF65-F5344CB8AC3E}">
-        <p14:creationId xmlns:p14="http://schemas.microsoft.com/office/powerpoint/2010/main" val="3292289130"/>
+        <p14:creationId xmlns:p14="http://schemas.microsoft.com/office/powerpoint/2010/main" val="3736848920"/>
       </p:ext>
     </p:extLst>
   </p:cSld>
@@ -2956,7 +2957,7 @@
     </p:spTree>
     <p:extLst>
       <p:ext uri="{BB962C8B-B14F-4D97-AF65-F5344CB8AC3E}">
-        <p14:creationId xmlns:p14="http://schemas.microsoft.com/office/powerpoint/2010/main" val="1847563400"/>
+        <p14:creationId xmlns:p14="http://schemas.microsoft.com/office/powerpoint/2010/main" val="3292289130"/>
       </p:ext>
     </p:extLst>
   </p:cSld>
@@ -3012,6 +3013,9 @@
           <a:p>
             <a:endParaRPr lang="en-US" dirty="0"/>
           </a:p>
+          <a:p>
+            <a:endParaRPr lang="en-US" dirty="0"/>
+          </a:p>
         </p:txBody>
       </p:sp>
       <p:sp>
@@ -3106,7 +3110,7 @@
     </p:spTree>
     <p:extLst>
       <p:ext uri="{BB962C8B-B14F-4D97-AF65-F5344CB8AC3E}">
-        <p14:creationId xmlns:p14="http://schemas.microsoft.com/office/powerpoint/2010/main" val="1885773854"/>
+        <p14:creationId xmlns:p14="http://schemas.microsoft.com/office/powerpoint/2010/main" val="1847563400"/>
       </p:ext>
     </p:extLst>
   </p:cSld>
@@ -3162,9 +3166,6 @@
           <a:p>
             <a:endParaRPr lang="en-US" dirty="0"/>
           </a:p>
-          <a:p>
-            <a:endParaRPr lang="en-US" dirty="0"/>
-          </a:p>
         </p:txBody>
       </p:sp>
       <p:sp>
@@ -3259,7 +3260,7 @@
     </p:spTree>
     <p:extLst>
       <p:ext uri="{BB962C8B-B14F-4D97-AF65-F5344CB8AC3E}">
-        <p14:creationId xmlns:p14="http://schemas.microsoft.com/office/powerpoint/2010/main" val="955688559"/>
+        <p14:creationId xmlns:p14="http://schemas.microsoft.com/office/powerpoint/2010/main" val="1885773854"/>
       </p:ext>
     </p:extLst>
   </p:cSld>
@@ -3313,6 +3314,159 @@
           <a:bodyPr/>
           <a:lstStyle/>
           <a:p>
+            <a:endParaRPr lang="en-US" dirty="0"/>
+          </a:p>
+          <a:p>
+            <a:endParaRPr lang="en-US" dirty="0"/>
+          </a:p>
+        </p:txBody>
+      </p:sp>
+      <p:sp>
+        <p:nvSpPr>
+          <p:cNvPr id="4" name="Header Placeholder 3"/>
+          <p:cNvSpPr>
+            <a:spLocks noGrp="1"/>
+          </p:cNvSpPr>
+          <p:nvPr>
+            <p:ph type="hdr" sz="quarter" idx="10"/>
+          </p:nvPr>
+        </p:nvSpPr>
+        <p:spPr/>
+        <p:txBody>
+          <a:bodyPr/>
+          <a:lstStyle/>
+          <a:p>
+            <a:r>
+              <a:rPr lang="en-US"/>
+              <a:t> </a:t>
+            </a:r>
+          </a:p>
+        </p:txBody>
+      </p:sp>
+      <p:sp>
+        <p:nvSpPr>
+          <p:cNvPr id="5" name="Date Placeholder 4"/>
+          <p:cNvSpPr>
+            <a:spLocks noGrp="1"/>
+          </p:cNvSpPr>
+          <p:nvPr>
+            <p:ph type="dt" idx="11"/>
+          </p:nvPr>
+        </p:nvSpPr>
+        <p:spPr/>
+        <p:txBody>
+          <a:bodyPr/>
+          <a:lstStyle/>
+          <a:p>
+            <a:r>
+              <a:rPr lang="en-US"/>
+              <a:t>2016-05-27 </a:t>
+            </a:r>
+          </a:p>
+        </p:txBody>
+      </p:sp>
+      <p:sp>
+        <p:nvSpPr>
+          <p:cNvPr id="6" name="Footer Placeholder 5"/>
+          <p:cNvSpPr>
+            <a:spLocks noGrp="1"/>
+          </p:cNvSpPr>
+          <p:nvPr>
+            <p:ph type="ftr" sz="quarter" idx="12"/>
+          </p:nvPr>
+        </p:nvSpPr>
+        <p:spPr/>
+        <p:txBody>
+          <a:bodyPr/>
+          <a:lstStyle/>
+          <a:p>
+            <a:r>
+              <a:rPr lang="en-US"/>
+              <a:t> </a:t>
+            </a:r>
+          </a:p>
+        </p:txBody>
+      </p:sp>
+      <p:sp>
+        <p:nvSpPr>
+          <p:cNvPr id="7" name="Slide Number Placeholder 6"/>
+          <p:cNvSpPr>
+            <a:spLocks noGrp="1"/>
+          </p:cNvSpPr>
+          <p:nvPr>
+            <p:ph type="sldNum" sz="quarter" idx="13"/>
+          </p:nvPr>
+        </p:nvSpPr>
+        <p:spPr/>
+        <p:txBody>
+          <a:bodyPr/>
+          <a:lstStyle/>
+          <a:p>
+            <a:fld id="{61913804-9CC0-4B7A-8FDD-7B2337CA6D3C}" type="slidenum">
+              <a:rPr lang="en-US" smtClean="0"/>
+              <a:t>25</a:t>
+            </a:fld>
+            <a:endParaRPr lang="en-US"/>
+          </a:p>
+        </p:txBody>
+      </p:sp>
+    </p:spTree>
+    <p:extLst>
+      <p:ext uri="{BB962C8B-B14F-4D97-AF65-F5344CB8AC3E}">
+        <p14:creationId xmlns:p14="http://schemas.microsoft.com/office/powerpoint/2010/main" val="955688559"/>
+      </p:ext>
+    </p:extLst>
+  </p:cSld>
+  <p:clrMapOvr>
+    <a:masterClrMapping/>
+  </p:clrMapOvr>
+</p:notes>
+</file>
+
+<file path=ppt/notesSlides/notesSlide26.xml><?xml version="1.0" encoding="utf-8"?>
+<p:notes xmlns:a="http://schemas.openxmlformats.org/drawingml/2006/main" xmlns:r="http://schemas.openxmlformats.org/officeDocument/2006/relationships" xmlns:p="http://schemas.openxmlformats.org/presentationml/2006/main">
+  <p:cSld>
+    <p:spTree>
+      <p:nvGrpSpPr>
+        <p:cNvPr id="1" name=""/>
+        <p:cNvGrpSpPr/>
+        <p:nvPr/>
+      </p:nvGrpSpPr>
+      <p:grpSpPr>
+        <a:xfrm>
+          <a:off x="0" y="0"/>
+          <a:ext cx="0" cy="0"/>
+          <a:chOff x="0" y="0"/>
+          <a:chExt cx="0" cy="0"/>
+        </a:xfrm>
+      </p:grpSpPr>
+      <p:sp>
+        <p:nvSpPr>
+          <p:cNvPr id="2" name="Slide Image Placeholder 1"/>
+          <p:cNvSpPr>
+            <a:spLocks noGrp="1" noRot="1" noChangeAspect="1"/>
+          </p:cNvSpPr>
+          <p:nvPr>
+            <p:ph type="sldImg"/>
+          </p:nvPr>
+        </p:nvSpPr>
+        <p:spPr/>
+      </p:sp>
+      <p:sp>
+        <p:nvSpPr>
+          <p:cNvPr id="3" name="Notes Placeholder 2"/>
+          <p:cNvSpPr>
+            <a:spLocks noGrp="1"/>
+          </p:cNvSpPr>
+          <p:nvPr>
+            <p:ph type="body" idx="1"/>
+          </p:nvPr>
+        </p:nvSpPr>
+        <p:spPr/>
+        <p:txBody>
+          <a:bodyPr/>
+          <a:lstStyle/>
+          <a:p>
             <a:endParaRPr lang="en-US"/>
           </a:p>
         </p:txBody>
@@ -3400,7 +3554,7 @@
           <a:p>
             <a:fld id="{48E05FB9-EBA8-4E73-AB17-D7B3BC9BD9F0}" type="slidenum">
               <a:rPr lang="en-US" smtClean="0"/>
-              <a:t>25</a:t>
+              <a:t>26</a:t>
             </a:fld>
             <a:endParaRPr lang="en-US"/>
           </a:p>
@@ -6580,7 +6734,7 @@
           <a:p>
             <a:fld id="{E2F24CBB-8280-4EF4-8F27-826DBE45BF1C}" type="datetimeFigureOut">
               <a:rPr lang="sv-SE" smtClean="0"/>
-              <a:t>2016-06-06</a:t>
+              <a:t>2016-06-07</a:t>
             </a:fld>
             <a:endParaRPr lang="sv-SE"/>
           </a:p>
@@ -10036,7 +10190,70 @@
       </p:grpSpPr>
       <p:sp>
         <p:nvSpPr>
-          <p:cNvPr id="6" name="Content Placeholder 2"/>
+          <p:cNvPr id="5" name="Rounded Rectangle 4"/>
+          <p:cNvSpPr/>
+          <p:nvPr/>
+        </p:nvSpPr>
+        <p:spPr bwMode="auto">
+          <a:xfrm>
+            <a:off x="529167" y="2672862"/>
+            <a:ext cx="10809393" cy="3733566"/>
+          </a:xfrm>
+          <a:prstGeom prst="roundRect">
+            <a:avLst/>
+          </a:prstGeom>
+          <a:solidFill>
+            <a:srgbClr val="272822"/>
+          </a:solidFill>
+          <a:ln w="12700" cap="flat" cmpd="sng" algn="ctr">
+            <a:noFill/>
+            <a:prstDash val="solid"/>
+            <a:round/>
+            <a:headEnd type="none" w="med" len="med"/>
+            <a:tailEnd type="none" w="med" len="med"/>
+          </a:ln>
+          <a:effectLst/>
+        </p:spPr>
+        <p:txBody>
+          <a:bodyPr vert="horz" wrap="none" lIns="72000" tIns="45720" rIns="72000" bIns="45720" numCol="1" rtlCol="0" anchor="t" anchorCtr="0" compatLnSpc="1">
+            <a:prstTxWarp prst="textNoShape">
+              <a:avLst/>
+            </a:prstTxWarp>
+          </a:bodyPr>
+          <a:lstStyle/>
+          <a:p>
+            <a:pPr marL="0" marR="0" indent="0" algn="l" defTabSz="914400" rtl="0" eaLnBrk="1" fontAlgn="base" latinLnBrk="0" hangingPunct="1">
+              <a:lnSpc>
+                <a:spcPct val="100000"/>
+              </a:lnSpc>
+              <a:spcBef>
+                <a:spcPct val="50000"/>
+              </a:spcBef>
+              <a:spcAft>
+                <a:spcPct val="0"/>
+              </a:spcAft>
+              <a:buClrTx/>
+              <a:buSzTx/>
+              <a:buFontTx/>
+              <a:buNone/>
+              <a:tabLst/>
+            </a:pPr>
+            <a:endParaRPr kumimoji="0" lang="en-US" sz="2000" b="0" i="0" u="none" strike="noStrike" cap="none" normalizeH="0" baseline="0" dirty="0">
+              <a:ln>
+                <a:noFill/>
+              </a:ln>
+              <a:solidFill>
+                <a:schemeClr val="tx1"/>
+              </a:solidFill>
+              <a:effectLst/>
+              <a:latin typeface="Arial" charset="0"/>
+            </a:endParaRPr>
+          </a:p>
+        </p:txBody>
+      </p:sp>
+      <p:sp>
+        <p:nvSpPr>
+          <p:cNvPr id="2" name="Content Placeholder 1"/>
           <p:cNvSpPr>
             <a:spLocks noGrp="1"/>
           </p:cNvSpPr>
@@ -10044,292 +10261,121 @@
             <p:ph idx="1"/>
           </p:nvPr>
         </p:nvSpPr>
+        <p:spPr/>
+        <p:txBody>
+          <a:bodyPr/>
+          <a:lstStyle/>
+          <a:p>
+            <a:r>
+              <a:rPr lang="en-US" dirty="0"/>
+              <a:t>Perl has structures such as </a:t>
+            </a:r>
+            <a:r>
+              <a:rPr lang="en-US" i="1" dirty="0"/>
+              <a:t>if</a:t>
+            </a:r>
+            <a:r>
+              <a:rPr lang="en-US" dirty="0"/>
+              <a:t>, </a:t>
+            </a:r>
+            <a:r>
+              <a:rPr lang="en-US" i="1" dirty="0"/>
+              <a:t>for</a:t>
+            </a:r>
+            <a:r>
+              <a:rPr lang="en-US" dirty="0"/>
+              <a:t> and </a:t>
+            </a:r>
+            <a:r>
+              <a:rPr lang="en-US" i="1" dirty="0"/>
+              <a:t>while </a:t>
+            </a:r>
+            <a:r>
+              <a:rPr lang="en-US" dirty="0"/>
+              <a:t>for flow control.</a:t>
+            </a:r>
+          </a:p>
+          <a:p>
+            <a:r>
+              <a:rPr lang="en-US" dirty="0"/>
+              <a:t>I will not go into detail. Below are the general ideas for </a:t>
+            </a:r>
+            <a:r>
+              <a:rPr lang="en-US" i="1" dirty="0"/>
+              <a:t>if</a:t>
+            </a:r>
+            <a:r>
+              <a:rPr lang="en-US" dirty="0"/>
+              <a:t>s and </a:t>
+            </a:r>
+            <a:r>
+              <a:rPr lang="en-US" i="1" dirty="0" err="1"/>
+              <a:t>for</a:t>
+            </a:r>
+            <a:r>
+              <a:rPr lang="en-US" dirty="0" err="1"/>
+              <a:t>s</a:t>
+            </a:r>
+            <a:r>
+              <a:rPr lang="en-US" dirty="0"/>
+              <a:t>.</a:t>
+            </a:r>
+          </a:p>
+          <a:p>
+            <a:endParaRPr lang="en-US" dirty="0"/>
+          </a:p>
+        </p:txBody>
+      </p:sp>
+      <p:sp>
+        <p:nvSpPr>
+          <p:cNvPr id="3" name="Title 2"/>
+          <p:cNvSpPr>
+            <a:spLocks noGrp="1"/>
+          </p:cNvSpPr>
+          <p:nvPr>
+            <p:ph type="title"/>
+          </p:nvPr>
+        </p:nvSpPr>
+        <p:spPr/>
+        <p:txBody>
+          <a:bodyPr/>
+          <a:lstStyle/>
+          <a:p>
+            <a:r>
+              <a:rPr lang="en-US" dirty="0"/>
+              <a:t>Flow control</a:t>
+            </a:r>
+          </a:p>
+        </p:txBody>
+      </p:sp>
+      <p:pic>
+        <p:nvPicPr>
+          <p:cNvPr id="4" name="Picture 3"/>
+          <p:cNvPicPr>
+            <a:picLocks noChangeAspect="1"/>
+          </p:cNvPicPr>
+          <p:nvPr/>
+        </p:nvPicPr>
+        <p:blipFill>
+          <a:blip r:embed="rId3"/>
+          <a:stretch>
+            <a:fillRect/>
+          </a:stretch>
+        </p:blipFill>
         <p:spPr>
           <a:xfrm>
-            <a:off x="529166" y="972701"/>
-            <a:ext cx="11135785" cy="5118610"/>
+            <a:off x="1139483" y="2786252"/>
+            <a:ext cx="5685506" cy="3506785"/>
           </a:xfrm>
-          <a:ln>
-            <a:noFill/>
-          </a:ln>
+          <a:prstGeom prst="rect">
+            <a:avLst/>
+          </a:prstGeom>
         </p:spPr>
-        <p:txBody>
-          <a:bodyPr/>
-          <a:lstStyle/>
-          <a:p>
-            <a:r>
-              <a:rPr lang="sv-SE" dirty="0" err="1"/>
-              <a:t>Subroutines</a:t>
-            </a:r>
-            <a:r>
-              <a:rPr lang="sv-SE" dirty="0"/>
-              <a:t> </a:t>
-            </a:r>
-            <a:r>
-              <a:rPr lang="sv-SE" dirty="0" err="1"/>
-              <a:t>terminate</a:t>
-            </a:r>
-            <a:r>
-              <a:rPr lang="sv-SE" dirty="0"/>
-              <a:t> </a:t>
-            </a:r>
-            <a:r>
-              <a:rPr lang="sv-SE" dirty="0" err="1"/>
-              <a:t>when</a:t>
-            </a:r>
-            <a:r>
-              <a:rPr lang="sv-SE" dirty="0"/>
-              <a:t> </a:t>
-            </a:r>
-            <a:r>
-              <a:rPr lang="sv-SE" dirty="0" err="1"/>
-              <a:t>they</a:t>
-            </a:r>
-            <a:r>
-              <a:rPr lang="sv-SE" dirty="0"/>
-              <a:t> </a:t>
-            </a:r>
-            <a:r>
-              <a:rPr lang="sv-SE" dirty="0" err="1"/>
-              <a:t>encounter</a:t>
-            </a:r>
-            <a:r>
-              <a:rPr lang="sv-SE" dirty="0"/>
-              <a:t> a "</a:t>
-            </a:r>
-            <a:r>
-              <a:rPr lang="sv-SE" dirty="0" err="1"/>
-              <a:t>return</a:t>
-            </a:r>
-            <a:r>
-              <a:rPr lang="sv-SE" dirty="0"/>
-              <a:t>" </a:t>
-            </a:r>
-            <a:r>
-              <a:rPr lang="sv-SE" dirty="0" err="1"/>
-              <a:t>statement</a:t>
-            </a:r>
-            <a:r>
-              <a:rPr lang="sv-SE" dirty="0"/>
-              <a:t>. </a:t>
-            </a:r>
-            <a:r>
-              <a:rPr lang="sv-SE" dirty="0" err="1"/>
-              <a:t>Whatever</a:t>
-            </a:r>
-            <a:r>
-              <a:rPr lang="sv-SE" dirty="0"/>
-              <a:t> expression is </a:t>
-            </a:r>
-            <a:r>
-              <a:rPr lang="sv-SE" dirty="0" err="1"/>
-              <a:t>after</a:t>
-            </a:r>
-            <a:r>
-              <a:rPr lang="sv-SE" dirty="0"/>
-              <a:t> </a:t>
-            </a:r>
-            <a:r>
-              <a:rPr lang="sv-SE" dirty="0" err="1"/>
-              <a:t>return</a:t>
-            </a:r>
-            <a:r>
-              <a:rPr lang="sv-SE" dirty="0"/>
-              <a:t>, </a:t>
-            </a:r>
-            <a:r>
-              <a:rPr lang="sv-SE" dirty="0" err="1"/>
-              <a:t>will</a:t>
-            </a:r>
-            <a:r>
-              <a:rPr lang="sv-SE" dirty="0"/>
-              <a:t> be </a:t>
-            </a:r>
-            <a:r>
-              <a:rPr lang="sv-SE" dirty="0" err="1"/>
-              <a:t>returned</a:t>
-            </a:r>
-            <a:r>
-              <a:rPr lang="sv-SE" dirty="0"/>
-              <a:t> to the </a:t>
-            </a:r>
-            <a:r>
-              <a:rPr lang="sv-SE" dirty="0" err="1"/>
-              <a:t>calling</a:t>
-            </a:r>
-            <a:r>
-              <a:rPr lang="sv-SE" dirty="0"/>
-              <a:t> </a:t>
-            </a:r>
-            <a:r>
-              <a:rPr lang="sv-SE" dirty="0" err="1"/>
-              <a:t>routine</a:t>
-            </a:r>
-            <a:r>
-              <a:rPr lang="sv-SE" dirty="0"/>
-              <a:t>.</a:t>
-            </a:r>
-          </a:p>
-          <a:p>
-            <a:endParaRPr lang="sv-SE" dirty="0"/>
-          </a:p>
-          <a:p>
-            <a:r>
-              <a:rPr lang="sv-SE" dirty="0"/>
-              <a:t>If a </a:t>
-            </a:r>
-            <a:r>
-              <a:rPr lang="sv-SE" dirty="0" err="1"/>
-              <a:t>return</a:t>
-            </a:r>
-            <a:r>
-              <a:rPr lang="sv-SE" dirty="0"/>
-              <a:t> </a:t>
-            </a:r>
-            <a:r>
-              <a:rPr lang="sv-SE" dirty="0" err="1"/>
-              <a:t>statement</a:t>
-            </a:r>
-            <a:r>
-              <a:rPr lang="sv-SE" dirty="0"/>
-              <a:t> is </a:t>
-            </a:r>
-            <a:r>
-              <a:rPr lang="sv-SE" dirty="0" err="1"/>
-              <a:t>missing</a:t>
-            </a:r>
-            <a:r>
-              <a:rPr lang="sv-SE" dirty="0"/>
-              <a:t>, the last </a:t>
-            </a:r>
-            <a:r>
-              <a:rPr lang="sv-SE" dirty="0" err="1"/>
-              <a:t>evaluated</a:t>
-            </a:r>
-            <a:r>
-              <a:rPr lang="sv-SE" dirty="0"/>
-              <a:t> </a:t>
-            </a:r>
-            <a:r>
-              <a:rPr lang="sv-SE" dirty="0" err="1"/>
-              <a:t>value</a:t>
-            </a:r>
-            <a:r>
-              <a:rPr lang="sv-SE" dirty="0"/>
-              <a:t> is </a:t>
-            </a:r>
-            <a:r>
-              <a:rPr lang="sv-SE" dirty="0" err="1"/>
-              <a:t>returned</a:t>
-            </a:r>
-            <a:r>
-              <a:rPr lang="sv-SE" dirty="0"/>
-              <a:t>.</a:t>
-            </a:r>
-          </a:p>
-          <a:p>
-            <a:endParaRPr lang="sv-SE" dirty="0"/>
-          </a:p>
-          <a:p>
-            <a:r>
-              <a:rPr lang="sv-SE" dirty="0" err="1"/>
-              <a:t>That</a:t>
-            </a:r>
-            <a:r>
-              <a:rPr lang="sv-SE" dirty="0"/>
-              <a:t> </a:t>
-            </a:r>
-            <a:r>
-              <a:rPr lang="sv-SE" dirty="0" err="1"/>
-              <a:t>was</a:t>
-            </a:r>
-            <a:r>
-              <a:rPr lang="sv-SE" dirty="0"/>
-              <a:t> the </a:t>
-            </a:r>
-            <a:r>
-              <a:rPr lang="sv-SE" dirty="0" err="1"/>
-              <a:t>quick</a:t>
-            </a:r>
-            <a:r>
-              <a:rPr lang="sv-SE" dirty="0"/>
-              <a:t> version </a:t>
-            </a:r>
-            <a:r>
-              <a:rPr lang="sv-SE" dirty="0" err="1"/>
-              <a:t>of</a:t>
-            </a:r>
-            <a:r>
-              <a:rPr lang="sv-SE" dirty="0"/>
-              <a:t> Perl syntax. </a:t>
-            </a:r>
-            <a:r>
-              <a:rPr lang="sv-SE" dirty="0" err="1"/>
-              <a:t>Much</a:t>
-            </a:r>
-            <a:r>
-              <a:rPr lang="sv-SE" dirty="0"/>
-              <a:t> </a:t>
-            </a:r>
-            <a:r>
-              <a:rPr lang="sv-SE" dirty="0" err="1"/>
-              <a:t>more</a:t>
-            </a:r>
-            <a:r>
-              <a:rPr lang="sv-SE" dirty="0"/>
-              <a:t> is </a:t>
-            </a:r>
-            <a:r>
-              <a:rPr lang="sv-SE" dirty="0" err="1"/>
-              <a:t>available</a:t>
-            </a:r>
-            <a:r>
-              <a:rPr lang="sv-SE" dirty="0"/>
-              <a:t> in the Perl </a:t>
-            </a:r>
-            <a:r>
-              <a:rPr lang="sv-SE" dirty="0" err="1"/>
-              <a:t>documentation</a:t>
-            </a:r>
-            <a:r>
-              <a:rPr lang="sv-SE" dirty="0"/>
-              <a:t>, </a:t>
-            </a:r>
-            <a:r>
-              <a:rPr lang="sv-SE" dirty="0">
-                <a:hlinkClick r:id="rId3"/>
-              </a:rPr>
-              <a:t>http://perldoc.perl.org/</a:t>
-            </a:r>
-            <a:r>
-              <a:rPr lang="sv-SE" dirty="0"/>
-              <a:t> </a:t>
-            </a:r>
-          </a:p>
-          <a:p>
-            <a:endParaRPr lang="sv-SE" dirty="0"/>
-          </a:p>
-          <a:p>
-            <a:endParaRPr lang="sv-SE" dirty="0"/>
-          </a:p>
-          <a:p>
-            <a:endParaRPr lang="sv-SE" dirty="0"/>
-          </a:p>
-          <a:p>
-            <a:endParaRPr lang="sv-SE" dirty="0"/>
-          </a:p>
-          <a:p>
-            <a:endParaRPr lang="sv-SE" dirty="0"/>
-          </a:p>
-          <a:p>
-            <a:endParaRPr lang="sv-SE" dirty="0"/>
-          </a:p>
-        </p:txBody>
-      </p:sp>
+      </p:pic>
     </p:spTree>
     <p:extLst>
       <p:ext uri="{BB962C8B-B14F-4D97-AF65-F5344CB8AC3E}">
-        <p14:creationId xmlns:p14="http://schemas.microsoft.com/office/powerpoint/2010/main" val="481837147"/>
+        <p14:creationId xmlns:p14="http://schemas.microsoft.com/office/powerpoint/2010/main" val="3464780990"/>
       </p:ext>
     </p:extLst>
   </p:cSld>
@@ -10358,7 +10404,7 @@
       </p:grpSpPr>
       <p:sp>
         <p:nvSpPr>
-          <p:cNvPr id="2" name="Content Placeholder 1"/>
+          <p:cNvPr id="6" name="Content Placeholder 2"/>
           <p:cNvSpPr>
             <a:spLocks noGrp="1"/>
           </p:cNvSpPr>
@@ -10366,74 +10412,292 @@
             <p:ph idx="1"/>
           </p:nvPr>
         </p:nvSpPr>
-        <p:spPr/>
-        <p:txBody>
-          <a:bodyPr/>
-          <a:lstStyle/>
-          <a:p>
-            <a:r>
-              <a:rPr lang="en-US" dirty="0"/>
-              <a:t>Perl has excellent support for regular expressions!</a:t>
-            </a:r>
-          </a:p>
-          <a:p>
-            <a:r>
-              <a:rPr lang="en-US" dirty="0"/>
-              <a:t>Check for matches using the match operator </a:t>
-            </a:r>
-            <a:r>
-              <a:rPr lang="en-US" dirty="0">
-                <a:latin typeface="Consolas" panose="020B0609020204030204" pitchFamily="49" charset="0"/>
-                <a:cs typeface="Consolas" panose="020B0609020204030204" pitchFamily="49" charset="0"/>
+        <p:spPr>
+          <a:xfrm>
+            <a:off x="529166" y="972701"/>
+            <a:ext cx="11135785" cy="5118610"/>
+          </a:xfrm>
+          <a:ln>
+            <a:noFill/>
+          </a:ln>
+        </p:spPr>
+        <p:txBody>
+          <a:bodyPr/>
+          <a:lstStyle/>
+          <a:p>
+            <a:r>
+              <a:rPr lang="sv-SE" dirty="0" err="1"/>
+              <a:t>Subroutines</a:t>
+            </a:r>
+            <a:r>
+              <a:rPr lang="sv-SE" dirty="0"/>
+              <a:t> </a:t>
+            </a:r>
+            <a:r>
+              <a:rPr lang="sv-SE" dirty="0" err="1"/>
+              <a:t>terminate</a:t>
+            </a:r>
+            <a:r>
+              <a:rPr lang="sv-SE" dirty="0"/>
+              <a:t> </a:t>
+            </a:r>
+            <a:r>
+              <a:rPr lang="sv-SE" dirty="0" err="1"/>
+              <a:t>when</a:t>
+            </a:r>
+            <a:r>
+              <a:rPr lang="sv-SE" dirty="0"/>
+              <a:t> </a:t>
+            </a:r>
+            <a:r>
+              <a:rPr lang="sv-SE" dirty="0" err="1"/>
+              <a:t>they</a:t>
+            </a:r>
+            <a:r>
+              <a:rPr lang="sv-SE" dirty="0"/>
+              <a:t> </a:t>
+            </a:r>
+            <a:r>
+              <a:rPr lang="sv-SE" dirty="0" err="1"/>
+              <a:t>encounter</a:t>
+            </a:r>
+            <a:r>
+              <a:rPr lang="sv-SE" dirty="0"/>
+              <a:t> a "</a:t>
+            </a:r>
+            <a:r>
+              <a:rPr lang="sv-SE" dirty="0" err="1"/>
+              <a:t>return</a:t>
+            </a:r>
+            <a:r>
+              <a:rPr lang="sv-SE" dirty="0"/>
+              <a:t>" </a:t>
+            </a:r>
+            <a:r>
+              <a:rPr lang="sv-SE" dirty="0" err="1"/>
+              <a:t>statement</a:t>
+            </a:r>
+            <a:r>
+              <a:rPr lang="sv-SE" dirty="0"/>
+              <a:t>. </a:t>
+            </a:r>
+            <a:r>
+              <a:rPr lang="sv-SE" dirty="0" err="1"/>
+              <a:t>Whatever</a:t>
+            </a:r>
+            <a:r>
+              <a:rPr lang="sv-SE" dirty="0"/>
+              <a:t> expression is </a:t>
+            </a:r>
+            <a:r>
+              <a:rPr lang="sv-SE" dirty="0" err="1"/>
+              <a:t>after</a:t>
+            </a:r>
+            <a:r>
+              <a:rPr lang="sv-SE" dirty="0"/>
+              <a:t> </a:t>
+            </a:r>
+            <a:r>
+              <a:rPr lang="sv-SE" dirty="0" err="1"/>
+              <a:t>return</a:t>
+            </a:r>
+            <a:r>
+              <a:rPr lang="sv-SE" dirty="0"/>
+              <a:t>, </a:t>
+            </a:r>
+            <a:r>
+              <a:rPr lang="sv-SE" dirty="0" err="1"/>
+              <a:t>will</a:t>
+            </a:r>
+            <a:r>
+              <a:rPr lang="sv-SE" dirty="0"/>
+              <a:t> be </a:t>
+            </a:r>
+            <a:r>
+              <a:rPr lang="sv-SE" dirty="0" err="1"/>
+              <a:t>returned</a:t>
+            </a:r>
+            <a:r>
+              <a:rPr lang="sv-SE" dirty="0"/>
+              <a:t> to the </a:t>
+            </a:r>
+            <a:r>
+              <a:rPr lang="sv-SE" dirty="0" err="1"/>
+              <a:t>calling</a:t>
+            </a:r>
+            <a:r>
+              <a:rPr lang="sv-SE" dirty="0"/>
+              <a:t> </a:t>
+            </a:r>
+            <a:r>
+              <a:rPr lang="sv-SE" dirty="0" err="1"/>
+              <a:t>routine</a:t>
+            </a:r>
+            <a:r>
+              <a:rPr lang="sv-SE" dirty="0"/>
+              <a:t>.</a:t>
+            </a:r>
+          </a:p>
+          <a:p>
+            <a:endParaRPr lang="sv-SE" dirty="0"/>
+          </a:p>
+          <a:p>
+            <a:r>
+              <a:rPr lang="sv-SE" dirty="0"/>
+              <a:t>If a </a:t>
+            </a:r>
+            <a:r>
+              <a:rPr lang="sv-SE" dirty="0" err="1"/>
+              <a:t>return</a:t>
+            </a:r>
+            <a:r>
+              <a:rPr lang="sv-SE" dirty="0"/>
+              <a:t> </a:t>
+            </a:r>
+            <a:r>
+              <a:rPr lang="sv-SE" dirty="0" err="1"/>
+              <a:t>statement</a:t>
+            </a:r>
+            <a:r>
+              <a:rPr lang="sv-SE" dirty="0"/>
+              <a:t> is </a:t>
+            </a:r>
+            <a:r>
+              <a:rPr lang="sv-SE" dirty="0" err="1"/>
+              <a:t>missing</a:t>
+            </a:r>
+            <a:r>
+              <a:rPr lang="sv-SE" dirty="0"/>
+              <a:t>, the last </a:t>
+            </a:r>
+            <a:r>
+              <a:rPr lang="sv-SE" dirty="0" err="1"/>
+              <a:t>evaluated</a:t>
+            </a:r>
+            <a:r>
+              <a:rPr lang="sv-SE" dirty="0"/>
+              <a:t> </a:t>
+            </a:r>
+            <a:r>
+              <a:rPr lang="sv-SE" dirty="0" err="1"/>
+              <a:t>value</a:t>
+            </a:r>
+            <a:r>
+              <a:rPr lang="sv-SE" dirty="0"/>
+              <a:t> is </a:t>
+            </a:r>
+            <a:r>
+              <a:rPr lang="sv-SE" dirty="0" err="1"/>
+              <a:t>returned</a:t>
+            </a:r>
+            <a:r>
+              <a:rPr lang="sv-SE" dirty="0"/>
+              <a:t>.</a:t>
+            </a:r>
+          </a:p>
+          <a:p>
+            <a:endParaRPr lang="sv-SE" dirty="0"/>
+          </a:p>
+          <a:p>
+            <a:r>
+              <a:rPr lang="sv-SE" dirty="0" err="1"/>
+              <a:t>That</a:t>
+            </a:r>
+            <a:r>
+              <a:rPr lang="sv-SE" dirty="0"/>
+              <a:t> </a:t>
+            </a:r>
+            <a:r>
+              <a:rPr lang="sv-SE" dirty="0" err="1"/>
+              <a:t>was</a:t>
+            </a:r>
+            <a:r>
+              <a:rPr lang="sv-SE" dirty="0"/>
+              <a:t> the </a:t>
+            </a:r>
+            <a:r>
+              <a:rPr lang="sv-SE" dirty="0" err="1"/>
+              <a:t>quick</a:t>
+            </a:r>
+            <a:r>
+              <a:rPr lang="sv-SE" dirty="0"/>
+              <a:t> version </a:t>
+            </a:r>
+            <a:r>
+              <a:rPr lang="sv-SE" dirty="0" err="1"/>
+              <a:t>of</a:t>
+            </a:r>
+            <a:r>
+              <a:rPr lang="sv-SE" dirty="0"/>
+              <a:t> Perl syntax. </a:t>
+            </a:r>
+            <a:r>
+              <a:rPr lang="sv-SE" dirty="0" err="1"/>
+              <a:t>Much</a:t>
+            </a:r>
+            <a:r>
+              <a:rPr lang="sv-SE" dirty="0"/>
+              <a:t> </a:t>
+            </a:r>
+            <a:r>
+              <a:rPr lang="sv-SE" dirty="0" err="1"/>
+              <a:t>more</a:t>
+            </a:r>
+            <a:r>
+              <a:rPr lang="sv-SE" dirty="0"/>
+              <a:t> is </a:t>
+            </a:r>
+            <a:r>
+              <a:rPr lang="sv-SE" dirty="0" err="1"/>
+              <a:t>available</a:t>
+            </a:r>
+            <a:r>
+              <a:rPr lang="sv-SE" dirty="0"/>
+              <a:t> in the Perl </a:t>
+            </a:r>
+            <a:r>
+              <a:rPr lang="sv-SE" dirty="0" err="1"/>
+              <a:t>documentation</a:t>
+            </a:r>
+            <a:r>
+              <a:rPr lang="sv-SE" dirty="0"/>
+              <a:t>, </a:t>
+            </a:r>
+            <a:r>
+              <a:rPr lang="sv-SE" dirty="0">
+                <a:hlinkClick r:id="rId3"/>
               </a:rPr>
-              <a:t>=~</a:t>
-            </a:r>
-            <a:r>
-              <a:rPr lang="en-US" dirty="0"/>
-              <a:t> and its inverse </a:t>
-            </a:r>
-            <a:r>
-              <a:rPr lang="en-US" dirty="0">
-                <a:latin typeface="Consolas" panose="020B0609020204030204" pitchFamily="49" charset="0"/>
-                <a:cs typeface="Consolas" panose="020B0609020204030204" pitchFamily="49" charset="0"/>
-              </a:rPr>
-              <a:t>!~</a:t>
-            </a:r>
-          </a:p>
-          <a:p>
-            <a:r>
-              <a:rPr lang="en-US" dirty="0"/>
-              <a:t>Many operations with regex-like syntax exist.</a:t>
-            </a:r>
-          </a:p>
-        </p:txBody>
-      </p:sp>
-      <p:sp>
-        <p:nvSpPr>
-          <p:cNvPr id="3" name="Title 2"/>
-          <p:cNvSpPr>
-            <a:spLocks noGrp="1"/>
-          </p:cNvSpPr>
-          <p:nvPr>
-            <p:ph type="title"/>
-          </p:nvPr>
-        </p:nvSpPr>
-        <p:spPr/>
-        <p:txBody>
-          <a:bodyPr/>
-          <a:lstStyle/>
-          <a:p>
-            <a:r>
-              <a:rPr lang="en-US" dirty="0"/>
-              <a:t>Regular expressions</a:t>
-            </a:r>
+              <a:t>http://perldoc.perl.org/</a:t>
+            </a:r>
+            <a:r>
+              <a:rPr lang="sv-SE" dirty="0"/>
+              <a:t> </a:t>
+            </a:r>
+          </a:p>
+          <a:p>
+            <a:endParaRPr lang="sv-SE" dirty="0"/>
+          </a:p>
+          <a:p>
+            <a:endParaRPr lang="sv-SE" dirty="0"/>
+          </a:p>
+          <a:p>
+            <a:endParaRPr lang="sv-SE" dirty="0"/>
+          </a:p>
+          <a:p>
+            <a:endParaRPr lang="sv-SE" dirty="0"/>
+          </a:p>
+          <a:p>
+            <a:endParaRPr lang="sv-SE" dirty="0"/>
+          </a:p>
+          <a:p>
+            <a:endParaRPr lang="sv-SE" dirty="0"/>
           </a:p>
         </p:txBody>
       </p:sp>
     </p:spTree>
     <p:extLst>
       <p:ext uri="{BB962C8B-B14F-4D97-AF65-F5344CB8AC3E}">
-        <p14:creationId xmlns:p14="http://schemas.microsoft.com/office/powerpoint/2010/main" val="2467032573"/>
+        <p14:creationId xmlns:p14="http://schemas.microsoft.com/office/powerpoint/2010/main" val="481837147"/>
       </p:ext>
     </p:extLst>
   </p:cSld>
@@ -10462,6 +10726,110 @@
       </p:grpSpPr>
       <p:sp>
         <p:nvSpPr>
+          <p:cNvPr id="2" name="Content Placeholder 1"/>
+          <p:cNvSpPr>
+            <a:spLocks noGrp="1"/>
+          </p:cNvSpPr>
+          <p:nvPr>
+            <p:ph idx="1"/>
+          </p:nvPr>
+        </p:nvSpPr>
+        <p:spPr/>
+        <p:txBody>
+          <a:bodyPr/>
+          <a:lstStyle/>
+          <a:p>
+            <a:r>
+              <a:rPr lang="en-US" dirty="0"/>
+              <a:t>Perl has excellent support for regular expressions!</a:t>
+            </a:r>
+          </a:p>
+          <a:p>
+            <a:r>
+              <a:rPr lang="en-US" dirty="0"/>
+              <a:t>Check for matches using the match operator </a:t>
+            </a:r>
+            <a:r>
+              <a:rPr lang="en-US" dirty="0">
+                <a:latin typeface="Consolas" panose="020B0609020204030204" pitchFamily="49" charset="0"/>
+                <a:cs typeface="Consolas" panose="020B0609020204030204" pitchFamily="49" charset="0"/>
+              </a:rPr>
+              <a:t>=~</a:t>
+            </a:r>
+            <a:r>
+              <a:rPr lang="en-US" dirty="0"/>
+              <a:t> and its inverse </a:t>
+            </a:r>
+            <a:r>
+              <a:rPr lang="en-US" dirty="0">
+                <a:latin typeface="Consolas" panose="020B0609020204030204" pitchFamily="49" charset="0"/>
+                <a:cs typeface="Consolas" panose="020B0609020204030204" pitchFamily="49" charset="0"/>
+              </a:rPr>
+              <a:t>!~</a:t>
+            </a:r>
+          </a:p>
+          <a:p>
+            <a:r>
+              <a:rPr lang="en-US" dirty="0"/>
+              <a:t>Many operations with regex-like syntax exist.</a:t>
+            </a:r>
+          </a:p>
+        </p:txBody>
+      </p:sp>
+      <p:sp>
+        <p:nvSpPr>
+          <p:cNvPr id="3" name="Title 2"/>
+          <p:cNvSpPr>
+            <a:spLocks noGrp="1"/>
+          </p:cNvSpPr>
+          <p:nvPr>
+            <p:ph type="title"/>
+          </p:nvPr>
+        </p:nvSpPr>
+        <p:spPr/>
+        <p:txBody>
+          <a:bodyPr/>
+          <a:lstStyle/>
+          <a:p>
+            <a:r>
+              <a:rPr lang="en-US" dirty="0"/>
+              <a:t>Regular expressions</a:t>
+            </a:r>
+          </a:p>
+        </p:txBody>
+      </p:sp>
+    </p:spTree>
+    <p:extLst>
+      <p:ext uri="{BB962C8B-B14F-4D97-AF65-F5344CB8AC3E}">
+        <p14:creationId xmlns:p14="http://schemas.microsoft.com/office/powerpoint/2010/main" val="2467032573"/>
+      </p:ext>
+    </p:extLst>
+  </p:cSld>
+  <p:clrMapOvr>
+    <a:masterClrMapping/>
+  </p:clrMapOvr>
+</p:sld>
+</file>
+
+<file path=ppt/slides/slide16.xml><?xml version="1.0" encoding="utf-8"?>
+<p:sld xmlns:a="http://schemas.openxmlformats.org/drawingml/2006/main" xmlns:r="http://schemas.openxmlformats.org/officeDocument/2006/relationships" xmlns:p="http://schemas.openxmlformats.org/presentationml/2006/main">
+  <p:cSld>
+    <p:spTree>
+      <p:nvGrpSpPr>
+        <p:cNvPr id="1" name=""/>
+        <p:cNvGrpSpPr/>
+        <p:nvPr/>
+      </p:nvGrpSpPr>
+      <p:grpSpPr>
+        <a:xfrm>
+          <a:off x="0" y="0"/>
+          <a:ext cx="0" cy="0"/>
+          <a:chOff x="0" y="0"/>
+          <a:chExt cx="0" cy="0"/>
+        </a:xfrm>
+      </p:grpSpPr>
+      <p:sp>
+        <p:nvSpPr>
           <p:cNvPr id="8" name="Rounded Rectangle 7"/>
           <p:cNvSpPr/>
           <p:nvPr/>
@@ -10634,7 +11002,7 @@
       </p:pic>
       <p:pic>
         <p:nvPicPr>
-          <p:cNvPr id="6" name="Picture 5"/>
+          <p:cNvPr id="2" name="Picture 1"/>
           <p:cNvPicPr>
             <a:picLocks noChangeAspect="1"/>
           </p:cNvPicPr>
@@ -10648,8 +11016,8 @@
         </p:blipFill>
         <p:spPr>
           <a:xfrm>
-            <a:off x="776367" y="4194344"/>
-            <a:ext cx="6210300" cy="1933575"/>
+            <a:off x="776367" y="4184819"/>
+            <a:ext cx="6238875" cy="1952625"/>
           </a:xfrm>
           <a:prstGeom prst="rect">
             <a:avLst/>
@@ -10669,7 +11037,7 @@
 </p:sld>
 </file>
 
-<file path=ppt/slides/slide16.xml><?xml version="1.0" encoding="utf-8"?>
+<file path=ppt/slides/slide17.xml><?xml version="1.0" encoding="utf-8"?>
 <p:sld xmlns:a="http://schemas.openxmlformats.org/drawingml/2006/main" xmlns:r="http://schemas.openxmlformats.org/officeDocument/2006/relationships" xmlns:p="http://schemas.openxmlformats.org/presentationml/2006/main">
   <p:cSld>
     <p:spTree>
@@ -10841,7 +11209,7 @@
 </p:sld>
 </file>
 
-<file path=ppt/slides/slide17.xml><?xml version="1.0" encoding="utf-8"?>
+<file path=ppt/slides/slide18.xml><?xml version="1.0" encoding="utf-8"?>
 <p:sld xmlns:a="http://schemas.openxmlformats.org/drawingml/2006/main" xmlns:r="http://schemas.openxmlformats.org/officeDocument/2006/relationships" xmlns:p="http://schemas.openxmlformats.org/presentationml/2006/main">
   <p:cSld>
     <p:spTree>
@@ -11194,7 +11562,7 @@
 </p:sld>
 </file>
 
-<file path=ppt/slides/slide18.xml><?xml version="1.0" encoding="utf-8"?>
+<file path=ppt/slides/slide19.xml><?xml version="1.0" encoding="utf-8"?>
 <p:sld xmlns:a="http://schemas.openxmlformats.org/drawingml/2006/main" xmlns:r="http://schemas.openxmlformats.org/officeDocument/2006/relationships" xmlns:p="http://schemas.openxmlformats.org/presentationml/2006/main">
   <p:cSld>
     <p:spTree>
@@ -11403,296 +11771,6 @@
 </p:sld>
 </file>
 
-<file path=ppt/slides/slide19.xml><?xml version="1.0" encoding="utf-8"?>
-<p:sld xmlns:a="http://schemas.openxmlformats.org/drawingml/2006/main" xmlns:r="http://schemas.openxmlformats.org/officeDocument/2006/relationships" xmlns:p="http://schemas.openxmlformats.org/presentationml/2006/main">
-  <p:cSld>
-    <p:spTree>
-      <p:nvGrpSpPr>
-        <p:cNvPr id="1" name=""/>
-        <p:cNvGrpSpPr/>
-        <p:nvPr/>
-      </p:nvGrpSpPr>
-      <p:grpSpPr>
-        <a:xfrm>
-          <a:off x="0" y="0"/>
-          <a:ext cx="0" cy="0"/>
-          <a:chOff x="0" y="0"/>
-          <a:chExt cx="0" cy="0"/>
-        </a:xfrm>
-      </p:grpSpPr>
-      <p:sp>
-        <p:nvSpPr>
-          <p:cNvPr id="5" name="Rounded Rectangle 4"/>
-          <p:cNvSpPr/>
-          <p:nvPr/>
-        </p:nvSpPr>
-        <p:spPr bwMode="auto">
-          <a:xfrm>
-            <a:off x="524935" y="2796500"/>
-            <a:ext cx="11135785" cy="1564485"/>
-          </a:xfrm>
-          <a:prstGeom prst="roundRect">
-            <a:avLst/>
-          </a:prstGeom>
-          <a:solidFill>
-            <a:srgbClr val="272822"/>
-          </a:solidFill>
-          <a:ln w="12700" cap="flat" cmpd="sng" algn="ctr">
-            <a:noFill/>
-            <a:prstDash val="solid"/>
-            <a:round/>
-            <a:headEnd type="none" w="med" len="med"/>
-            <a:tailEnd type="none" w="med" len="med"/>
-          </a:ln>
-          <a:effectLst/>
-        </p:spPr>
-        <p:txBody>
-          <a:bodyPr vert="horz" wrap="none" lIns="72000" tIns="45720" rIns="72000" bIns="45720" numCol="1" rtlCol="0" anchor="t" anchorCtr="0" compatLnSpc="1">
-            <a:prstTxWarp prst="textNoShape">
-              <a:avLst/>
-            </a:prstTxWarp>
-          </a:bodyPr>
-          <a:lstStyle/>
-          <a:p>
-            <a:pPr marL="0" marR="0" indent="0" algn="l" defTabSz="914400" rtl="0" eaLnBrk="1" fontAlgn="base" latinLnBrk="0" hangingPunct="1">
-              <a:lnSpc>
-                <a:spcPct val="100000"/>
-              </a:lnSpc>
-              <a:spcBef>
-                <a:spcPct val="50000"/>
-              </a:spcBef>
-              <a:spcAft>
-                <a:spcPct val="0"/>
-              </a:spcAft>
-              <a:buClrTx/>
-              <a:buSzTx/>
-              <a:buFontTx/>
-              <a:buNone/>
-              <a:tabLst/>
-            </a:pPr>
-            <a:endParaRPr kumimoji="0" lang="en-US" sz="2000" b="0" i="0" u="none" strike="noStrike" cap="none" normalizeH="0" baseline="0" dirty="0">
-              <a:ln>
-                <a:noFill/>
-              </a:ln>
-              <a:solidFill>
-                <a:schemeClr val="tx1"/>
-              </a:solidFill>
-              <a:effectLst/>
-              <a:latin typeface="Arial" charset="0"/>
-            </a:endParaRPr>
-          </a:p>
-        </p:txBody>
-      </p:sp>
-      <p:sp>
-        <p:nvSpPr>
-          <p:cNvPr id="3" name="Title 2"/>
-          <p:cNvSpPr>
-            <a:spLocks noGrp="1"/>
-          </p:cNvSpPr>
-          <p:nvPr>
-            <p:ph type="title"/>
-          </p:nvPr>
-        </p:nvSpPr>
-        <p:spPr/>
-        <p:txBody>
-          <a:bodyPr/>
-          <a:lstStyle/>
-          <a:p>
-            <a:r>
-              <a:rPr lang="en-US" dirty="0"/>
-              <a:t>grep</a:t>
-            </a:r>
-          </a:p>
-        </p:txBody>
-      </p:sp>
-      <p:sp>
-        <p:nvSpPr>
-          <p:cNvPr id="7" name="Content Placeholder 1"/>
-          <p:cNvSpPr>
-            <a:spLocks noGrp="1"/>
-          </p:cNvSpPr>
-          <p:nvPr>
-            <p:ph idx="1"/>
-          </p:nvPr>
-        </p:nvSpPr>
-        <p:spPr>
-          <a:xfrm>
-            <a:off x="529168" y="1800000"/>
-            <a:ext cx="11135785" cy="3852000"/>
-          </a:xfrm>
-        </p:spPr>
-        <p:txBody>
-          <a:bodyPr/>
-          <a:lstStyle/>
-          <a:p>
-            <a:r>
-              <a:rPr lang="en-US" dirty="0"/>
-              <a:t>grep is a command that is similar to, but not the same as, grep in </a:t>
-            </a:r>
-            <a:r>
-              <a:rPr lang="en-US" dirty="0" err="1"/>
-              <a:t>unix</a:t>
-            </a:r>
-            <a:r>
-              <a:rPr lang="en-US" dirty="0"/>
-              <a:t>.</a:t>
-            </a:r>
-          </a:p>
-          <a:p>
-            <a:r>
-              <a:rPr lang="en-US" dirty="0"/>
-              <a:t>It goes through a list and returns all matches.</a:t>
-            </a:r>
-          </a:p>
-          <a:p>
-            <a:endParaRPr lang="en-US" dirty="0"/>
-          </a:p>
-        </p:txBody>
-      </p:sp>
-      <p:sp>
-        <p:nvSpPr>
-          <p:cNvPr id="8" name="Rectangle 7"/>
-          <p:cNvSpPr/>
-          <p:nvPr/>
-        </p:nvSpPr>
-        <p:spPr bwMode="auto">
-          <a:xfrm>
-            <a:off x="524935" y="4679725"/>
-            <a:ext cx="11135785" cy="914400"/>
-          </a:xfrm>
-          <a:prstGeom prst="rect">
-            <a:avLst/>
-          </a:prstGeom>
-          <a:solidFill>
-            <a:srgbClr val="000000"/>
-          </a:solidFill>
-          <a:ln w="12700" cap="flat" cmpd="sng" algn="ctr">
-            <a:noFill/>
-            <a:prstDash val="solid"/>
-            <a:round/>
-            <a:headEnd type="none" w="med" len="med"/>
-            <a:tailEnd type="none" w="med" len="med"/>
-          </a:ln>
-          <a:effectLst/>
-        </p:spPr>
-        <p:txBody>
-          <a:bodyPr vert="horz" wrap="none" lIns="72000" tIns="45720" rIns="72000" bIns="45720" numCol="1" rtlCol="0" anchor="t" anchorCtr="0" compatLnSpc="1">
-            <a:prstTxWarp prst="textNoShape">
-              <a:avLst/>
-            </a:prstTxWarp>
-          </a:bodyPr>
-          <a:lstStyle/>
-          <a:p>
-            <a:pPr marL="0" marR="0" indent="0" algn="l" defTabSz="914400" rtl="0" eaLnBrk="1" fontAlgn="base" latinLnBrk="0" hangingPunct="1">
-              <a:lnSpc>
-                <a:spcPct val="100000"/>
-              </a:lnSpc>
-              <a:spcBef>
-                <a:spcPct val="50000"/>
-              </a:spcBef>
-              <a:spcAft>
-                <a:spcPct val="0"/>
-              </a:spcAft>
-              <a:buClrTx/>
-              <a:buSzTx/>
-              <a:buFontTx/>
-              <a:buNone/>
-              <a:tabLst/>
-            </a:pPr>
-            <a:endParaRPr kumimoji="0" lang="en-US" sz="2000" b="0" i="0" u="none" strike="noStrike" cap="none" normalizeH="0" baseline="0">
-              <a:ln>
-                <a:noFill/>
-              </a:ln>
-              <a:solidFill>
-                <a:schemeClr val="tx1"/>
-              </a:solidFill>
-              <a:effectLst/>
-              <a:latin typeface="Arial" charset="0"/>
-            </a:endParaRPr>
-          </a:p>
-        </p:txBody>
-      </p:sp>
-      <p:sp>
-        <p:nvSpPr>
-          <p:cNvPr id="9" name="Rectangle 8"/>
-          <p:cNvSpPr/>
-          <p:nvPr/>
-        </p:nvSpPr>
-        <p:spPr>
-          <a:xfrm>
-            <a:off x="773566" y="4832738"/>
-            <a:ext cx="9677649" cy="584775"/>
-          </a:xfrm>
-          <a:prstGeom prst="rect">
-            <a:avLst/>
-          </a:prstGeom>
-        </p:spPr>
-        <p:txBody>
-          <a:bodyPr wrap="none">
-            <a:spAutoFit/>
-          </a:bodyPr>
-          <a:lstStyle/>
-          <a:p>
-            <a:r>
-              <a:rPr lang="en-US" sz="3200" dirty="0" err="1">
-                <a:solidFill>
-                  <a:schemeClr val="bg1"/>
-                </a:solidFill>
-                <a:latin typeface="Consolas" panose="020B0609020204030204" pitchFamily="49" charset="0"/>
-                <a:cs typeface="Consolas" panose="020B0609020204030204" pitchFamily="49" charset="0"/>
-              </a:rPr>
-              <a:t>perl</a:t>
-            </a:r>
-            <a:r>
-              <a:rPr lang="en-US" sz="3200" dirty="0">
-                <a:solidFill>
-                  <a:schemeClr val="bg1"/>
-                </a:solidFill>
-                <a:latin typeface="Consolas" panose="020B0609020204030204" pitchFamily="49" charset="0"/>
-                <a:cs typeface="Consolas" panose="020B0609020204030204" pitchFamily="49" charset="0"/>
-              </a:rPr>
-              <a:t> ducks.pl "Donald Duck" "Mickey Mouse"</a:t>
-            </a:r>
-          </a:p>
-        </p:txBody>
-      </p:sp>
-      <p:pic>
-        <p:nvPicPr>
-          <p:cNvPr id="6" name="Picture 5"/>
-          <p:cNvPicPr>
-            <a:picLocks noChangeAspect="1"/>
-          </p:cNvPicPr>
-          <p:nvPr/>
-        </p:nvPicPr>
-        <p:blipFill>
-          <a:blip r:embed="rId3"/>
-          <a:stretch>
-            <a:fillRect/>
-          </a:stretch>
-        </p:blipFill>
-        <p:spPr>
-          <a:xfrm>
-            <a:off x="773566" y="3078679"/>
-            <a:ext cx="8305800" cy="1000125"/>
-          </a:xfrm>
-          <a:prstGeom prst="rect">
-            <a:avLst/>
-          </a:prstGeom>
-        </p:spPr>
-      </p:pic>
-    </p:spTree>
-    <p:extLst>
-      <p:ext uri="{BB962C8B-B14F-4D97-AF65-F5344CB8AC3E}">
-        <p14:creationId xmlns:p14="http://schemas.microsoft.com/office/powerpoint/2010/main" val="155461775"/>
-      </p:ext>
-    </p:extLst>
-  </p:cSld>
-  <p:clrMapOvr>
-    <a:masterClrMapping/>
-  </p:clrMapOvr>
-</p:sld>
-</file>
-
 <file path=ppt/slides/slide2.xml><?xml version="1.0" encoding="utf-8"?>
 <p:sld xmlns:a="http://schemas.openxmlformats.org/drawingml/2006/main" xmlns:r="http://schemas.openxmlformats.org/officeDocument/2006/relationships" xmlns:p="http://schemas.openxmlformats.org/presentationml/2006/main">
   <p:cSld>
@@ -12068,13 +12146,142 @@
       </p:grpSpPr>
       <p:sp>
         <p:nvSpPr>
-          <p:cNvPr id="11" name="Rectangle 10"/>
+          <p:cNvPr id="5" name="Rounded Rectangle 4"/>
           <p:cNvSpPr/>
           <p:nvPr/>
         </p:nvSpPr>
         <p:spPr bwMode="auto">
           <a:xfrm>
-            <a:off x="524935" y="5298704"/>
+            <a:off x="524935" y="2796500"/>
+            <a:ext cx="11135785" cy="1706613"/>
+          </a:xfrm>
+          <a:prstGeom prst="roundRect">
+            <a:avLst/>
+          </a:prstGeom>
+          <a:solidFill>
+            <a:srgbClr val="272822"/>
+          </a:solidFill>
+          <a:ln w="12700" cap="flat" cmpd="sng" algn="ctr">
+            <a:noFill/>
+            <a:prstDash val="solid"/>
+            <a:round/>
+            <a:headEnd type="none" w="med" len="med"/>
+            <a:tailEnd type="none" w="med" len="med"/>
+          </a:ln>
+          <a:effectLst/>
+        </p:spPr>
+        <p:txBody>
+          <a:bodyPr vert="horz" wrap="none" lIns="72000" tIns="45720" rIns="72000" bIns="45720" numCol="1" rtlCol="0" anchor="t" anchorCtr="0" compatLnSpc="1">
+            <a:prstTxWarp prst="textNoShape">
+              <a:avLst/>
+            </a:prstTxWarp>
+          </a:bodyPr>
+          <a:lstStyle/>
+          <a:p>
+            <a:pPr marL="0" marR="0" indent="0" algn="l" defTabSz="914400" rtl="0" eaLnBrk="1" fontAlgn="base" latinLnBrk="0" hangingPunct="1">
+              <a:lnSpc>
+                <a:spcPct val="100000"/>
+              </a:lnSpc>
+              <a:spcBef>
+                <a:spcPct val="50000"/>
+              </a:spcBef>
+              <a:spcAft>
+                <a:spcPct val="0"/>
+              </a:spcAft>
+              <a:buClrTx/>
+              <a:buSzTx/>
+              <a:buFontTx/>
+              <a:buNone/>
+              <a:tabLst/>
+            </a:pPr>
+            <a:endParaRPr kumimoji="0" lang="en-US" sz="2000" b="0" i="0" u="none" strike="noStrike" cap="none" normalizeH="0" baseline="0" dirty="0">
+              <a:ln>
+                <a:noFill/>
+              </a:ln>
+              <a:solidFill>
+                <a:schemeClr val="tx1"/>
+              </a:solidFill>
+              <a:effectLst/>
+              <a:latin typeface="Arial" charset="0"/>
+            </a:endParaRPr>
+          </a:p>
+        </p:txBody>
+      </p:sp>
+      <p:sp>
+        <p:nvSpPr>
+          <p:cNvPr id="3" name="Title 2"/>
+          <p:cNvSpPr>
+            <a:spLocks noGrp="1"/>
+          </p:cNvSpPr>
+          <p:nvPr>
+            <p:ph type="title"/>
+          </p:nvPr>
+        </p:nvSpPr>
+        <p:spPr/>
+        <p:txBody>
+          <a:bodyPr/>
+          <a:lstStyle/>
+          <a:p>
+            <a:r>
+              <a:rPr lang="en-US" dirty="0"/>
+              <a:t>grep</a:t>
+            </a:r>
+          </a:p>
+        </p:txBody>
+      </p:sp>
+      <p:sp>
+        <p:nvSpPr>
+          <p:cNvPr id="7" name="Content Placeholder 1"/>
+          <p:cNvSpPr>
+            <a:spLocks noGrp="1"/>
+          </p:cNvSpPr>
+          <p:nvPr>
+            <p:ph idx="1"/>
+          </p:nvPr>
+        </p:nvSpPr>
+        <p:spPr>
+          <a:xfrm>
+            <a:off x="529168" y="1800000"/>
+            <a:ext cx="11135785" cy="3852000"/>
+          </a:xfrm>
+        </p:spPr>
+        <p:txBody>
+          <a:bodyPr/>
+          <a:lstStyle/>
+          <a:p>
+            <a:r>
+              <a:rPr lang="en-US" dirty="0"/>
+              <a:t>grep is a command that is similar to, but not the same as, grep in </a:t>
+            </a:r>
+            <a:r>
+              <a:rPr lang="en-US" dirty="0" err="1"/>
+              <a:t>unix</a:t>
+            </a:r>
+            <a:r>
+              <a:rPr lang="en-US" dirty="0"/>
+              <a:t>.</a:t>
+            </a:r>
+          </a:p>
+          <a:p>
+            <a:r>
+              <a:rPr lang="en-US" dirty="0"/>
+              <a:t>It goes through a list and returns all matches.</a:t>
+            </a:r>
+          </a:p>
+          <a:p>
+            <a:endParaRPr lang="en-US" dirty="0"/>
+          </a:p>
+        </p:txBody>
+      </p:sp>
+      <p:sp>
+        <p:nvSpPr>
+          <p:cNvPr id="8" name="Rectangle 7"/>
+          <p:cNvSpPr/>
+          <p:nvPr/>
+        </p:nvSpPr>
+        <p:spPr bwMode="auto">
+          <a:xfrm>
+            <a:off x="524935" y="4679725"/>
             <a:ext cx="11135785" cy="914400"/>
           </a:xfrm>
           <a:prstGeom prst="rect">
@@ -12131,6 +12338,167 @@
       </p:sp>
       <p:sp>
         <p:nvSpPr>
+          <p:cNvPr id="9" name="Rectangle 8"/>
+          <p:cNvSpPr/>
+          <p:nvPr/>
+        </p:nvSpPr>
+        <p:spPr>
+          <a:xfrm>
+            <a:off x="773566" y="4832738"/>
+            <a:ext cx="9677649" cy="584775"/>
+          </a:xfrm>
+          <a:prstGeom prst="rect">
+            <a:avLst/>
+          </a:prstGeom>
+        </p:spPr>
+        <p:txBody>
+          <a:bodyPr wrap="none">
+            <a:spAutoFit/>
+          </a:bodyPr>
+          <a:lstStyle/>
+          <a:p>
+            <a:r>
+              <a:rPr lang="en-US" sz="3200" dirty="0" err="1">
+                <a:solidFill>
+                  <a:schemeClr val="bg1"/>
+                </a:solidFill>
+                <a:latin typeface="Consolas" panose="020B0609020204030204" pitchFamily="49" charset="0"/>
+                <a:cs typeface="Consolas" panose="020B0609020204030204" pitchFamily="49" charset="0"/>
+              </a:rPr>
+              <a:t>perl</a:t>
+            </a:r>
+            <a:r>
+              <a:rPr lang="en-US" sz="3200" dirty="0">
+                <a:solidFill>
+                  <a:schemeClr val="bg1"/>
+                </a:solidFill>
+                <a:latin typeface="Consolas" panose="020B0609020204030204" pitchFamily="49" charset="0"/>
+                <a:cs typeface="Consolas" panose="020B0609020204030204" pitchFamily="49" charset="0"/>
+              </a:rPr>
+              <a:t> ducks.pl "Donald Duck" "Mickey Mouse"</a:t>
+            </a:r>
+          </a:p>
+        </p:txBody>
+      </p:sp>
+      <p:pic>
+        <p:nvPicPr>
+          <p:cNvPr id="2" name="Picture 1"/>
+          <p:cNvPicPr>
+            <a:picLocks noChangeAspect="1"/>
+          </p:cNvPicPr>
+          <p:nvPr/>
+        </p:nvPicPr>
+        <p:blipFill>
+          <a:blip r:embed="rId3"/>
+          <a:stretch>
+            <a:fillRect/>
+          </a:stretch>
+        </p:blipFill>
+        <p:spPr>
+          <a:xfrm>
+            <a:off x="773566" y="2903221"/>
+            <a:ext cx="8229600" cy="1485900"/>
+          </a:xfrm>
+          <a:prstGeom prst="rect">
+            <a:avLst/>
+          </a:prstGeom>
+        </p:spPr>
+      </p:pic>
+    </p:spTree>
+    <p:extLst>
+      <p:ext uri="{BB962C8B-B14F-4D97-AF65-F5344CB8AC3E}">
+        <p14:creationId xmlns:p14="http://schemas.microsoft.com/office/powerpoint/2010/main" val="155461775"/>
+      </p:ext>
+    </p:extLst>
+  </p:cSld>
+  <p:clrMapOvr>
+    <a:masterClrMapping/>
+  </p:clrMapOvr>
+</p:sld>
+</file>
+
+<file path=ppt/slides/slide21.xml><?xml version="1.0" encoding="utf-8"?>
+<p:sld xmlns:a="http://schemas.openxmlformats.org/drawingml/2006/main" xmlns:r="http://schemas.openxmlformats.org/officeDocument/2006/relationships" xmlns:p="http://schemas.openxmlformats.org/presentationml/2006/main">
+  <p:cSld>
+    <p:spTree>
+      <p:nvGrpSpPr>
+        <p:cNvPr id="1" name=""/>
+        <p:cNvGrpSpPr/>
+        <p:nvPr/>
+      </p:nvGrpSpPr>
+      <p:grpSpPr>
+        <a:xfrm>
+          <a:off x="0" y="0"/>
+          <a:ext cx="0" cy="0"/>
+          <a:chOff x="0" y="0"/>
+          <a:chExt cx="0" cy="0"/>
+        </a:xfrm>
+      </p:grpSpPr>
+      <p:sp>
+        <p:nvSpPr>
+          <p:cNvPr id="11" name="Rectangle 10"/>
+          <p:cNvSpPr/>
+          <p:nvPr/>
+        </p:nvSpPr>
+        <p:spPr bwMode="auto">
+          <a:xfrm>
+            <a:off x="524935" y="5298704"/>
+            <a:ext cx="11135785" cy="914400"/>
+          </a:xfrm>
+          <a:prstGeom prst="rect">
+            <a:avLst/>
+          </a:prstGeom>
+          <a:solidFill>
+            <a:srgbClr val="000000"/>
+          </a:solidFill>
+          <a:ln w="12700" cap="flat" cmpd="sng" algn="ctr">
+            <a:noFill/>
+            <a:prstDash val="solid"/>
+            <a:round/>
+            <a:headEnd type="none" w="med" len="med"/>
+            <a:tailEnd type="none" w="med" len="med"/>
+          </a:ln>
+          <a:effectLst/>
+        </p:spPr>
+        <p:txBody>
+          <a:bodyPr vert="horz" wrap="none" lIns="72000" tIns="45720" rIns="72000" bIns="45720" numCol="1" rtlCol="0" anchor="t" anchorCtr="0" compatLnSpc="1">
+            <a:prstTxWarp prst="textNoShape">
+              <a:avLst/>
+            </a:prstTxWarp>
+          </a:bodyPr>
+          <a:lstStyle/>
+          <a:p>
+            <a:pPr marL="0" marR="0" indent="0" algn="l" defTabSz="914400" rtl="0" eaLnBrk="1" fontAlgn="base" latinLnBrk="0" hangingPunct="1">
+              <a:lnSpc>
+                <a:spcPct val="100000"/>
+              </a:lnSpc>
+              <a:spcBef>
+                <a:spcPct val="50000"/>
+              </a:spcBef>
+              <a:spcAft>
+                <a:spcPct val="0"/>
+              </a:spcAft>
+              <a:buClrTx/>
+              <a:buSzTx/>
+              <a:buFontTx/>
+              <a:buNone/>
+              <a:tabLst/>
+            </a:pPr>
+            <a:endParaRPr kumimoji="0" lang="en-US" sz="2000" b="0" i="0" u="none" strike="noStrike" cap="none" normalizeH="0" baseline="0">
+              <a:ln>
+                <a:noFill/>
+              </a:ln>
+              <a:solidFill>
+                <a:schemeClr val="tx1"/>
+              </a:solidFill>
+              <a:effectLst/>
+              <a:latin typeface="Arial" charset="0"/>
+            </a:endParaRPr>
+          </a:p>
+        </p:txBody>
+      </p:sp>
+      <p:sp>
+        <p:nvSpPr>
           <p:cNvPr id="5" name="Rounded Rectangle 4"/>
           <p:cNvSpPr/>
           <p:nvPr/>
@@ -12330,7 +12698,7 @@
 </p:sld>
 </file>
 
-<file path=ppt/slides/slide21.xml><?xml version="1.0" encoding="utf-8"?>
+<file path=ppt/slides/slide22.xml><?xml version="1.0" encoding="utf-8"?>
 <p:sld xmlns:a="http://schemas.openxmlformats.org/drawingml/2006/main" xmlns:r="http://schemas.openxmlformats.org/officeDocument/2006/relationships" xmlns:p="http://schemas.openxmlformats.org/presentationml/2006/main">
   <p:cSld>
     <p:spTree>
@@ -12415,7 +12783,7 @@
 </p:sld>
 </file>
 
-<file path=ppt/slides/slide22.xml><?xml version="1.0" encoding="utf-8"?>
+<file path=ppt/slides/slide23.xml><?xml version="1.0" encoding="utf-8"?>
 <p:sld xmlns:a="http://schemas.openxmlformats.org/drawingml/2006/main" xmlns:r="http://schemas.openxmlformats.org/officeDocument/2006/relationships" xmlns:p="http://schemas.openxmlformats.org/presentationml/2006/main">
   <p:cSld>
     <p:spTree>
@@ -12675,7 +13043,7 @@
 </p:sld>
 </file>
 
-<file path=ppt/slides/slide23.xml><?xml version="1.0" encoding="utf-8"?>
+<file path=ppt/slides/slide24.xml><?xml version="1.0" encoding="utf-8"?>
 <p:sld xmlns:a="http://schemas.openxmlformats.org/drawingml/2006/main" xmlns:r="http://schemas.openxmlformats.org/officeDocument/2006/relationships" xmlns:p="http://schemas.openxmlformats.org/presentationml/2006/main">
   <p:cSld>
     <p:spTree>
@@ -12847,7 +13215,7 @@
                 <a:latin typeface="Consolas" panose="020B0609020204030204" pitchFamily="49" charset="0"/>
                 <a:cs typeface="Consolas" panose="020B0609020204030204" pitchFamily="49" charset="0"/>
               </a:rPr>
-              <a:t> wc.pl "test 1: FAILED, test 2: SUCCESSFUL"</a:t>
+              <a:t> wc.pl "test 1: FAILED, test 2: PASSED"</a:t>
             </a:r>
             <a:br>
               <a:rPr lang="en-US" sz="3200" dirty="0">
@@ -12918,7 +13286,7 @@
 </p:sld>
 </file>
 
-<file path=ppt/slides/slide24.xml><?xml version="1.0" encoding="utf-8"?>
+<file path=ppt/slides/slide25.xml><?xml version="1.0" encoding="utf-8"?>
 <p:sld xmlns:a="http://schemas.openxmlformats.org/drawingml/2006/main" xmlns:r="http://schemas.openxmlformats.org/officeDocument/2006/relationships" xmlns:p="http://schemas.openxmlformats.org/presentationml/2006/main">
   <p:cSld>
     <p:spTree>
@@ -13046,7 +13414,7 @@
 </p:sld>
 </file>
 
-<file path=ppt/slides/slide25.xml><?xml version="1.0" encoding="utf-8"?>
+<file path=ppt/slides/slide26.xml><?xml version="1.0" encoding="utf-8"?>
 <p:sld xmlns:a="http://schemas.openxmlformats.org/drawingml/2006/main" xmlns:r="http://schemas.openxmlformats.org/officeDocument/2006/relationships" xmlns:p="http://schemas.openxmlformats.org/presentationml/2006/main" showMasterSp="0">
   <p:cSld>
     <p:spTree>
@@ -14155,8 +14523,8 @@
         </p:nvSpPr>
         <p:spPr bwMode="auto">
           <a:xfrm>
-            <a:off x="524935" y="3384771"/>
-            <a:ext cx="11140018" cy="2070617"/>
+            <a:off x="524935" y="3469179"/>
+            <a:ext cx="11140018" cy="3044164"/>
           </a:xfrm>
           <a:prstGeom prst="roundRect">
             <a:avLst/>
@@ -14221,6 +14589,10 @@
           </p:nvPr>
         </p:nvSpPr>
         <p:spPr>
+          <a:xfrm>
+            <a:off x="529168" y="1170337"/>
+            <a:ext cx="11135785" cy="3852000"/>
+          </a:xfrm>
           <a:ln>
             <a:noFill/>
           </a:ln>
@@ -14303,6 +14675,115 @@
               </a:rPr>
               <a:t>@</a:t>
             </a:r>
+            <a:r>
+              <a:rPr lang="sv-SE" dirty="0"/>
+              <a:t>. If </a:t>
+            </a:r>
+            <a:r>
+              <a:rPr lang="sv-SE" dirty="0">
+                <a:solidFill>
+                  <a:srgbClr val="FF0000"/>
+                </a:solidFill>
+              </a:rPr>
+              <a:t>$#</a:t>
+            </a:r>
+            <a:r>
+              <a:rPr lang="sv-SE" dirty="0"/>
+              <a:t> is </a:t>
+            </a:r>
+            <a:r>
+              <a:rPr lang="sv-SE" dirty="0" err="1"/>
+              <a:t>used</a:t>
+            </a:r>
+            <a:r>
+              <a:rPr lang="sv-SE" dirty="0"/>
+              <a:t> </a:t>
+            </a:r>
+            <a:r>
+              <a:rPr lang="sv-SE" dirty="0" err="1"/>
+              <a:t>before</a:t>
+            </a:r>
+            <a:r>
+              <a:rPr lang="sv-SE" dirty="0"/>
+              <a:t> a list </a:t>
+            </a:r>
+            <a:r>
+              <a:rPr lang="sv-SE" dirty="0" err="1"/>
+              <a:t>variable</a:t>
+            </a:r>
+            <a:r>
+              <a:rPr lang="sv-SE" dirty="0"/>
+              <a:t>, </a:t>
+            </a:r>
+            <a:r>
+              <a:rPr lang="sv-SE" dirty="0" err="1"/>
+              <a:t>we</a:t>
+            </a:r>
+            <a:r>
+              <a:rPr lang="sv-SE" dirty="0"/>
+              <a:t> get the </a:t>
+            </a:r>
+            <a:r>
+              <a:rPr lang="sv-SE" dirty="0" err="1"/>
+              <a:t>highest</a:t>
+            </a:r>
+            <a:r>
+              <a:rPr lang="sv-SE" dirty="0"/>
+              <a:t> index </a:t>
+            </a:r>
+            <a:r>
+              <a:rPr lang="sv-SE" dirty="0" err="1"/>
+              <a:t>of</a:t>
+            </a:r>
+            <a:r>
+              <a:rPr lang="sv-SE" dirty="0"/>
+              <a:t> </a:t>
+            </a:r>
+            <a:r>
+              <a:rPr lang="sv-SE" dirty="0" err="1"/>
+              <a:t>that</a:t>
+            </a:r>
+            <a:r>
+              <a:rPr lang="sv-SE" dirty="0"/>
+              <a:t> list (</a:t>
+            </a:r>
+            <a:r>
+              <a:rPr lang="sv-SE" dirty="0" err="1"/>
+              <a:t>meaning</a:t>
+            </a:r>
+            <a:r>
+              <a:rPr lang="sv-SE" dirty="0"/>
+              <a:t>, </a:t>
+            </a:r>
+            <a:r>
+              <a:rPr lang="sv-SE" dirty="0" err="1"/>
+              <a:t>its</a:t>
+            </a:r>
+            <a:r>
+              <a:rPr lang="sv-SE" dirty="0"/>
+              <a:t> </a:t>
+            </a:r>
+            <a:r>
+              <a:rPr lang="sv-SE" dirty="0" err="1"/>
+              <a:t>length</a:t>
+            </a:r>
+            <a:r>
+              <a:rPr lang="sv-SE" dirty="0"/>
+              <a:t> minus </a:t>
+            </a:r>
+            <a:r>
+              <a:rPr lang="sv-SE" dirty="0" err="1"/>
+              <a:t>one</a:t>
+            </a:r>
+            <a:r>
+              <a:rPr lang="sv-SE" dirty="0"/>
+              <a:t>).</a:t>
+            </a:r>
+            <a:endParaRPr lang="sv-SE" dirty="0">
+              <a:solidFill>
+                <a:schemeClr val="accent1"/>
+              </a:solidFill>
+            </a:endParaRPr>
           </a:p>
           <a:p>
             <a:r>
@@ -14327,27 +14808,9 @@
             </a:r>
           </a:p>
           <a:p>
-            <a:endParaRPr lang="sv-SE" dirty="0"/>
-          </a:p>
-          <a:p>
-            <a:endParaRPr lang="sv-SE" dirty="0"/>
-          </a:p>
-          <a:p>
-            <a:endParaRPr lang="sv-SE" dirty="0"/>
-          </a:p>
-          <a:p>
-            <a:endParaRPr lang="sv-SE" dirty="0"/>
-          </a:p>
-          <a:p>
-            <a:endParaRPr lang="sv-SE" dirty="0"/>
-          </a:p>
-          <a:p>
-            <a:endParaRPr lang="sv-SE" dirty="0"/>
-          </a:p>
-          <a:p>
-            <a:r>
-              <a:rPr lang="sv-SE" dirty="0"/>
-              <a:t>Lists </a:t>
+            <a:r>
+              <a:rPr lang="sv-SE" dirty="0"/>
+              <a:t>Deep lists </a:t>
             </a:r>
             <a:r>
               <a:rPr lang="sv-SE" dirty="0" err="1"/>
@@ -14431,7 +14894,7 @@
       </p:sp>
       <p:pic>
         <p:nvPicPr>
-          <p:cNvPr id="6" name="Picture 5"/>
+          <p:cNvPr id="7" name="Picture 6"/>
           <p:cNvPicPr>
             <a:picLocks noChangeAspect="1"/>
           </p:cNvPicPr>
@@ -14445,8 +14908,8 @@
         </p:blipFill>
         <p:spPr>
           <a:xfrm>
-            <a:off x="747639" y="3677348"/>
-            <a:ext cx="8915400" cy="1457325"/>
+            <a:off x="853435" y="3609532"/>
+            <a:ext cx="10483017" cy="2763457"/>
           </a:xfrm>
           <a:prstGeom prst="rect">
             <a:avLst/>

</xml_diff>

<commit_message>
Some more modifications of stuff that was incorrect.
</commit_message>
<xml_diff>
--- a/superbasicperl.pptx
+++ b/superbasicperl.pptx
@@ -6734,7 +6734,7 @@
           <a:p>
             <a:fld id="{E2F24CBB-8280-4EF4-8F27-826DBE45BF1C}" type="datetimeFigureOut">
               <a:rPr lang="sv-SE" smtClean="0"/>
-              <a:t>2016-06-07</a:t>
+              <a:t>2016-06-15</a:t>
             </a:fld>
             <a:endParaRPr lang="sv-SE"/>
           </a:p>
@@ -14894,7 +14894,7 @@
       </p:sp>
       <p:pic>
         <p:nvPicPr>
-          <p:cNvPr id="7" name="Picture 6"/>
+          <p:cNvPr id="4" name="Picture 3"/>
           <p:cNvPicPr>
             <a:picLocks noChangeAspect="1"/>
           </p:cNvPicPr>
@@ -14908,8 +14908,8 @@
         </p:blipFill>
         <p:spPr>
           <a:xfrm>
-            <a:off x="853435" y="3609532"/>
-            <a:ext cx="10483017" cy="2763457"/>
+            <a:off x="820757" y="3589377"/>
+            <a:ext cx="10548373" cy="2803767"/>
           </a:xfrm>
           <a:prstGeom prst="rect">
             <a:avLst/>

</xml_diff>